<commit_message>
quick add few more SMILES in a break
</commit_message>
<xml_diff>
--- a/pres/DBandyopadhyay_FigChanges_eLNB_revision_2019.pptx
+++ b/pres/DBandyopadhyay_FigChanges_eLNB_revision_2019.pptx
@@ -8,18 +8,19 @@
     <p:sldMasterId id="2147483712" r:id="rId4"/>
   </p:sldMasterIdLst>
   <p:notesMasterIdLst>
-    <p:notesMasterId r:id="rId14"/>
+    <p:notesMasterId r:id="rId15"/>
   </p:notesMasterIdLst>
   <p:sldIdLst>
     <p:sldId id="256" r:id="rId5"/>
-    <p:sldId id="279" r:id="rId6"/>
-    <p:sldId id="297" r:id="rId7"/>
-    <p:sldId id="298" r:id="rId8"/>
-    <p:sldId id="299" r:id="rId9"/>
-    <p:sldId id="300" r:id="rId10"/>
-    <p:sldId id="259" r:id="rId11"/>
-    <p:sldId id="302" r:id="rId12"/>
-    <p:sldId id="301" r:id="rId13"/>
+    <p:sldId id="303" r:id="rId6"/>
+    <p:sldId id="279" r:id="rId7"/>
+    <p:sldId id="297" r:id="rId8"/>
+    <p:sldId id="298" r:id="rId9"/>
+    <p:sldId id="299" r:id="rId10"/>
+    <p:sldId id="300" r:id="rId11"/>
+    <p:sldId id="259" r:id="rId12"/>
+    <p:sldId id="302" r:id="rId13"/>
+    <p:sldId id="301" r:id="rId14"/>
   </p:sldIdLst>
   <p:sldSz cx="9144000" cy="6858000" type="screen4x3"/>
   <p:notesSz cx="6858000" cy="9144000"/>
@@ -220,7 +221,7 @@
             <a:fld id="{BCD41C7E-9E99-465F-BA13-33F82FBE97E5}" type="datetimeFigureOut">
               <a:rPr lang="en-US" smtClean="0"/>
               <a:pPr/>
-              <a:t>6/9/2019</a:t>
+              <a:t>6/17/2019</a:t>
             </a:fld>
             <a:endParaRPr lang="en-US"/>
           </a:p>
@@ -556,7 +557,7 @@
             <a:fld id="{4C8C9167-E136-4C18-8FF2-A53C2728C27B}" type="slidenum">
               <a:rPr lang="en-US" smtClean="0"/>
               <a:pPr/>
-              <a:t>2</a:t>
+              <a:t>3</a:t>
             </a:fld>
             <a:endParaRPr lang="en-US"/>
           </a:p>
@@ -756,7 +757,7 @@
                 </a:solidFill>
               </a:rPr>
               <a:pPr/>
-              <a:t>7</a:t>
+              <a:t>8</a:t>
             </a:fld>
             <a:endParaRPr lang="en-US">
               <a:solidFill>
@@ -796,191 +797,7 @@
           <a:chExt cx="0" cy="0"/>
         </a:xfrm>
       </p:grpSpPr>
-      <p:sp>
-        <p:nvSpPr>
-          <p:cNvPr id="2" name="Slide Image Placeholder 1"/>
-          <p:cNvSpPr>
-            <a:spLocks noGrp="1" noRot="1" noChangeAspect="1"/>
-          </p:cNvSpPr>
-          <p:nvPr>
-            <p:ph type="sldImg"/>
-          </p:nvPr>
-        </p:nvSpPr>
-        <p:spPr/>
-      </p:sp>
-      <p:sp>
-        <p:nvSpPr>
-          <p:cNvPr id="3" name="Notes Placeholder 2"/>
-          <p:cNvSpPr>
-            <a:spLocks noGrp="1"/>
-          </p:cNvSpPr>
-          <p:nvPr>
-            <p:ph type="body" idx="1"/>
-          </p:nvPr>
-        </p:nvSpPr>
-        <p:spPr/>
-        <p:txBody>
-          <a:bodyPr>
-            <a:normAutofit/>
-          </a:bodyPr>
-          <a:lstStyle/>
-          <a:p>
-            <a:r>
-              <a:rPr lang="en-US" dirty="0"/>
-              <a:t>Stats:</a:t>
-            </a:r>
-          </a:p>
-          <a:p>
-            <a:pPr lvl="0"/>
-            <a:r>
-              <a:rPr lang="en-US" sz="1200" kern="1200" dirty="0">
-                <a:solidFill>
-                  <a:schemeClr val="tx1"/>
-                </a:solidFill>
-                <a:latin typeface="+mn-lt"/>
-                <a:ea typeface="+mn-ea"/>
-                <a:cs typeface="+mn-cs"/>
-              </a:rPr>
-              <a:t>The two methods allow you to access different sets of molecules starting from any molecule in TCAMS (average overlap in coverage is 40%).</a:t>
-            </a:r>
-          </a:p>
-          <a:p>
-            <a:pPr lvl="0"/>
-            <a:r>
-              <a:rPr lang="en-US" sz="1200" kern="1200" dirty="0">
-                <a:solidFill>
-                  <a:schemeClr val="tx1"/>
-                </a:solidFill>
-                <a:latin typeface="+mn-lt"/>
-                <a:ea typeface="+mn-ea"/>
-                <a:cs typeface="+mn-cs"/>
-              </a:rPr>
-              <a:t>On the aggregate (average/median), you can link to about twice as many molecules with the frameworks, however, this is because on the aggregate there are 6 times more frameworks than NCATS scaffolds, so the “fragment efficiency” is actually 3 times greater for NCATS scaffolds. One could also argue that many of the framework-only links (</a:t>
-            </a:r>
-            <a:r>
-              <a:rPr lang="en-US" sz="1200" kern="1200" dirty="0" err="1">
-                <a:solidFill>
-                  <a:schemeClr val="tx1"/>
-                </a:solidFill>
-                <a:latin typeface="+mn-lt"/>
-                <a:ea typeface="+mn-ea"/>
-                <a:cs typeface="+mn-cs"/>
-              </a:rPr>
-              <a:t>eg</a:t>
-            </a:r>
-            <a:r>
-              <a:rPr lang="en-US" sz="1200" kern="1200" dirty="0">
-                <a:solidFill>
-                  <a:schemeClr val="tx1"/>
-                </a:solidFill>
-                <a:latin typeface="+mn-lt"/>
-                <a:ea typeface="+mn-ea"/>
-                <a:cs typeface="+mn-cs"/>
-              </a:rPr>
-              <a:t>. variously decorated benzene rings) are not useful.</a:t>
-            </a:r>
-          </a:p>
-          <a:p>
-            <a:pPr lvl="0"/>
-            <a:r>
-              <a:rPr lang="en-US" sz="1200" kern="1200" dirty="0">
-                <a:solidFill>
-                  <a:schemeClr val="tx1"/>
-                </a:solidFill>
-                <a:latin typeface="+mn-lt"/>
-                <a:ea typeface="+mn-ea"/>
-                <a:cs typeface="+mn-cs"/>
-              </a:rPr>
-              <a:t>The outliers are interesting: compounds in a rare </a:t>
-            </a:r>
-            <a:r>
-              <a:rPr lang="en-US" sz="1200" kern="1200" dirty="0" err="1">
-                <a:solidFill>
-                  <a:schemeClr val="tx1"/>
-                </a:solidFill>
-                <a:latin typeface="+mn-lt"/>
-                <a:ea typeface="+mn-ea"/>
-                <a:cs typeface="+mn-cs"/>
-              </a:rPr>
-              <a:t>tautomer</a:t>
-            </a:r>
-            <a:r>
-              <a:rPr lang="en-US" sz="1200" kern="1200" dirty="0">
-                <a:solidFill>
-                  <a:schemeClr val="tx1"/>
-                </a:solidFill>
-                <a:latin typeface="+mn-lt"/>
-                <a:ea typeface="+mn-ea"/>
-                <a:cs typeface="+mn-cs"/>
-              </a:rPr>
-              <a:t> are unified with the dominant one by the NCATS tool, but left as singletons by the frameworks. And compounds whose only link with other molecules would be </a:t>
-            </a:r>
-            <a:r>
-              <a:rPr lang="en-US" sz="1200" kern="1200" dirty="0" err="1">
-                <a:solidFill>
-                  <a:schemeClr val="tx1"/>
-                </a:solidFill>
-                <a:latin typeface="+mn-lt"/>
-                <a:ea typeface="+mn-ea"/>
-                <a:cs typeface="+mn-cs"/>
-              </a:rPr>
-              <a:t>eg</a:t>
-            </a:r>
-            <a:r>
-              <a:rPr lang="en-US" sz="1200" kern="1200" dirty="0">
-                <a:solidFill>
-                  <a:schemeClr val="tx1"/>
-                </a:solidFill>
-                <a:latin typeface="+mn-lt"/>
-                <a:ea typeface="+mn-ea"/>
-                <a:cs typeface="+mn-cs"/>
-              </a:rPr>
-              <a:t>. a benzene ring remain singletons with the R-group tool.</a:t>
-            </a:r>
-          </a:p>
-          <a:p>
-            <a:endParaRPr lang="en-US" dirty="0"/>
-          </a:p>
-        </p:txBody>
-      </p:sp>
-      <p:sp>
-        <p:nvSpPr>
-          <p:cNvPr id="4" name="Slide Number Placeholder 3"/>
-          <p:cNvSpPr>
-            <a:spLocks noGrp="1"/>
-          </p:cNvSpPr>
-          <p:nvPr>
-            <p:ph type="sldNum" sz="quarter" idx="10"/>
-          </p:nvPr>
-        </p:nvSpPr>
-        <p:spPr/>
-        <p:txBody>
-          <a:bodyPr/>
-          <a:lstStyle/>
-          <a:p>
-            <a:fld id="{4C8C9167-E136-4C18-8FF2-A53C2728C27B}" type="slidenum">
-              <a:rPr lang="en-US" smtClean="0">
-                <a:solidFill>
-                  <a:prstClr val="black"/>
-                </a:solidFill>
-              </a:rPr>
-              <a:pPr/>
-              <a:t>8</a:t>
-            </a:fld>
-            <a:endParaRPr lang="en-US">
-              <a:solidFill>
-                <a:prstClr val="black"/>
-              </a:solidFill>
-            </a:endParaRPr>
-          </a:p>
-        </p:txBody>
-      </p:sp>
     </p:spTree>
-    <p:extLst>
-      <p:ext uri="{BB962C8B-B14F-4D97-AF65-F5344CB8AC3E}">
-        <p14:creationId xmlns:p14="http://schemas.microsoft.com/office/powerpoint/2010/main" val="257090025"/>
-      </p:ext>
-    </p:extLst>
   </p:cSld>
   <p:clrMapOvr>
     <a:masterClrMapping/>
@@ -1249,7 +1066,7 @@
             <a:fld id="{4B3D3EAA-4720-4AEB-A041-FA3C86592F29}" type="datetimeFigureOut">
               <a:rPr lang="en-US" smtClean="0"/>
               <a:pPr/>
-              <a:t>6/9/2019</a:t>
+              <a:t>6/17/2019</a:t>
             </a:fld>
             <a:endParaRPr lang="en-US"/>
           </a:p>
@@ -1415,7 +1232,7 @@
             <a:fld id="{4B3D3EAA-4720-4AEB-A041-FA3C86592F29}" type="datetimeFigureOut">
               <a:rPr lang="en-US" smtClean="0"/>
               <a:pPr/>
-              <a:t>6/9/2019</a:t>
+              <a:t>6/17/2019</a:t>
             </a:fld>
             <a:endParaRPr lang="en-US"/>
           </a:p>
@@ -1547,7 +1364,7 @@
             <a:fld id="{4B3D3EAA-4720-4AEB-A041-FA3C86592F29}" type="datetimeFigureOut">
               <a:rPr lang="en-US" smtClean="0"/>
               <a:pPr/>
-              <a:t>6/9/2019</a:t>
+              <a:t>6/17/2019</a:t>
             </a:fld>
             <a:endParaRPr lang="en-US"/>
           </a:p>
@@ -2208,7 +2025,7 @@
             <a:fld id="{4B3D3EAA-4720-4AEB-A041-FA3C86592F29}" type="datetimeFigureOut">
               <a:rPr lang="en-US" smtClean="0"/>
               <a:pPr/>
-              <a:t>6/9/2019</a:t>
+              <a:t>6/17/2019</a:t>
             </a:fld>
             <a:endParaRPr lang="en-US"/>
           </a:p>
@@ -3979,7 +3796,7 @@
             <a:fld id="{4B3D3EAA-4720-4AEB-A041-FA3C86592F29}" type="datetimeFigureOut">
               <a:rPr lang="en-US" smtClean="0"/>
               <a:pPr/>
-              <a:t>6/9/2019</a:t>
+              <a:t>6/17/2019</a:t>
             </a:fld>
             <a:endParaRPr lang="en-US"/>
           </a:p>
@@ -7374,7 +7191,7 @@
             <a:fld id="{4B3D3EAA-4720-4AEB-A041-FA3C86592F29}" type="datetimeFigureOut">
               <a:rPr lang="en-US" smtClean="0"/>
               <a:pPr/>
-              <a:t>6/9/2019</a:t>
+              <a:t>6/17/2019</a:t>
             </a:fld>
             <a:endParaRPr lang="en-US"/>
           </a:p>
@@ -11090,7 +10907,7 @@
             <a:fld id="{4B3D3EAA-4720-4AEB-A041-FA3C86592F29}" type="datetimeFigureOut">
               <a:rPr lang="en-US" smtClean="0"/>
               <a:pPr/>
-              <a:t>6/9/2019</a:t>
+              <a:t>6/17/2019</a:t>
             </a:fld>
             <a:endParaRPr lang="en-US"/>
           </a:p>
@@ -14110,7 +13927,7 @@
             <a:fld id="{4B3D3EAA-4720-4AEB-A041-FA3C86592F29}" type="datetimeFigureOut">
               <a:rPr lang="en-US" smtClean="0"/>
               <a:pPr/>
-              <a:t>6/9/2019</a:t>
+              <a:t>6/17/2019</a:t>
             </a:fld>
             <a:endParaRPr lang="en-US"/>
           </a:p>
@@ -17883,7 +17700,7 @@
             <a:fld id="{4B3D3EAA-4720-4AEB-A041-FA3C86592F29}" type="datetimeFigureOut">
               <a:rPr lang="en-US" smtClean="0"/>
               <a:pPr/>
-              <a:t>6/9/2019</a:t>
+              <a:t>6/17/2019</a:t>
             </a:fld>
             <a:endParaRPr lang="en-US"/>
           </a:p>
@@ -19139,7 +18956,7 @@
             <a:fld id="{4B3D3EAA-4720-4AEB-A041-FA3C86592F29}" type="datetimeFigureOut">
               <a:rPr lang="en-US" smtClean="0"/>
               <a:pPr/>
-              <a:t>6/9/2019</a:t>
+              <a:t>6/17/2019</a:t>
             </a:fld>
             <a:endParaRPr lang="en-US"/>
           </a:p>
@@ -19486,7 +19303,7 @@
             <a:fld id="{4B3D3EAA-4720-4AEB-A041-FA3C86592F29}" type="datetimeFigureOut">
               <a:rPr lang="en-US" smtClean="0"/>
               <a:pPr/>
-              <a:t>6/9/2019</a:t>
+              <a:t>6/17/2019</a:t>
             </a:fld>
             <a:endParaRPr lang="en-US"/>
           </a:p>
@@ -19919,7 +19736,7 @@
             <a:fld id="{4B3D3EAA-4720-4AEB-A041-FA3C86592F29}" type="datetimeFigureOut">
               <a:rPr lang="en-US" smtClean="0"/>
               <a:pPr/>
-              <a:t>6/9/2019</a:t>
+              <a:t>6/17/2019</a:t>
             </a:fld>
             <a:endParaRPr lang="en-US"/>
           </a:p>
@@ -20240,7 +20057,7 @@
             <a:fld id="{4B3D3EAA-4720-4AEB-A041-FA3C86592F29}" type="datetimeFigureOut">
               <a:rPr lang="en-US" smtClean="0"/>
               <a:pPr/>
-              <a:t>6/9/2019</a:t>
+              <a:t>6/17/2019</a:t>
             </a:fld>
             <a:endParaRPr lang="en-US"/>
           </a:p>
@@ -23229,7 +23046,354 @@
 </p:sld>
 </file>
 
+<file path=ppt/slides/slide10.xml><?xml version="1.0" encoding="utf-8"?>
+<p:sld xmlns:a="http://schemas.openxmlformats.org/drawingml/2006/main" xmlns:r="http://schemas.openxmlformats.org/officeDocument/2006/relationships" xmlns:p="http://schemas.openxmlformats.org/presentationml/2006/main">
+  <p:cSld>
+    <p:spTree>
+      <p:nvGrpSpPr>
+        <p:cNvPr id="1" name=""/>
+        <p:cNvGrpSpPr/>
+        <p:nvPr/>
+      </p:nvGrpSpPr>
+      <p:grpSpPr>
+        <a:xfrm>
+          <a:off x="0" y="0"/>
+          <a:ext cx="0" cy="0"/>
+          <a:chOff x="0" y="0"/>
+          <a:chExt cx="0" cy="0"/>
+        </a:xfrm>
+      </p:grpSpPr>
+      <p:sp>
+        <p:nvSpPr>
+          <p:cNvPr id="2" name="Title 1">
+            <a:extLst>
+              <a:ext uri="{FF2B5EF4-FFF2-40B4-BE49-F238E27FC236}">
+                <a16:creationId xmlns:a16="http://schemas.microsoft.com/office/drawing/2014/main" id="{A82C809E-055D-4E26-A5A7-2A1E00CE0C8E}"/>
+              </a:ext>
+            </a:extLst>
+          </p:cNvPr>
+          <p:cNvSpPr>
+            <a:spLocks noGrp="1"/>
+          </p:cNvSpPr>
+          <p:nvPr>
+            <p:ph type="title"/>
+          </p:nvPr>
+        </p:nvSpPr>
+        <p:spPr/>
+        <p:txBody>
+          <a:bodyPr/>
+          <a:lstStyle/>
+          <a:p>
+            <a:r>
+              <a:rPr lang="en-US" dirty="0"/>
+              <a:t>Stats bar charts</a:t>
+            </a:r>
+          </a:p>
+        </p:txBody>
+      </p:sp>
+      <p:sp>
+        <p:nvSpPr>
+          <p:cNvPr id="4" name="Text Placeholder 3">
+            <a:extLst>
+              <a:ext uri="{FF2B5EF4-FFF2-40B4-BE49-F238E27FC236}">
+                <a16:creationId xmlns:a16="http://schemas.microsoft.com/office/drawing/2014/main" id="{4E852665-AB70-4696-993E-2D749D674B4D}"/>
+              </a:ext>
+            </a:extLst>
+          </p:cNvPr>
+          <p:cNvSpPr>
+            <a:spLocks noGrp="1"/>
+          </p:cNvSpPr>
+          <p:nvPr>
+            <p:ph type="body" sz="quarter" idx="14"/>
+          </p:nvPr>
+        </p:nvSpPr>
+        <p:spPr/>
+        <p:txBody>
+          <a:bodyPr/>
+          <a:lstStyle/>
+          <a:p>
+            <a:endParaRPr lang="en-US"/>
+          </a:p>
+        </p:txBody>
+      </p:sp>
+      <p:sp>
+        <p:nvSpPr>
+          <p:cNvPr id="5" name="Slide Number Placeholder 4">
+            <a:extLst>
+              <a:ext uri="{FF2B5EF4-FFF2-40B4-BE49-F238E27FC236}">
+                <a16:creationId xmlns:a16="http://schemas.microsoft.com/office/drawing/2014/main" id="{439173BD-33EA-42B3-B778-ADD631ABB78A}"/>
+              </a:ext>
+            </a:extLst>
+          </p:cNvPr>
+          <p:cNvSpPr>
+            <a:spLocks noGrp="1"/>
+          </p:cNvSpPr>
+          <p:nvPr>
+            <p:ph type="sldNum" sz="quarter" idx="17"/>
+          </p:nvPr>
+        </p:nvSpPr>
+        <p:spPr/>
+        <p:txBody>
+          <a:bodyPr/>
+          <a:lstStyle/>
+          <a:p>
+            <a:fld id="{0A838F34-1B32-4019-A24D-EF473E6901BC}" type="slidenum">
+              <a:rPr lang="en-US" smtClean="0">
+                <a:solidFill>
+                  <a:srgbClr val="9A8B7D"/>
+                </a:solidFill>
+              </a:rPr>
+              <a:pPr/>
+              <a:t>10</a:t>
+            </a:fld>
+            <a:endParaRPr lang="en-US">
+              <a:solidFill>
+                <a:srgbClr val="9A8B7D"/>
+              </a:solidFill>
+            </a:endParaRPr>
+          </a:p>
+        </p:txBody>
+      </p:sp>
+      <p:pic>
+        <p:nvPicPr>
+          <p:cNvPr id="7" name="Picture 6">
+            <a:extLst>
+              <a:ext uri="{FF2B5EF4-FFF2-40B4-BE49-F238E27FC236}">
+                <a16:creationId xmlns:a16="http://schemas.microsoft.com/office/drawing/2014/main" id="{5D071394-E259-4091-BEB8-D965BBEF15C2}"/>
+              </a:ext>
+            </a:extLst>
+          </p:cNvPr>
+          <p:cNvPicPr>
+            <a:picLocks noChangeAspect="1"/>
+          </p:cNvPicPr>
+          <p:nvPr/>
+        </p:nvPicPr>
+        <p:blipFill rotWithShape="1">
+          <a:blip r:embed="rId2"/>
+          <a:srcRect l="9581" r="24510"/>
+          <a:stretch/>
+        </p:blipFill>
+        <p:spPr>
+          <a:xfrm>
+            <a:off x="2206156" y="1100738"/>
+            <a:ext cx="5649734" cy="2561336"/>
+          </a:xfrm>
+          <a:prstGeom prst="rect">
+            <a:avLst/>
+          </a:prstGeom>
+        </p:spPr>
+      </p:pic>
+      <p:sp>
+        <p:nvSpPr>
+          <p:cNvPr id="9" name="TextBox 8">
+            <a:extLst>
+              <a:ext uri="{FF2B5EF4-FFF2-40B4-BE49-F238E27FC236}">
+                <a16:creationId xmlns:a16="http://schemas.microsoft.com/office/drawing/2014/main" id="{C065B58C-CD0D-4B7A-9D42-D31593D6933C}"/>
+              </a:ext>
+            </a:extLst>
+          </p:cNvPr>
+          <p:cNvSpPr txBox="1"/>
+          <p:nvPr/>
+        </p:nvSpPr>
+        <p:spPr>
+          <a:xfrm rot="16200000">
+            <a:off x="904018" y="1684148"/>
+            <a:ext cx="2154804" cy="400110"/>
+          </a:xfrm>
+          <a:prstGeom prst="rect">
+            <a:avLst/>
+          </a:prstGeom>
+          <a:noFill/>
+        </p:spPr>
+        <p:txBody>
+          <a:bodyPr wrap="square" rtlCol="0">
+            <a:spAutoFit/>
+          </a:bodyPr>
+          <a:lstStyle/>
+          <a:p>
+            <a:pPr>
+              <a:buClr>
+                <a:schemeClr val="tx1"/>
+              </a:buClr>
+            </a:pPr>
+            <a:r>
+              <a:rPr lang="en-US" sz="2000" dirty="0"/>
+              <a:t># molecules</a:t>
+            </a:r>
+          </a:p>
+        </p:txBody>
+      </p:sp>
+      <p:sp>
+        <p:nvSpPr>
+          <p:cNvPr id="10" name="TextBox 9">
+            <a:extLst>
+              <a:ext uri="{FF2B5EF4-FFF2-40B4-BE49-F238E27FC236}">
+                <a16:creationId xmlns:a16="http://schemas.microsoft.com/office/drawing/2014/main" id="{7E9563D7-FD9C-447C-93BB-F90D4739C30A}"/>
+              </a:ext>
+            </a:extLst>
+          </p:cNvPr>
+          <p:cNvSpPr txBox="1"/>
+          <p:nvPr/>
+        </p:nvSpPr>
+        <p:spPr>
+          <a:xfrm rot="16200000">
+            <a:off x="904018" y="4204712"/>
+            <a:ext cx="2154804" cy="400110"/>
+          </a:xfrm>
+          <a:prstGeom prst="rect">
+            <a:avLst/>
+          </a:prstGeom>
+          <a:noFill/>
+        </p:spPr>
+        <p:txBody>
+          <a:bodyPr wrap="square" rtlCol="0">
+            <a:spAutoFit/>
+          </a:bodyPr>
+          <a:lstStyle/>
+          <a:p>
+            <a:pPr>
+              <a:buClr>
+                <a:schemeClr val="tx1"/>
+              </a:buClr>
+            </a:pPr>
+            <a:r>
+              <a:rPr lang="en-US" sz="2000" dirty="0"/>
+              <a:t># molecules</a:t>
+            </a:r>
+          </a:p>
+        </p:txBody>
+      </p:sp>
+      <p:pic>
+        <p:nvPicPr>
+          <p:cNvPr id="12" name="Picture 11">
+            <a:extLst>
+              <a:ext uri="{FF2B5EF4-FFF2-40B4-BE49-F238E27FC236}">
+                <a16:creationId xmlns:a16="http://schemas.microsoft.com/office/drawing/2014/main" id="{54DBEF6F-BEBF-4888-BE5E-712455B600BE}"/>
+              </a:ext>
+            </a:extLst>
+          </p:cNvPr>
+          <p:cNvPicPr>
+            <a:picLocks noChangeAspect="1"/>
+          </p:cNvPicPr>
+          <p:nvPr/>
+        </p:nvPicPr>
+        <p:blipFill rotWithShape="1">
+          <a:blip r:embed="rId3"/>
+          <a:srcRect l="10006" r="25193"/>
+          <a:stretch/>
+        </p:blipFill>
+        <p:spPr>
+          <a:xfrm>
+            <a:off x="2183845" y="3646173"/>
+            <a:ext cx="5462547" cy="2600325"/>
+          </a:xfrm>
+          <a:prstGeom prst="rect">
+            <a:avLst/>
+          </a:prstGeom>
+        </p:spPr>
+      </p:pic>
+    </p:spTree>
+    <p:extLst>
+      <p:ext uri="{BB962C8B-B14F-4D97-AF65-F5344CB8AC3E}">
+        <p14:creationId xmlns:p14="http://schemas.microsoft.com/office/powerpoint/2010/main" val="892661274"/>
+      </p:ext>
+    </p:extLst>
+  </p:cSld>
+  <p:clrMapOvr>
+    <a:masterClrMapping/>
+  </p:clrMapOvr>
+</p:sld>
+</file>
+
 <file path=ppt/slides/slide2.xml><?xml version="1.0" encoding="utf-8"?>
+<p:sld xmlns:a="http://schemas.openxmlformats.org/drawingml/2006/main" xmlns:r="http://schemas.openxmlformats.org/officeDocument/2006/relationships" xmlns:p="http://schemas.openxmlformats.org/presentationml/2006/main">
+  <p:cSld>
+    <p:spTree>
+      <p:nvGrpSpPr>
+        <p:cNvPr id="1" name=""/>
+        <p:cNvGrpSpPr/>
+        <p:nvPr/>
+      </p:nvGrpSpPr>
+      <p:grpSpPr>
+        <a:xfrm>
+          <a:off x="0" y="0"/>
+          <a:ext cx="0" cy="0"/>
+          <a:chOff x="0" y="0"/>
+          <a:chExt cx="0" cy="0"/>
+        </a:xfrm>
+      </p:grpSpPr>
+      <p:sp>
+        <p:nvSpPr>
+          <p:cNvPr id="2" name="Title 1">
+            <a:extLst>
+              <a:ext uri="{FF2B5EF4-FFF2-40B4-BE49-F238E27FC236}">
+                <a16:creationId xmlns:a16="http://schemas.microsoft.com/office/drawing/2014/main" id="{1981DE1C-82BA-4632-A148-CFE53036A89E}"/>
+              </a:ext>
+            </a:extLst>
+          </p:cNvPr>
+          <p:cNvSpPr>
+            <a:spLocks noGrp="1"/>
+          </p:cNvSpPr>
+          <p:nvPr>
+            <p:ph type="title"/>
+          </p:nvPr>
+        </p:nvSpPr>
+        <p:spPr/>
+        <p:txBody>
+          <a:bodyPr/>
+          <a:lstStyle/>
+          <a:p>
+            <a:r>
+              <a:rPr lang="en-US" dirty="0"/>
+              <a:t>Fig 2a</a:t>
+            </a:r>
+          </a:p>
+        </p:txBody>
+      </p:sp>
+      <p:pic>
+        <p:nvPicPr>
+          <p:cNvPr id="3" name="Picture 2">
+            <a:extLst>
+              <a:ext uri="{FF2B5EF4-FFF2-40B4-BE49-F238E27FC236}">
+                <a16:creationId xmlns:a16="http://schemas.microsoft.com/office/drawing/2014/main" id="{1F3EA8D8-731A-427D-B355-5EF709757ABF}"/>
+              </a:ext>
+            </a:extLst>
+          </p:cNvPr>
+          <p:cNvPicPr>
+            <a:picLocks noChangeAspect="1"/>
+          </p:cNvPicPr>
+          <p:nvPr/>
+        </p:nvPicPr>
+        <p:blipFill>
+          <a:blip r:embed="rId2"/>
+          <a:stretch>
+            <a:fillRect/>
+          </a:stretch>
+        </p:blipFill>
+        <p:spPr>
+          <a:xfrm>
+            <a:off x="871537" y="2571750"/>
+            <a:ext cx="7400925" cy="1714500"/>
+          </a:xfrm>
+          <a:prstGeom prst="rect">
+            <a:avLst/>
+          </a:prstGeom>
+        </p:spPr>
+      </p:pic>
+    </p:spTree>
+    <p:extLst>
+      <p:ext uri="{BB962C8B-B14F-4D97-AF65-F5344CB8AC3E}">
+        <p14:creationId xmlns:p14="http://schemas.microsoft.com/office/powerpoint/2010/main" val="2519223533"/>
+      </p:ext>
+    </p:extLst>
+  </p:cSld>
+  <p:clrMapOvr>
+    <a:masterClrMapping/>
+  </p:clrMapOvr>
+</p:sld>
+</file>
+
+<file path=ppt/slides/slide3.xml><?xml version="1.0" encoding="utf-8"?>
 <p:sld xmlns:a="http://schemas.openxmlformats.org/drawingml/2006/main" xmlns:r="http://schemas.openxmlformats.org/officeDocument/2006/relationships" xmlns:p="http://schemas.openxmlformats.org/presentationml/2006/main">
   <p:cSld>
     <p:spTree>
@@ -23609,7 +23773,7 @@
             <a:fld id="{FDC40351-2EB1-4AB4-A6D0-AB8EF40E804F}" type="slidenum">
               <a:rPr lang="en-US" smtClean="0"/>
               <a:pPr/>
-              <a:t>2</a:t>
+              <a:t>3</a:t>
             </a:fld>
             <a:endParaRPr lang="en-US"/>
           </a:p>
@@ -24794,7 +24958,7 @@
 </p:sld>
 </file>
 
-<file path=ppt/slides/slide3.xml><?xml version="1.0" encoding="utf-8"?>
+<file path=ppt/slides/slide4.xml><?xml version="1.0" encoding="utf-8"?>
 <p:sld xmlns:a="http://schemas.openxmlformats.org/drawingml/2006/main" xmlns:r="http://schemas.openxmlformats.org/officeDocument/2006/relationships" xmlns:p="http://schemas.openxmlformats.org/presentationml/2006/main">
   <p:cSld>
     <p:spTree>
@@ -24965,134 +25129,6 @@
     <p:extLst>
       <p:ext uri="{BB962C8B-B14F-4D97-AF65-F5344CB8AC3E}">
         <p14:creationId xmlns:p14="http://schemas.microsoft.com/office/powerpoint/2010/main" val="1952249491"/>
-      </p:ext>
-    </p:extLst>
-  </p:cSld>
-  <p:clrMapOvr>
-    <a:masterClrMapping/>
-  </p:clrMapOvr>
-  <p:transition>
-    <p:random/>
-  </p:transition>
-</p:sld>
-</file>
-
-<file path=ppt/slides/slide4.xml><?xml version="1.0" encoding="utf-8"?>
-<p:sld xmlns:a="http://schemas.openxmlformats.org/drawingml/2006/main" xmlns:r="http://schemas.openxmlformats.org/officeDocument/2006/relationships" xmlns:p="http://schemas.openxmlformats.org/presentationml/2006/main">
-  <p:cSld>
-    <p:spTree>
-      <p:nvGrpSpPr>
-        <p:cNvPr id="1" name=""/>
-        <p:cNvGrpSpPr/>
-        <p:nvPr/>
-      </p:nvGrpSpPr>
-      <p:grpSpPr>
-        <a:xfrm>
-          <a:off x="0" y="0"/>
-          <a:ext cx="0" cy="0"/>
-          <a:chOff x="0" y="0"/>
-          <a:chExt cx="0" cy="0"/>
-        </a:xfrm>
-      </p:grpSpPr>
-      <p:sp>
-        <p:nvSpPr>
-          <p:cNvPr id="2" name="Title 1">
-            <a:extLst>
-              <a:ext uri="{FF2B5EF4-FFF2-40B4-BE49-F238E27FC236}">
-                <a16:creationId xmlns:a16="http://schemas.microsoft.com/office/drawing/2014/main" id="{B25CF516-4F28-4EE9-A976-CB97E038F075}"/>
-              </a:ext>
-            </a:extLst>
-          </p:cNvPr>
-          <p:cNvSpPr>
-            <a:spLocks noGrp="1"/>
-          </p:cNvSpPr>
-          <p:nvPr>
-            <p:ph type="title"/>
-          </p:nvPr>
-        </p:nvSpPr>
-        <p:spPr/>
-        <p:txBody>
-          <a:bodyPr/>
-          <a:lstStyle/>
-          <a:p>
-            <a:r>
-              <a:rPr lang="en-US" dirty="0"/>
-              <a:t>Figure 3 : Removed SNG</a:t>
-            </a:r>
-          </a:p>
-        </p:txBody>
-      </p:sp>
-      <p:sp>
-        <p:nvSpPr>
-          <p:cNvPr id="4" name="Slide Number Placeholder 3">
-            <a:extLst>
-              <a:ext uri="{FF2B5EF4-FFF2-40B4-BE49-F238E27FC236}">
-                <a16:creationId xmlns:a16="http://schemas.microsoft.com/office/drawing/2014/main" id="{D4BA2241-FBB1-454B-9CA0-3303B4067AC2}"/>
-              </a:ext>
-            </a:extLst>
-          </p:cNvPr>
-          <p:cNvSpPr>
-            <a:spLocks noGrp="1"/>
-          </p:cNvSpPr>
-          <p:nvPr>
-            <p:ph type="sldNum" sz="quarter" idx="11"/>
-          </p:nvPr>
-        </p:nvSpPr>
-        <p:spPr/>
-        <p:txBody>
-          <a:bodyPr/>
-          <a:lstStyle/>
-          <a:p>
-            <a:r>
-              <a:rPr lang="en-US">
-                <a:solidFill>
-                  <a:srgbClr val="9A8B7D"/>
-                </a:solidFill>
-              </a:rPr>
-              <a:t>&lt;#&gt;</a:t>
-            </a:r>
-            <a:endParaRPr lang="en-US" dirty="0">
-              <a:solidFill>
-                <a:srgbClr val="9A8B7D"/>
-              </a:solidFill>
-            </a:endParaRPr>
-          </a:p>
-        </p:txBody>
-      </p:sp>
-      <p:pic>
-        <p:nvPicPr>
-          <p:cNvPr id="5" name="Picture 4">
-            <a:extLst>
-              <a:ext uri="{FF2B5EF4-FFF2-40B4-BE49-F238E27FC236}">
-                <a16:creationId xmlns:a16="http://schemas.microsoft.com/office/drawing/2014/main" id="{658B9630-BDA8-4960-8745-7AB8F73EE4F6}"/>
-              </a:ext>
-            </a:extLst>
-          </p:cNvPr>
-          <p:cNvPicPr>
-            <a:picLocks noChangeAspect="1"/>
-          </p:cNvPicPr>
-          <p:nvPr/>
-        </p:nvPicPr>
-        <p:blipFill>
-          <a:blip r:embed="rId2"/>
-          <a:stretch>
-            <a:fillRect/>
-          </a:stretch>
-        </p:blipFill>
-        <p:spPr>
-          <a:xfrm>
-            <a:off x="599494" y="1188927"/>
-            <a:ext cx="6827808" cy="5198806"/>
-          </a:xfrm>
-          <a:prstGeom prst="rect">
-            <a:avLst/>
-          </a:prstGeom>
-        </p:spPr>
-      </p:pic>
-    </p:spTree>
-    <p:extLst>
-      <p:ext uri="{BB962C8B-B14F-4D97-AF65-F5344CB8AC3E}">
-        <p14:creationId xmlns:p14="http://schemas.microsoft.com/office/powerpoint/2010/main" val="2772977335"/>
       </p:ext>
     </p:extLst>
   </p:cSld>
@@ -25127,7 +25163,7 @@
           <p:cNvPr id="2" name="Title 1">
             <a:extLst>
               <a:ext uri="{FF2B5EF4-FFF2-40B4-BE49-F238E27FC236}">
-                <a16:creationId xmlns:a16="http://schemas.microsoft.com/office/drawing/2014/main" id="{19190722-C8C0-476E-BA3D-5413CD8FFB94}"/>
+                <a16:creationId xmlns:a16="http://schemas.microsoft.com/office/drawing/2014/main" id="{B25CF516-4F28-4EE9-A976-CB97E038F075}"/>
               </a:ext>
             </a:extLst>
           </p:cNvPr>
@@ -25145,7 +25181,7 @@
           <a:p>
             <a:r>
               <a:rPr lang="en-US" dirty="0"/>
-              <a:t>Figure 5: Added (a) molecule depiction</a:t>
+              <a:t>Figure 3 : Removed SNG</a:t>
             </a:r>
           </a:p>
         </p:txBody>
@@ -25155,7 +25191,7 @@
           <p:cNvPr id="4" name="Slide Number Placeholder 3">
             <a:extLst>
               <a:ext uri="{FF2B5EF4-FFF2-40B4-BE49-F238E27FC236}">
-                <a16:creationId xmlns:a16="http://schemas.microsoft.com/office/drawing/2014/main" id="{64083F5E-5CCD-49C7-93A7-816FF3AA87F0}"/>
+                <a16:creationId xmlns:a16="http://schemas.microsoft.com/office/drawing/2014/main" id="{D4BA2241-FBB1-454B-9CA0-3303B4067AC2}"/>
               </a:ext>
             </a:extLst>
           </p:cNvPr>
@@ -25189,10 +25225,10 @@
       </p:sp>
       <p:pic>
         <p:nvPicPr>
-          <p:cNvPr id="7" name="Picture 6">
+          <p:cNvPr id="5" name="Picture 4">
             <a:extLst>
               <a:ext uri="{FF2B5EF4-FFF2-40B4-BE49-F238E27FC236}">
-                <a16:creationId xmlns:a16="http://schemas.microsoft.com/office/drawing/2014/main" id="{6B8DB143-8C80-49B4-A0D0-1651A66A9B78}"/>
+                <a16:creationId xmlns:a16="http://schemas.microsoft.com/office/drawing/2014/main" id="{658B9630-BDA8-4960-8745-7AB8F73EE4F6}"/>
               </a:ext>
             </a:extLst>
           </p:cNvPr>
@@ -25209,38 +25245,8 @@
         </p:blipFill>
         <p:spPr>
           <a:xfrm>
-            <a:off x="998925" y="995514"/>
-            <a:ext cx="4133850" cy="3967163"/>
-          </a:xfrm>
-          <a:prstGeom prst="rect">
-            <a:avLst/>
-          </a:prstGeom>
-        </p:spPr>
-      </p:pic>
-      <p:pic>
-        <p:nvPicPr>
-          <p:cNvPr id="8" name="Picture 7">
-            <a:extLst>
-              <a:ext uri="{FF2B5EF4-FFF2-40B4-BE49-F238E27FC236}">
-                <a16:creationId xmlns:a16="http://schemas.microsoft.com/office/drawing/2014/main" id="{A7E7C113-017F-4D7E-84D6-7C41295CD3C6}"/>
-              </a:ext>
-            </a:extLst>
-          </p:cNvPr>
-          <p:cNvPicPr>
-            <a:picLocks noChangeAspect="1"/>
-          </p:cNvPicPr>
-          <p:nvPr/>
-        </p:nvPicPr>
-        <p:blipFill>
-          <a:blip r:embed="rId3"/>
-          <a:stretch>
-            <a:fillRect/>
-          </a:stretch>
-        </p:blipFill>
-        <p:spPr>
-          <a:xfrm>
-            <a:off x="567812" y="4968483"/>
-            <a:ext cx="5181600" cy="1462088"/>
+            <a:off x="599494" y="1188927"/>
+            <a:ext cx="6827808" cy="5198806"/>
           </a:xfrm>
           <a:prstGeom prst="rect">
             <a:avLst/>
@@ -25250,7 +25256,7 @@
     </p:spTree>
     <p:extLst>
       <p:ext uri="{BB962C8B-B14F-4D97-AF65-F5344CB8AC3E}">
-        <p14:creationId xmlns:p14="http://schemas.microsoft.com/office/powerpoint/2010/main" val="1958881048"/>
+        <p14:creationId xmlns:p14="http://schemas.microsoft.com/office/powerpoint/2010/main" val="2772977335"/>
       </p:ext>
     </p:extLst>
   </p:cSld>
@@ -25285,6 +25291,164 @@
           <p:cNvPr id="2" name="Title 1">
             <a:extLst>
               <a:ext uri="{FF2B5EF4-FFF2-40B4-BE49-F238E27FC236}">
+                <a16:creationId xmlns:a16="http://schemas.microsoft.com/office/drawing/2014/main" id="{19190722-C8C0-476E-BA3D-5413CD8FFB94}"/>
+              </a:ext>
+            </a:extLst>
+          </p:cNvPr>
+          <p:cNvSpPr>
+            <a:spLocks noGrp="1"/>
+          </p:cNvSpPr>
+          <p:nvPr>
+            <p:ph type="title"/>
+          </p:nvPr>
+        </p:nvSpPr>
+        <p:spPr/>
+        <p:txBody>
+          <a:bodyPr/>
+          <a:lstStyle/>
+          <a:p>
+            <a:r>
+              <a:rPr lang="en-US" dirty="0"/>
+              <a:t>Figure 5: Added (a) molecule depiction</a:t>
+            </a:r>
+          </a:p>
+        </p:txBody>
+      </p:sp>
+      <p:sp>
+        <p:nvSpPr>
+          <p:cNvPr id="4" name="Slide Number Placeholder 3">
+            <a:extLst>
+              <a:ext uri="{FF2B5EF4-FFF2-40B4-BE49-F238E27FC236}">
+                <a16:creationId xmlns:a16="http://schemas.microsoft.com/office/drawing/2014/main" id="{64083F5E-5CCD-49C7-93A7-816FF3AA87F0}"/>
+              </a:ext>
+            </a:extLst>
+          </p:cNvPr>
+          <p:cNvSpPr>
+            <a:spLocks noGrp="1"/>
+          </p:cNvSpPr>
+          <p:nvPr>
+            <p:ph type="sldNum" sz="quarter" idx="11"/>
+          </p:nvPr>
+        </p:nvSpPr>
+        <p:spPr/>
+        <p:txBody>
+          <a:bodyPr/>
+          <a:lstStyle/>
+          <a:p>
+            <a:r>
+              <a:rPr lang="en-US">
+                <a:solidFill>
+                  <a:srgbClr val="9A8B7D"/>
+                </a:solidFill>
+              </a:rPr>
+              <a:t>&lt;#&gt;</a:t>
+            </a:r>
+            <a:endParaRPr lang="en-US" dirty="0">
+              <a:solidFill>
+                <a:srgbClr val="9A8B7D"/>
+              </a:solidFill>
+            </a:endParaRPr>
+          </a:p>
+        </p:txBody>
+      </p:sp>
+      <p:pic>
+        <p:nvPicPr>
+          <p:cNvPr id="7" name="Picture 6">
+            <a:extLst>
+              <a:ext uri="{FF2B5EF4-FFF2-40B4-BE49-F238E27FC236}">
+                <a16:creationId xmlns:a16="http://schemas.microsoft.com/office/drawing/2014/main" id="{6B8DB143-8C80-49B4-A0D0-1651A66A9B78}"/>
+              </a:ext>
+            </a:extLst>
+          </p:cNvPr>
+          <p:cNvPicPr>
+            <a:picLocks noChangeAspect="1"/>
+          </p:cNvPicPr>
+          <p:nvPr/>
+        </p:nvPicPr>
+        <p:blipFill>
+          <a:blip r:embed="rId2"/>
+          <a:stretch>
+            <a:fillRect/>
+          </a:stretch>
+        </p:blipFill>
+        <p:spPr>
+          <a:xfrm>
+            <a:off x="998925" y="995514"/>
+            <a:ext cx="4133850" cy="3967163"/>
+          </a:xfrm>
+          <a:prstGeom prst="rect">
+            <a:avLst/>
+          </a:prstGeom>
+        </p:spPr>
+      </p:pic>
+      <p:pic>
+        <p:nvPicPr>
+          <p:cNvPr id="8" name="Picture 7">
+            <a:extLst>
+              <a:ext uri="{FF2B5EF4-FFF2-40B4-BE49-F238E27FC236}">
+                <a16:creationId xmlns:a16="http://schemas.microsoft.com/office/drawing/2014/main" id="{A7E7C113-017F-4D7E-84D6-7C41295CD3C6}"/>
+              </a:ext>
+            </a:extLst>
+          </p:cNvPr>
+          <p:cNvPicPr>
+            <a:picLocks noChangeAspect="1"/>
+          </p:cNvPicPr>
+          <p:nvPr/>
+        </p:nvPicPr>
+        <p:blipFill>
+          <a:blip r:embed="rId3"/>
+          <a:stretch>
+            <a:fillRect/>
+          </a:stretch>
+        </p:blipFill>
+        <p:spPr>
+          <a:xfrm>
+            <a:off x="567812" y="4968483"/>
+            <a:ext cx="5181600" cy="1462088"/>
+          </a:xfrm>
+          <a:prstGeom prst="rect">
+            <a:avLst/>
+          </a:prstGeom>
+        </p:spPr>
+      </p:pic>
+    </p:spTree>
+    <p:extLst>
+      <p:ext uri="{BB962C8B-B14F-4D97-AF65-F5344CB8AC3E}">
+        <p14:creationId xmlns:p14="http://schemas.microsoft.com/office/powerpoint/2010/main" val="1958881048"/>
+      </p:ext>
+    </p:extLst>
+  </p:cSld>
+  <p:clrMapOvr>
+    <a:masterClrMapping/>
+  </p:clrMapOvr>
+  <p:transition>
+    <p:random/>
+  </p:transition>
+</p:sld>
+</file>
+
+<file path=ppt/slides/slide7.xml><?xml version="1.0" encoding="utf-8"?>
+<p:sld xmlns:a="http://schemas.openxmlformats.org/drawingml/2006/main" xmlns:r="http://schemas.openxmlformats.org/officeDocument/2006/relationships" xmlns:p="http://schemas.openxmlformats.org/presentationml/2006/main">
+  <p:cSld>
+    <p:spTree>
+      <p:nvGrpSpPr>
+        <p:cNvPr id="1" name=""/>
+        <p:cNvGrpSpPr/>
+        <p:nvPr/>
+      </p:nvGrpSpPr>
+      <p:grpSpPr>
+        <a:xfrm>
+          <a:off x="0" y="0"/>
+          <a:ext cx="0" cy="0"/>
+          <a:chOff x="0" y="0"/>
+          <a:chExt cx="0" cy="0"/>
+        </a:xfrm>
+      </p:grpSpPr>
+      <p:sp>
+        <p:nvSpPr>
+          <p:cNvPr id="2" name="Title 1">
+            <a:extLst>
+              <a:ext uri="{FF2B5EF4-FFF2-40B4-BE49-F238E27FC236}">
                 <a16:creationId xmlns:a16="http://schemas.microsoft.com/office/drawing/2014/main" id="{101AE10D-2E5A-4DCC-8E5D-3CA6FCEFE44F}"/>
               </a:ext>
             </a:extLst>
@@ -25416,7 +25580,7 @@
 </p:sld>
 </file>
 
-<file path=ppt/slides/slide7.xml><?xml version="1.0" encoding="utf-8"?>
+<file path=ppt/slides/slide8.xml><?xml version="1.0" encoding="utf-8"?>
 <p:sld xmlns:a="http://schemas.openxmlformats.org/drawingml/2006/main" xmlns:r="http://schemas.openxmlformats.org/officeDocument/2006/relationships" xmlns:p="http://schemas.openxmlformats.org/presentationml/2006/main">
   <p:cSld>
     <p:spTree>
@@ -25511,7 +25675,7 @@
                 </a:solidFill>
               </a:rPr>
               <a:pPr/>
-              <a:t>7</a:t>
+              <a:t>8</a:t>
             </a:fld>
             <a:endParaRPr lang="en-US">
               <a:solidFill>
@@ -25842,7 +26006,7 @@
 </p:sld>
 </file>
 
-<file path=ppt/slides/slide8.xml><?xml version="1.0" encoding="utf-8"?>
+<file path=ppt/slides/slide9.xml><?xml version="1.0" encoding="utf-8"?>
 <p:sld xmlns:a="http://schemas.openxmlformats.org/drawingml/2006/main" xmlns:r="http://schemas.openxmlformats.org/officeDocument/2006/relationships" xmlns:p="http://schemas.openxmlformats.org/presentationml/2006/main">
   <p:cSld>
     <p:spTree>
@@ -25908,7 +26072,7 @@
                 </a:solidFill>
               </a:rPr>
               <a:pPr/>
-              <a:t>8</a:t>
+              <a:t>9</a:t>
             </a:fld>
             <a:endParaRPr lang="en-US">
               <a:solidFill>
@@ -25984,7 +26148,7 @@
         </p:blipFill>
         <p:spPr>
           <a:xfrm>
-            <a:off x="119271" y="2432585"/>
+            <a:off x="636106" y="2432585"/>
             <a:ext cx="408101" cy="652959"/>
           </a:xfrm>
           <a:prstGeom prst="rect">
@@ -26315,265 +26479,6 @@
     <a:masterClrMapping/>
   </p:clrMapOvr>
   <p:transition/>
-</p:sld>
-</file>
-
-<file path=ppt/slides/slide9.xml><?xml version="1.0" encoding="utf-8"?>
-<p:sld xmlns:a="http://schemas.openxmlformats.org/drawingml/2006/main" xmlns:r="http://schemas.openxmlformats.org/officeDocument/2006/relationships" xmlns:p="http://schemas.openxmlformats.org/presentationml/2006/main">
-  <p:cSld>
-    <p:spTree>
-      <p:nvGrpSpPr>
-        <p:cNvPr id="1" name=""/>
-        <p:cNvGrpSpPr/>
-        <p:nvPr/>
-      </p:nvGrpSpPr>
-      <p:grpSpPr>
-        <a:xfrm>
-          <a:off x="0" y="0"/>
-          <a:ext cx="0" cy="0"/>
-          <a:chOff x="0" y="0"/>
-          <a:chExt cx="0" cy="0"/>
-        </a:xfrm>
-      </p:grpSpPr>
-      <p:sp>
-        <p:nvSpPr>
-          <p:cNvPr id="2" name="Title 1">
-            <a:extLst>
-              <a:ext uri="{FF2B5EF4-FFF2-40B4-BE49-F238E27FC236}">
-                <a16:creationId xmlns:a16="http://schemas.microsoft.com/office/drawing/2014/main" id="{A82C809E-055D-4E26-A5A7-2A1E00CE0C8E}"/>
-              </a:ext>
-            </a:extLst>
-          </p:cNvPr>
-          <p:cNvSpPr>
-            <a:spLocks noGrp="1"/>
-          </p:cNvSpPr>
-          <p:nvPr>
-            <p:ph type="title"/>
-          </p:nvPr>
-        </p:nvSpPr>
-        <p:spPr/>
-        <p:txBody>
-          <a:bodyPr/>
-          <a:lstStyle/>
-          <a:p>
-            <a:r>
-              <a:rPr lang="en-US" dirty="0"/>
-              <a:t>Stats bar charts</a:t>
-            </a:r>
-          </a:p>
-        </p:txBody>
-      </p:sp>
-      <p:sp>
-        <p:nvSpPr>
-          <p:cNvPr id="4" name="Text Placeholder 3">
-            <a:extLst>
-              <a:ext uri="{FF2B5EF4-FFF2-40B4-BE49-F238E27FC236}">
-                <a16:creationId xmlns:a16="http://schemas.microsoft.com/office/drawing/2014/main" id="{4E852665-AB70-4696-993E-2D749D674B4D}"/>
-              </a:ext>
-            </a:extLst>
-          </p:cNvPr>
-          <p:cNvSpPr>
-            <a:spLocks noGrp="1"/>
-          </p:cNvSpPr>
-          <p:nvPr>
-            <p:ph type="body" sz="quarter" idx="14"/>
-          </p:nvPr>
-        </p:nvSpPr>
-        <p:spPr/>
-        <p:txBody>
-          <a:bodyPr/>
-          <a:lstStyle/>
-          <a:p>
-            <a:endParaRPr lang="en-US"/>
-          </a:p>
-        </p:txBody>
-      </p:sp>
-      <p:sp>
-        <p:nvSpPr>
-          <p:cNvPr id="5" name="Slide Number Placeholder 4">
-            <a:extLst>
-              <a:ext uri="{FF2B5EF4-FFF2-40B4-BE49-F238E27FC236}">
-                <a16:creationId xmlns:a16="http://schemas.microsoft.com/office/drawing/2014/main" id="{439173BD-33EA-42B3-B778-ADD631ABB78A}"/>
-              </a:ext>
-            </a:extLst>
-          </p:cNvPr>
-          <p:cNvSpPr>
-            <a:spLocks noGrp="1"/>
-          </p:cNvSpPr>
-          <p:nvPr>
-            <p:ph type="sldNum" sz="quarter" idx="17"/>
-          </p:nvPr>
-        </p:nvSpPr>
-        <p:spPr/>
-        <p:txBody>
-          <a:bodyPr/>
-          <a:lstStyle/>
-          <a:p>
-            <a:fld id="{0A838F34-1B32-4019-A24D-EF473E6901BC}" type="slidenum">
-              <a:rPr lang="en-US" smtClean="0">
-                <a:solidFill>
-                  <a:srgbClr val="9A8B7D"/>
-                </a:solidFill>
-              </a:rPr>
-              <a:pPr/>
-              <a:t>9</a:t>
-            </a:fld>
-            <a:endParaRPr lang="en-US">
-              <a:solidFill>
-                <a:srgbClr val="9A8B7D"/>
-              </a:solidFill>
-            </a:endParaRPr>
-          </a:p>
-        </p:txBody>
-      </p:sp>
-      <p:pic>
-        <p:nvPicPr>
-          <p:cNvPr id="7" name="Picture 6">
-            <a:extLst>
-              <a:ext uri="{FF2B5EF4-FFF2-40B4-BE49-F238E27FC236}">
-                <a16:creationId xmlns:a16="http://schemas.microsoft.com/office/drawing/2014/main" id="{5D071394-E259-4091-BEB8-D965BBEF15C2}"/>
-              </a:ext>
-            </a:extLst>
-          </p:cNvPr>
-          <p:cNvPicPr>
-            <a:picLocks noChangeAspect="1"/>
-          </p:cNvPicPr>
-          <p:nvPr/>
-        </p:nvPicPr>
-        <p:blipFill rotWithShape="1">
-          <a:blip r:embed="rId2"/>
-          <a:srcRect l="9581" r="24510"/>
-          <a:stretch/>
-        </p:blipFill>
-        <p:spPr>
-          <a:xfrm>
-            <a:off x="2206156" y="1100738"/>
-            <a:ext cx="5649734" cy="2561336"/>
-          </a:xfrm>
-          <a:prstGeom prst="rect">
-            <a:avLst/>
-          </a:prstGeom>
-        </p:spPr>
-      </p:pic>
-      <p:sp>
-        <p:nvSpPr>
-          <p:cNvPr id="9" name="TextBox 8">
-            <a:extLst>
-              <a:ext uri="{FF2B5EF4-FFF2-40B4-BE49-F238E27FC236}">
-                <a16:creationId xmlns:a16="http://schemas.microsoft.com/office/drawing/2014/main" id="{C065B58C-CD0D-4B7A-9D42-D31593D6933C}"/>
-              </a:ext>
-            </a:extLst>
-          </p:cNvPr>
-          <p:cNvSpPr txBox="1"/>
-          <p:nvPr/>
-        </p:nvSpPr>
-        <p:spPr>
-          <a:xfrm rot="16200000">
-            <a:off x="904018" y="1684148"/>
-            <a:ext cx="2154804" cy="400110"/>
-          </a:xfrm>
-          <a:prstGeom prst="rect">
-            <a:avLst/>
-          </a:prstGeom>
-          <a:noFill/>
-        </p:spPr>
-        <p:txBody>
-          <a:bodyPr wrap="square" rtlCol="0">
-            <a:spAutoFit/>
-          </a:bodyPr>
-          <a:lstStyle/>
-          <a:p>
-            <a:pPr>
-              <a:buClr>
-                <a:schemeClr val="tx1"/>
-              </a:buClr>
-            </a:pPr>
-            <a:r>
-              <a:rPr lang="en-US" sz="2000" dirty="0"/>
-              <a:t># molecules</a:t>
-            </a:r>
-          </a:p>
-        </p:txBody>
-      </p:sp>
-      <p:sp>
-        <p:nvSpPr>
-          <p:cNvPr id="10" name="TextBox 9">
-            <a:extLst>
-              <a:ext uri="{FF2B5EF4-FFF2-40B4-BE49-F238E27FC236}">
-                <a16:creationId xmlns:a16="http://schemas.microsoft.com/office/drawing/2014/main" id="{7E9563D7-FD9C-447C-93BB-F90D4739C30A}"/>
-              </a:ext>
-            </a:extLst>
-          </p:cNvPr>
-          <p:cNvSpPr txBox="1"/>
-          <p:nvPr/>
-        </p:nvSpPr>
-        <p:spPr>
-          <a:xfrm rot="16200000">
-            <a:off x="904018" y="4204712"/>
-            <a:ext cx="2154804" cy="400110"/>
-          </a:xfrm>
-          <a:prstGeom prst="rect">
-            <a:avLst/>
-          </a:prstGeom>
-          <a:noFill/>
-        </p:spPr>
-        <p:txBody>
-          <a:bodyPr wrap="square" rtlCol="0">
-            <a:spAutoFit/>
-          </a:bodyPr>
-          <a:lstStyle/>
-          <a:p>
-            <a:pPr>
-              <a:buClr>
-                <a:schemeClr val="tx1"/>
-              </a:buClr>
-            </a:pPr>
-            <a:r>
-              <a:rPr lang="en-US" sz="2000" dirty="0"/>
-              <a:t># molecules</a:t>
-            </a:r>
-          </a:p>
-        </p:txBody>
-      </p:sp>
-      <p:pic>
-        <p:nvPicPr>
-          <p:cNvPr id="12" name="Picture 11">
-            <a:extLst>
-              <a:ext uri="{FF2B5EF4-FFF2-40B4-BE49-F238E27FC236}">
-                <a16:creationId xmlns:a16="http://schemas.microsoft.com/office/drawing/2014/main" id="{54DBEF6F-BEBF-4888-BE5E-712455B600BE}"/>
-              </a:ext>
-            </a:extLst>
-          </p:cNvPr>
-          <p:cNvPicPr>
-            <a:picLocks noChangeAspect="1"/>
-          </p:cNvPicPr>
-          <p:nvPr/>
-        </p:nvPicPr>
-        <p:blipFill rotWithShape="1">
-          <a:blip r:embed="rId3"/>
-          <a:srcRect l="10006" r="25193"/>
-          <a:stretch/>
-        </p:blipFill>
-        <p:spPr>
-          <a:xfrm>
-            <a:off x="2183845" y="3646173"/>
-            <a:ext cx="5462547" cy="2600325"/>
-          </a:xfrm>
-          <a:prstGeom prst="rect">
-            <a:avLst/>
-          </a:prstGeom>
-        </p:spPr>
-      </p:pic>
-    </p:spTree>
-    <p:extLst>
-      <p:ext uri="{BB962C8B-B14F-4D97-AF65-F5344CB8AC3E}">
-        <p14:creationId xmlns:p14="http://schemas.microsoft.com/office/powerpoint/2010/main" val="892661274"/>
-      </p:ext>
-    </p:extLst>
-  </p:cSld>
-  <p:clrMapOvr>
-    <a:masterClrMapping/>
-  </p:clrMapOvr>
 </p:sld>
 </file>
 

</xml_diff>

<commit_message>
weekend of 6/23 changes Sunday AM - structures done
</commit_message>
<xml_diff>
--- a/pres/DBandyopadhyay_FigChanges_eLNB_revision_2019.pptx
+++ b/pres/DBandyopadhyay_FigChanges_eLNB_revision_2019.pptx
@@ -8,19 +8,15 @@
     <p:sldMasterId id="2147483712" r:id="rId4"/>
   </p:sldMasterIdLst>
   <p:notesMasterIdLst>
-    <p:notesMasterId r:id="rId15"/>
+    <p:notesMasterId r:id="rId11"/>
   </p:notesMasterIdLst>
   <p:sldIdLst>
     <p:sldId id="256" r:id="rId5"/>
     <p:sldId id="303" r:id="rId6"/>
     <p:sldId id="279" r:id="rId7"/>
-    <p:sldId id="297" r:id="rId8"/>
-    <p:sldId id="298" r:id="rId9"/>
-    <p:sldId id="299" r:id="rId10"/>
-    <p:sldId id="300" r:id="rId11"/>
-    <p:sldId id="259" r:id="rId12"/>
-    <p:sldId id="302" r:id="rId13"/>
-    <p:sldId id="301" r:id="rId14"/>
+    <p:sldId id="259" r:id="rId8"/>
+    <p:sldId id="302" r:id="rId9"/>
+    <p:sldId id="301" r:id="rId10"/>
   </p:sldIdLst>
   <p:sldSz cx="9144000" cy="6858000" type="screen4x3"/>
   <p:notesSz cx="6858000" cy="9144000"/>
@@ -221,7 +217,7 @@
             <a:fld id="{BCD41C7E-9E99-465F-BA13-33F82FBE97E5}" type="datetimeFigureOut">
               <a:rPr lang="en-US" smtClean="0"/>
               <a:pPr/>
-              <a:t>6/17/2019</a:t>
+              <a:t>6/23/2019</a:t>
             </a:fld>
             <a:endParaRPr lang="en-US"/>
           </a:p>
@@ -757,7 +753,7 @@
                 </a:solidFill>
               </a:rPr>
               <a:pPr/>
-              <a:t>8</a:t>
+              <a:t>4</a:t>
             </a:fld>
             <a:endParaRPr lang="en-US">
               <a:solidFill>
@@ -1066,7 +1062,7 @@
             <a:fld id="{4B3D3EAA-4720-4AEB-A041-FA3C86592F29}" type="datetimeFigureOut">
               <a:rPr lang="en-US" smtClean="0"/>
               <a:pPr/>
-              <a:t>6/17/2019</a:t>
+              <a:t>6/23/2019</a:t>
             </a:fld>
             <a:endParaRPr lang="en-US"/>
           </a:p>
@@ -1232,7 +1228,7 @@
             <a:fld id="{4B3D3EAA-4720-4AEB-A041-FA3C86592F29}" type="datetimeFigureOut">
               <a:rPr lang="en-US" smtClean="0"/>
               <a:pPr/>
-              <a:t>6/17/2019</a:t>
+              <a:t>6/23/2019</a:t>
             </a:fld>
             <a:endParaRPr lang="en-US"/>
           </a:p>
@@ -1364,7 +1360,7 @@
             <a:fld id="{4B3D3EAA-4720-4AEB-A041-FA3C86592F29}" type="datetimeFigureOut">
               <a:rPr lang="en-US" smtClean="0"/>
               <a:pPr/>
-              <a:t>6/17/2019</a:t>
+              <a:t>6/23/2019</a:t>
             </a:fld>
             <a:endParaRPr lang="en-US"/>
           </a:p>
@@ -2025,7 +2021,7 @@
             <a:fld id="{4B3D3EAA-4720-4AEB-A041-FA3C86592F29}" type="datetimeFigureOut">
               <a:rPr lang="en-US" smtClean="0"/>
               <a:pPr/>
-              <a:t>6/17/2019</a:t>
+              <a:t>6/23/2019</a:t>
             </a:fld>
             <a:endParaRPr lang="en-US"/>
           </a:p>
@@ -3796,7 +3792,7 @@
             <a:fld id="{4B3D3EAA-4720-4AEB-A041-FA3C86592F29}" type="datetimeFigureOut">
               <a:rPr lang="en-US" smtClean="0"/>
               <a:pPr/>
-              <a:t>6/17/2019</a:t>
+              <a:t>6/23/2019</a:t>
             </a:fld>
             <a:endParaRPr lang="en-US"/>
           </a:p>
@@ -6791,8 +6787,8 @@
 </file>
 
 <file path=ppt/slideLayouts/slideLayout29.xml><?xml version="1.0" encoding="utf-8"?>
-<p:sldLayout xmlns:a="http://schemas.openxmlformats.org/drawingml/2006/main" xmlns:r="http://schemas.openxmlformats.org/officeDocument/2006/relationships" xmlns:p="http://schemas.openxmlformats.org/presentationml/2006/main" type="obj">
-  <p:cSld name="1_Title and Content">
+<p:sldLayout xmlns:a="http://schemas.openxmlformats.org/drawingml/2006/main" xmlns:r="http://schemas.openxmlformats.org/officeDocument/2006/relationships" xmlns:p="http://schemas.openxmlformats.org/presentationml/2006/main" type="objAndTwoObj">
+  <p:cSld name="Title, Content, and 2 Content">
     <p:spTree>
       <p:nvGrpSpPr>
         <p:cNvPr id="1" name=""/>
@@ -6817,7 +6813,12 @@
             <p:ph type="title"/>
           </p:nvPr>
         </p:nvSpPr>
-        <p:spPr/>
+        <p:spPr>
+          <a:xfrm>
+            <a:off x="539749" y="2"/>
+            <a:ext cx="8604251" cy="338554"/>
+          </a:xfrm>
+        </p:spPr>
         <p:txBody>
           <a:bodyPr/>
           <a:lstStyle/>
@@ -6836,10 +6837,15 @@
             <a:spLocks noGrp="1"/>
           </p:cNvSpPr>
           <p:nvPr>
-            <p:ph idx="1"/>
-          </p:nvPr>
-        </p:nvSpPr>
-        <p:spPr/>
+            <p:ph sz="half" idx="1"/>
+          </p:nvPr>
+        </p:nvSpPr>
+        <p:spPr>
+          <a:xfrm>
+            <a:off x="457200" y="1412876"/>
+            <a:ext cx="4038600" cy="5256213"/>
+          </a:xfrm>
+        </p:spPr>
         <p:txBody>
           <a:bodyPr/>
           <a:lstStyle/>
@@ -6882,73 +6888,113 @@
       </p:sp>
       <p:sp>
         <p:nvSpPr>
-          <p:cNvPr id="4" name="Date Placeholder 3"/>
-          <p:cNvSpPr>
-            <a:spLocks noGrp="1"/>
-          </p:cNvSpPr>
-          <p:nvPr>
-            <p:ph type="dt" sz="half" idx="10"/>
-          </p:nvPr>
-        </p:nvSpPr>
-        <p:spPr/>
+          <p:cNvPr id="4" name="Content Placeholder 3"/>
+          <p:cNvSpPr>
+            <a:spLocks noGrp="1"/>
+          </p:cNvSpPr>
+          <p:nvPr>
+            <p:ph sz="quarter" idx="2"/>
+          </p:nvPr>
+        </p:nvSpPr>
+        <p:spPr>
+          <a:xfrm>
+            <a:off x="4648200" y="1412876"/>
+            <a:ext cx="4038600" cy="2551113"/>
+          </a:xfrm>
+        </p:spPr>
         <p:txBody>
           <a:bodyPr/>
           <a:lstStyle/>
           <a:p>
-            <a:endParaRPr lang="en-US">
-              <a:solidFill>
-                <a:srgbClr val="9A8B7D"/>
-              </a:solidFill>
-            </a:endParaRPr>
-          </a:p>
-        </p:txBody>
-      </p:sp>
-      <p:sp>
-        <p:nvSpPr>
-          <p:cNvPr id="5" name="Slide Number Placeholder 4"/>
-          <p:cNvSpPr>
-            <a:spLocks noGrp="1"/>
-          </p:cNvSpPr>
-          <p:nvPr>
-            <p:ph type="sldNum" sz="quarter" idx="11"/>
-          </p:nvPr>
-        </p:nvSpPr>
-        <p:spPr/>
+            <a:pPr lvl="0"/>
+            <a:r>
+              <a:rPr lang="en-US"/>
+              <a:t>Click to edit Master text styles</a:t>
+            </a:r>
+          </a:p>
+          <a:p>
+            <a:pPr lvl="1"/>
+            <a:r>
+              <a:rPr lang="en-US"/>
+              <a:t>Second level</a:t>
+            </a:r>
+          </a:p>
+          <a:p>
+            <a:pPr lvl="2"/>
+            <a:r>
+              <a:rPr lang="en-US"/>
+              <a:t>Third level</a:t>
+            </a:r>
+          </a:p>
+          <a:p>
+            <a:pPr lvl="3"/>
+            <a:r>
+              <a:rPr lang="en-US"/>
+              <a:t>Fourth level</a:t>
+            </a:r>
+          </a:p>
+          <a:p>
+            <a:pPr lvl="4"/>
+            <a:r>
+              <a:rPr lang="en-US"/>
+              <a:t>Fifth level</a:t>
+            </a:r>
+          </a:p>
+        </p:txBody>
+      </p:sp>
+      <p:sp>
+        <p:nvSpPr>
+          <p:cNvPr id="5" name="Content Placeholder 4"/>
+          <p:cNvSpPr>
+            <a:spLocks noGrp="1"/>
+          </p:cNvSpPr>
+          <p:nvPr>
+            <p:ph sz="quarter" idx="3"/>
+          </p:nvPr>
+        </p:nvSpPr>
+        <p:spPr>
+          <a:xfrm>
+            <a:off x="4648200" y="4116389"/>
+            <a:ext cx="4038600" cy="2552700"/>
+          </a:xfrm>
+        </p:spPr>
         <p:txBody>
           <a:bodyPr/>
           <a:lstStyle/>
           <a:p>
-            <a:r>
-              <a:rPr lang="en-US" dirty="0">
-                <a:solidFill>
-                  <a:srgbClr val="9A8B7D"/>
-                </a:solidFill>
-              </a:rPr>
-              <a:t>&lt;#&gt;</a:t>
-            </a:r>
-          </a:p>
-        </p:txBody>
-      </p:sp>
-      <p:sp>
-        <p:nvSpPr>
-          <p:cNvPr id="6" name="Footer Placeholder 5"/>
-          <p:cNvSpPr>
-            <a:spLocks noGrp="1"/>
-          </p:cNvSpPr>
-          <p:nvPr>
-            <p:ph type="ftr" sz="quarter" idx="12"/>
-          </p:nvPr>
-        </p:nvSpPr>
-        <p:spPr/>
-        <p:txBody>
-          <a:bodyPr/>
-          <a:lstStyle/>
-          <a:p>
-            <a:endParaRPr lang="en-US">
-              <a:solidFill>
-                <a:srgbClr val="9A8B7D"/>
-              </a:solidFill>
-            </a:endParaRPr>
+            <a:pPr lvl="0"/>
+            <a:r>
+              <a:rPr lang="en-US"/>
+              <a:t>Click to edit Master text styles</a:t>
+            </a:r>
+          </a:p>
+          <a:p>
+            <a:pPr lvl="1"/>
+            <a:r>
+              <a:rPr lang="en-US"/>
+              <a:t>Second level</a:t>
+            </a:r>
+          </a:p>
+          <a:p>
+            <a:pPr lvl="2"/>
+            <a:r>
+              <a:rPr lang="en-US"/>
+              <a:t>Third level</a:t>
+            </a:r>
+          </a:p>
+          <a:p>
+            <a:pPr lvl="3"/>
+            <a:r>
+              <a:rPr lang="en-US"/>
+              <a:t>Fourth level</a:t>
+            </a:r>
+          </a:p>
+          <a:p>
+            <a:pPr lvl="4"/>
+            <a:r>
+              <a:rPr lang="en-US"/>
+              <a:t>Fifth level</a:t>
+            </a:r>
           </a:p>
         </p:txBody>
       </p:sp>
@@ -6957,9 +7003,7 @@
   <p:clrMapOvr>
     <a:masterClrMapping/>
   </p:clrMapOvr>
-  <p:transition>
-    <p:random/>
-  </p:transition>
+  <p:transition/>
 </p:sldLayout>
 </file>
 
@@ -7191,7 +7235,7 @@
             <a:fld id="{4B3D3EAA-4720-4AEB-A041-FA3C86592F29}" type="datetimeFigureOut">
               <a:rPr lang="en-US" smtClean="0"/>
               <a:pPr/>
-              <a:t>6/17/2019</a:t>
+              <a:t>6/23/2019</a:t>
             </a:fld>
             <a:endParaRPr lang="en-US"/>
           </a:p>
@@ -7254,227 +7298,6 @@
 </file>
 
 <file path=ppt/slideLayouts/slideLayout30.xml><?xml version="1.0" encoding="utf-8"?>
-<p:sldLayout xmlns:a="http://schemas.openxmlformats.org/drawingml/2006/main" xmlns:r="http://schemas.openxmlformats.org/officeDocument/2006/relationships" xmlns:p="http://schemas.openxmlformats.org/presentationml/2006/main" type="objAndTwoObj">
-  <p:cSld name="Title, Content, and 2 Content">
-    <p:spTree>
-      <p:nvGrpSpPr>
-        <p:cNvPr id="1" name=""/>
-        <p:cNvGrpSpPr/>
-        <p:nvPr/>
-      </p:nvGrpSpPr>
-      <p:grpSpPr>
-        <a:xfrm>
-          <a:off x="0" y="0"/>
-          <a:ext cx="0" cy="0"/>
-          <a:chOff x="0" y="0"/>
-          <a:chExt cx="0" cy="0"/>
-        </a:xfrm>
-      </p:grpSpPr>
-      <p:sp>
-        <p:nvSpPr>
-          <p:cNvPr id="2" name="Title 1"/>
-          <p:cNvSpPr>
-            <a:spLocks noGrp="1"/>
-          </p:cNvSpPr>
-          <p:nvPr>
-            <p:ph type="title"/>
-          </p:nvPr>
-        </p:nvSpPr>
-        <p:spPr>
-          <a:xfrm>
-            <a:off x="539749" y="2"/>
-            <a:ext cx="8604251" cy="338554"/>
-          </a:xfrm>
-        </p:spPr>
-        <p:txBody>
-          <a:bodyPr/>
-          <a:lstStyle/>
-          <a:p>
-            <a:r>
-              <a:rPr lang="en-US"/>
-              <a:t>Click to edit Master title style</a:t>
-            </a:r>
-          </a:p>
-        </p:txBody>
-      </p:sp>
-      <p:sp>
-        <p:nvSpPr>
-          <p:cNvPr id="3" name="Content Placeholder 2"/>
-          <p:cNvSpPr>
-            <a:spLocks noGrp="1"/>
-          </p:cNvSpPr>
-          <p:nvPr>
-            <p:ph sz="half" idx="1"/>
-          </p:nvPr>
-        </p:nvSpPr>
-        <p:spPr>
-          <a:xfrm>
-            <a:off x="457200" y="1412876"/>
-            <a:ext cx="4038600" cy="5256213"/>
-          </a:xfrm>
-        </p:spPr>
-        <p:txBody>
-          <a:bodyPr/>
-          <a:lstStyle/>
-          <a:p>
-            <a:pPr lvl="0"/>
-            <a:r>
-              <a:rPr lang="en-US"/>
-              <a:t>Click to edit Master text styles</a:t>
-            </a:r>
-          </a:p>
-          <a:p>
-            <a:pPr lvl="1"/>
-            <a:r>
-              <a:rPr lang="en-US"/>
-              <a:t>Second level</a:t>
-            </a:r>
-          </a:p>
-          <a:p>
-            <a:pPr lvl="2"/>
-            <a:r>
-              <a:rPr lang="en-US"/>
-              <a:t>Third level</a:t>
-            </a:r>
-          </a:p>
-          <a:p>
-            <a:pPr lvl="3"/>
-            <a:r>
-              <a:rPr lang="en-US"/>
-              <a:t>Fourth level</a:t>
-            </a:r>
-          </a:p>
-          <a:p>
-            <a:pPr lvl="4"/>
-            <a:r>
-              <a:rPr lang="en-US"/>
-              <a:t>Fifth level</a:t>
-            </a:r>
-          </a:p>
-        </p:txBody>
-      </p:sp>
-      <p:sp>
-        <p:nvSpPr>
-          <p:cNvPr id="4" name="Content Placeholder 3"/>
-          <p:cNvSpPr>
-            <a:spLocks noGrp="1"/>
-          </p:cNvSpPr>
-          <p:nvPr>
-            <p:ph sz="quarter" idx="2"/>
-          </p:nvPr>
-        </p:nvSpPr>
-        <p:spPr>
-          <a:xfrm>
-            <a:off x="4648200" y="1412876"/>
-            <a:ext cx="4038600" cy="2551113"/>
-          </a:xfrm>
-        </p:spPr>
-        <p:txBody>
-          <a:bodyPr/>
-          <a:lstStyle/>
-          <a:p>
-            <a:pPr lvl="0"/>
-            <a:r>
-              <a:rPr lang="en-US"/>
-              <a:t>Click to edit Master text styles</a:t>
-            </a:r>
-          </a:p>
-          <a:p>
-            <a:pPr lvl="1"/>
-            <a:r>
-              <a:rPr lang="en-US"/>
-              <a:t>Second level</a:t>
-            </a:r>
-          </a:p>
-          <a:p>
-            <a:pPr lvl="2"/>
-            <a:r>
-              <a:rPr lang="en-US"/>
-              <a:t>Third level</a:t>
-            </a:r>
-          </a:p>
-          <a:p>
-            <a:pPr lvl="3"/>
-            <a:r>
-              <a:rPr lang="en-US"/>
-              <a:t>Fourth level</a:t>
-            </a:r>
-          </a:p>
-          <a:p>
-            <a:pPr lvl="4"/>
-            <a:r>
-              <a:rPr lang="en-US"/>
-              <a:t>Fifth level</a:t>
-            </a:r>
-          </a:p>
-        </p:txBody>
-      </p:sp>
-      <p:sp>
-        <p:nvSpPr>
-          <p:cNvPr id="5" name="Content Placeholder 4"/>
-          <p:cNvSpPr>
-            <a:spLocks noGrp="1"/>
-          </p:cNvSpPr>
-          <p:nvPr>
-            <p:ph sz="quarter" idx="3"/>
-          </p:nvPr>
-        </p:nvSpPr>
-        <p:spPr>
-          <a:xfrm>
-            <a:off x="4648200" y="4116389"/>
-            <a:ext cx="4038600" cy="2552700"/>
-          </a:xfrm>
-        </p:spPr>
-        <p:txBody>
-          <a:bodyPr/>
-          <a:lstStyle/>
-          <a:p>
-            <a:pPr lvl="0"/>
-            <a:r>
-              <a:rPr lang="en-US"/>
-              <a:t>Click to edit Master text styles</a:t>
-            </a:r>
-          </a:p>
-          <a:p>
-            <a:pPr lvl="1"/>
-            <a:r>
-              <a:rPr lang="en-US"/>
-              <a:t>Second level</a:t>
-            </a:r>
-          </a:p>
-          <a:p>
-            <a:pPr lvl="2"/>
-            <a:r>
-              <a:rPr lang="en-US"/>
-              <a:t>Third level</a:t>
-            </a:r>
-          </a:p>
-          <a:p>
-            <a:pPr lvl="3"/>
-            <a:r>
-              <a:rPr lang="en-US"/>
-              <a:t>Fourth level</a:t>
-            </a:r>
-          </a:p>
-          <a:p>
-            <a:pPr lvl="4"/>
-            <a:r>
-              <a:rPr lang="en-US"/>
-              <a:t>Fifth level</a:t>
-            </a:r>
-          </a:p>
-        </p:txBody>
-      </p:sp>
-    </p:spTree>
-  </p:cSld>
-  <p:clrMapOvr>
-    <a:masterClrMapping/>
-  </p:clrMapOvr>
-  <p:transition/>
-</p:sldLayout>
-</file>
-
-<file path=ppt/slideLayouts/slideLayout31.xml><?xml version="1.0" encoding="utf-8"?>
 <p:sldLayout xmlns:a="http://schemas.openxmlformats.org/drawingml/2006/main" xmlns:r="http://schemas.openxmlformats.org/officeDocument/2006/relationships" xmlns:p="http://schemas.openxmlformats.org/presentationml/2006/main" type="twoObj">
   <p:cSld name="1_Two Content">
     <p:spTree>
@@ -7689,7 +7512,7 @@
 </p:sldLayout>
 </file>
 
-<file path=ppt/slideLayouts/slideLayout32.xml><?xml version="1.0" encoding="utf-8"?>
+<file path=ppt/slideLayouts/slideLayout31.xml><?xml version="1.0" encoding="utf-8"?>
 <p:sldLayout xmlns:a="http://schemas.openxmlformats.org/drawingml/2006/main" xmlns:r="http://schemas.openxmlformats.org/officeDocument/2006/relationships" xmlns:p="http://schemas.openxmlformats.org/presentationml/2006/main" showMasterSp="0" preserve="1">
   <p:cSld name="Title Slide">
     <p:spTree>
@@ -8021,7 +7844,7 @@
 </p:sldLayout>
 </file>
 
-<file path=ppt/slideLayouts/slideLayout33.xml><?xml version="1.0" encoding="utf-8"?>
+<file path=ppt/slideLayouts/slideLayout32.xml><?xml version="1.0" encoding="utf-8"?>
 <p:sldLayout xmlns:a="http://schemas.openxmlformats.org/drawingml/2006/main" xmlns:r="http://schemas.openxmlformats.org/officeDocument/2006/relationships" xmlns:p="http://schemas.openxmlformats.org/presentationml/2006/main" preserve="1">
   <p:cSld name="Title and Content">
     <p:spTree>
@@ -8353,7 +8176,7 @@
 </p:sldLayout>
 </file>
 
-<file path=ppt/slideLayouts/slideLayout34.xml><?xml version="1.0" encoding="utf-8"?>
+<file path=ppt/slideLayouts/slideLayout33.xml><?xml version="1.0" encoding="utf-8"?>
 <p:sldLayout xmlns:a="http://schemas.openxmlformats.org/drawingml/2006/main" xmlns:r="http://schemas.openxmlformats.org/officeDocument/2006/relationships" xmlns:p="http://schemas.openxmlformats.org/presentationml/2006/main" preserve="1">
   <p:cSld name="Title and Content with Subheading">
     <p:spTree>
@@ -8707,7 +8530,7 @@
 </p:sldLayout>
 </file>
 
-<file path=ppt/slideLayouts/slideLayout35.xml><?xml version="1.0" encoding="utf-8"?>
+<file path=ppt/slideLayouts/slideLayout34.xml><?xml version="1.0" encoding="utf-8"?>
 <p:sldLayout xmlns:a="http://schemas.openxmlformats.org/drawingml/2006/main" xmlns:r="http://schemas.openxmlformats.org/officeDocument/2006/relationships" xmlns:p="http://schemas.openxmlformats.org/presentationml/2006/main" preserve="1">
   <p:cSld name="Large Bullet">
     <p:spTree>
@@ -9019,7 +8842,7 @@
 </p:sldLayout>
 </file>
 
-<file path=ppt/slideLayouts/slideLayout36.xml><?xml version="1.0" encoding="utf-8"?>
+<file path=ppt/slideLayouts/slideLayout35.xml><?xml version="1.0" encoding="utf-8"?>
 <p:sldLayout xmlns:a="http://schemas.openxmlformats.org/drawingml/2006/main" xmlns:r="http://schemas.openxmlformats.org/officeDocument/2006/relationships" xmlns:p="http://schemas.openxmlformats.org/presentationml/2006/main" showMasterSp="0" preserve="1">
   <p:cSld name="Section Header or Statement">
     <p:spTree>
@@ -9345,7 +9168,7 @@
 </p:sldLayout>
 </file>
 
-<file path=ppt/slideLayouts/slideLayout37.xml><?xml version="1.0" encoding="utf-8"?>
+<file path=ppt/slideLayouts/slideLayout36.xml><?xml version="1.0" encoding="utf-8"?>
 <p:sldLayout xmlns:a="http://schemas.openxmlformats.org/drawingml/2006/main" xmlns:r="http://schemas.openxmlformats.org/officeDocument/2006/relationships" xmlns:p="http://schemas.openxmlformats.org/presentationml/2006/main" preserve="1">
   <p:cSld name="Two Content">
     <p:spTree>
@@ -9749,7 +9572,7 @@
 </p:sldLayout>
 </file>
 
-<file path=ppt/slideLayouts/slideLayout38.xml><?xml version="1.0" encoding="utf-8"?>
+<file path=ppt/slideLayouts/slideLayout37.xml><?xml version="1.0" encoding="utf-8"?>
 <p:sldLayout xmlns:a="http://schemas.openxmlformats.org/drawingml/2006/main" xmlns:r="http://schemas.openxmlformats.org/officeDocument/2006/relationships" xmlns:p="http://schemas.openxmlformats.org/presentationml/2006/main" preserve="1">
   <p:cSld name="Comparison">
     <p:spTree>
@@ -10355,7 +10178,7 @@
 </p:sldLayout>
 </file>
 
-<file path=ppt/slideLayouts/slideLayout39.xml><?xml version="1.0" encoding="utf-8"?>
+<file path=ppt/slideLayouts/slideLayout38.xml><?xml version="1.0" encoding="utf-8"?>
 <p:sldLayout xmlns:a="http://schemas.openxmlformats.org/drawingml/2006/main" xmlns:r="http://schemas.openxmlformats.org/officeDocument/2006/relationships" xmlns:p="http://schemas.openxmlformats.org/presentationml/2006/main" preserve="1">
   <p:cSld name="Video Standard (4x3)">
     <p:spTree>
@@ -10578,6 +10401,238 @@
     <p:extLst>
       <p:ext uri="{BB962C8B-B14F-4D97-AF65-F5344CB8AC3E}">
         <p14:creationId xmlns:p14="http://schemas.microsoft.com/office/powerpoint/2010/main" val="2851349190"/>
+      </p:ext>
+    </p:extLst>
+  </p:cSld>
+  <p:clrMapOvr>
+    <a:masterClrMapping/>
+  </p:clrMapOvr>
+</p:sldLayout>
+</file>
+
+<file path=ppt/slideLayouts/slideLayout39.xml><?xml version="1.0" encoding="utf-8"?>
+<p:sldLayout xmlns:a="http://schemas.openxmlformats.org/drawingml/2006/main" xmlns:r="http://schemas.openxmlformats.org/officeDocument/2006/relationships" xmlns:p="http://schemas.openxmlformats.org/presentationml/2006/main" preserve="1">
+  <p:cSld name="Video Widescreen (16 x 9)">
+    <p:spTree>
+      <p:nvGrpSpPr>
+        <p:cNvPr id="1" name=""/>
+        <p:cNvGrpSpPr/>
+        <p:nvPr/>
+      </p:nvGrpSpPr>
+      <p:grpSpPr>
+        <a:xfrm>
+          <a:off x="0" y="0"/>
+          <a:ext cx="0" cy="0"/>
+          <a:chOff x="0" y="0"/>
+          <a:chExt cx="0" cy="0"/>
+        </a:xfrm>
+      </p:grpSpPr>
+      <p:sp>
+        <p:nvSpPr>
+          <p:cNvPr id="5" name="Media Placeholder 5"/>
+          <p:cNvSpPr>
+            <a:spLocks noGrp="1" noChangeAspect="1"/>
+          </p:cNvSpPr>
+          <p:nvPr>
+            <p:ph type="media" sz="quarter" idx="12" hasCustomPrompt="1"/>
+          </p:nvPr>
+        </p:nvSpPr>
+        <p:spPr>
+          <a:xfrm>
+            <a:off x="870331" y="1381125"/>
+            <a:ext cx="7405070" cy="4182564"/>
+          </a:xfrm>
+        </p:spPr>
+        <p:txBody>
+          <a:bodyPr lIns="108000" tIns="108000"/>
+          <a:lstStyle>
+            <a:lvl1pPr marL="0" indent="0">
+              <a:buNone/>
+              <a:defRPr baseline="0">
+                <a:solidFill>
+                  <a:schemeClr val="tx1"/>
+                </a:solidFill>
+              </a:defRPr>
+            </a:lvl1pPr>
+          </a:lstStyle>
+          <a:p>
+            <a:r>
+              <a:rPr lang="en-GB" dirty="0"/>
+              <a:t>Click on the film icon to insert your widescreen (16x9) video</a:t>
+            </a:r>
+          </a:p>
+        </p:txBody>
+      </p:sp>
+      <p:sp>
+        <p:nvSpPr>
+          <p:cNvPr id="8" name="Title 7"/>
+          <p:cNvSpPr>
+            <a:spLocks noGrp="1"/>
+          </p:cNvSpPr>
+          <p:nvPr>
+            <p:ph type="title"/>
+          </p:nvPr>
+        </p:nvSpPr>
+        <p:spPr>
+          <a:xfrm>
+            <a:off x="365124" y="294810"/>
+            <a:ext cx="7577139" cy="338554"/>
+          </a:xfrm>
+        </p:spPr>
+        <p:txBody>
+          <a:bodyPr/>
+          <a:lstStyle>
+            <a:lvl1pPr>
+              <a:defRPr>
+                <a:solidFill>
+                  <a:schemeClr val="bg2"/>
+                </a:solidFill>
+              </a:defRPr>
+            </a:lvl1pPr>
+          </a:lstStyle>
+          <a:p>
+            <a:r>
+              <a:rPr lang="en-US"/>
+              <a:t>Click to edit Master title style</a:t>
+            </a:r>
+            <a:endParaRPr lang="en-GB" dirty="0"/>
+          </a:p>
+        </p:txBody>
+      </p:sp>
+      <p:sp>
+        <p:nvSpPr>
+          <p:cNvPr id="6" name="Date Placeholder 5"/>
+          <p:cNvSpPr>
+            <a:spLocks noGrp="1"/>
+          </p:cNvSpPr>
+          <p:nvPr>
+            <p:ph type="dt" sz="half" idx="16"/>
+          </p:nvPr>
+        </p:nvSpPr>
+        <p:spPr/>
+        <p:txBody>
+          <a:bodyPr/>
+          <a:lstStyle/>
+          <a:p>
+            <a:endParaRPr lang="en-US">
+              <a:solidFill>
+                <a:srgbClr val="9A8B7D"/>
+              </a:solidFill>
+            </a:endParaRPr>
+          </a:p>
+        </p:txBody>
+      </p:sp>
+      <p:sp>
+        <p:nvSpPr>
+          <p:cNvPr id="7" name="Footer Placeholder 6"/>
+          <p:cNvSpPr>
+            <a:spLocks noGrp="1"/>
+          </p:cNvSpPr>
+          <p:nvPr>
+            <p:ph type="ftr" sz="quarter" idx="17"/>
+          </p:nvPr>
+        </p:nvSpPr>
+        <p:spPr/>
+        <p:txBody>
+          <a:bodyPr/>
+          <a:lstStyle/>
+          <a:p>
+            <a:endParaRPr lang="en-US">
+              <a:solidFill>
+                <a:srgbClr val="9A8B7D"/>
+              </a:solidFill>
+            </a:endParaRPr>
+          </a:p>
+        </p:txBody>
+      </p:sp>
+      <p:sp>
+        <p:nvSpPr>
+          <p:cNvPr id="9" name="Slide Number Placeholder 8"/>
+          <p:cNvSpPr>
+            <a:spLocks noGrp="1"/>
+          </p:cNvSpPr>
+          <p:nvPr>
+            <p:ph type="sldNum" sz="quarter" idx="18"/>
+          </p:nvPr>
+        </p:nvSpPr>
+        <p:spPr/>
+        <p:txBody>
+          <a:bodyPr/>
+          <a:lstStyle/>
+          <a:p>
+            <a:fld id="{0A838F34-1B32-4019-A24D-EF473E6901BC}" type="slidenum">
+              <a:rPr lang="en-US" smtClean="0">
+                <a:solidFill>
+                  <a:srgbClr val="9A8B7D"/>
+                </a:solidFill>
+              </a:rPr>
+              <a:pPr/>
+              <a:t>‹#›</a:t>
+            </a:fld>
+            <a:endParaRPr lang="en-US">
+              <a:solidFill>
+                <a:srgbClr val="9A8B7D"/>
+              </a:solidFill>
+            </a:endParaRPr>
+          </a:p>
+        </p:txBody>
+      </p:sp>
+      <p:sp>
+        <p:nvSpPr>
+          <p:cNvPr id="11" name="Text Placeholder 2"/>
+          <p:cNvSpPr>
+            <a:spLocks noGrp="1"/>
+          </p:cNvSpPr>
+          <p:nvPr>
+            <p:ph type="body" sz="quarter" idx="14" hasCustomPrompt="1"/>
+          </p:nvPr>
+        </p:nvSpPr>
+        <p:spPr>
+          <a:xfrm>
+            <a:off x="365124" y="692554"/>
+            <a:ext cx="7597776" cy="234950"/>
+          </a:xfrm>
+        </p:spPr>
+        <p:txBody>
+          <a:bodyPr anchor="t" anchorCtr="0"/>
+          <a:lstStyle>
+            <a:lvl1pPr marL="0" indent="0">
+              <a:spcAft>
+                <a:spcPts val="0"/>
+              </a:spcAft>
+              <a:buNone/>
+              <a:defRPr sz="1800"/>
+            </a:lvl1pPr>
+            <a:lvl2pPr marL="271463" indent="0">
+              <a:buNone/>
+              <a:defRPr/>
+            </a:lvl2pPr>
+            <a:lvl3pPr marL="533400" indent="0">
+              <a:buNone/>
+              <a:defRPr/>
+            </a:lvl3pPr>
+            <a:lvl4pPr marL="815975" indent="0">
+              <a:buNone/>
+              <a:defRPr/>
+            </a:lvl4pPr>
+            <a:lvl5pPr marL="1104900" indent="0">
+              <a:buNone/>
+              <a:defRPr/>
+            </a:lvl5pPr>
+          </a:lstStyle>
+          <a:p>
+            <a:pPr lvl="0"/>
+            <a:r>
+              <a:rPr lang="en-US" dirty="0"/>
+              <a:t>Subtitle here if required</a:t>
+            </a:r>
+          </a:p>
+        </p:txBody>
+      </p:sp>
+    </p:spTree>
+    <p:extLst>
+      <p:ext uri="{BB962C8B-B14F-4D97-AF65-F5344CB8AC3E}">
+        <p14:creationId xmlns:p14="http://schemas.microsoft.com/office/powerpoint/2010/main" val="2599322777"/>
       </p:ext>
     </p:extLst>
   </p:cSld>
@@ -10907,7 +10962,7 @@
             <a:fld id="{4B3D3EAA-4720-4AEB-A041-FA3C86592F29}" type="datetimeFigureOut">
               <a:rPr lang="en-US" smtClean="0"/>
               <a:pPr/>
-              <a:t>6/17/2019</a:t>
+              <a:t>6/23/2019</a:t>
             </a:fld>
             <a:endParaRPr lang="en-US"/>
           </a:p>
@@ -10970,238 +11025,6 @@
 </file>
 
 <file path=ppt/slideLayouts/slideLayout40.xml><?xml version="1.0" encoding="utf-8"?>
-<p:sldLayout xmlns:a="http://schemas.openxmlformats.org/drawingml/2006/main" xmlns:r="http://schemas.openxmlformats.org/officeDocument/2006/relationships" xmlns:p="http://schemas.openxmlformats.org/presentationml/2006/main" preserve="1">
-  <p:cSld name="Video Widescreen (16 x 9)">
-    <p:spTree>
-      <p:nvGrpSpPr>
-        <p:cNvPr id="1" name=""/>
-        <p:cNvGrpSpPr/>
-        <p:nvPr/>
-      </p:nvGrpSpPr>
-      <p:grpSpPr>
-        <a:xfrm>
-          <a:off x="0" y="0"/>
-          <a:ext cx="0" cy="0"/>
-          <a:chOff x="0" y="0"/>
-          <a:chExt cx="0" cy="0"/>
-        </a:xfrm>
-      </p:grpSpPr>
-      <p:sp>
-        <p:nvSpPr>
-          <p:cNvPr id="5" name="Media Placeholder 5"/>
-          <p:cNvSpPr>
-            <a:spLocks noGrp="1" noChangeAspect="1"/>
-          </p:cNvSpPr>
-          <p:nvPr>
-            <p:ph type="media" sz="quarter" idx="12" hasCustomPrompt="1"/>
-          </p:nvPr>
-        </p:nvSpPr>
-        <p:spPr>
-          <a:xfrm>
-            <a:off x="870331" y="1381125"/>
-            <a:ext cx="7405070" cy="4182564"/>
-          </a:xfrm>
-        </p:spPr>
-        <p:txBody>
-          <a:bodyPr lIns="108000" tIns="108000"/>
-          <a:lstStyle>
-            <a:lvl1pPr marL="0" indent="0">
-              <a:buNone/>
-              <a:defRPr baseline="0">
-                <a:solidFill>
-                  <a:schemeClr val="tx1"/>
-                </a:solidFill>
-              </a:defRPr>
-            </a:lvl1pPr>
-          </a:lstStyle>
-          <a:p>
-            <a:r>
-              <a:rPr lang="en-GB" dirty="0"/>
-              <a:t>Click on the film icon to insert your widescreen (16x9) video</a:t>
-            </a:r>
-          </a:p>
-        </p:txBody>
-      </p:sp>
-      <p:sp>
-        <p:nvSpPr>
-          <p:cNvPr id="8" name="Title 7"/>
-          <p:cNvSpPr>
-            <a:spLocks noGrp="1"/>
-          </p:cNvSpPr>
-          <p:nvPr>
-            <p:ph type="title"/>
-          </p:nvPr>
-        </p:nvSpPr>
-        <p:spPr>
-          <a:xfrm>
-            <a:off x="365124" y="294810"/>
-            <a:ext cx="7577139" cy="338554"/>
-          </a:xfrm>
-        </p:spPr>
-        <p:txBody>
-          <a:bodyPr/>
-          <a:lstStyle>
-            <a:lvl1pPr>
-              <a:defRPr>
-                <a:solidFill>
-                  <a:schemeClr val="bg2"/>
-                </a:solidFill>
-              </a:defRPr>
-            </a:lvl1pPr>
-          </a:lstStyle>
-          <a:p>
-            <a:r>
-              <a:rPr lang="en-US"/>
-              <a:t>Click to edit Master title style</a:t>
-            </a:r>
-            <a:endParaRPr lang="en-GB" dirty="0"/>
-          </a:p>
-        </p:txBody>
-      </p:sp>
-      <p:sp>
-        <p:nvSpPr>
-          <p:cNvPr id="6" name="Date Placeholder 5"/>
-          <p:cNvSpPr>
-            <a:spLocks noGrp="1"/>
-          </p:cNvSpPr>
-          <p:nvPr>
-            <p:ph type="dt" sz="half" idx="16"/>
-          </p:nvPr>
-        </p:nvSpPr>
-        <p:spPr/>
-        <p:txBody>
-          <a:bodyPr/>
-          <a:lstStyle/>
-          <a:p>
-            <a:endParaRPr lang="en-US">
-              <a:solidFill>
-                <a:srgbClr val="9A8B7D"/>
-              </a:solidFill>
-            </a:endParaRPr>
-          </a:p>
-        </p:txBody>
-      </p:sp>
-      <p:sp>
-        <p:nvSpPr>
-          <p:cNvPr id="7" name="Footer Placeholder 6"/>
-          <p:cNvSpPr>
-            <a:spLocks noGrp="1"/>
-          </p:cNvSpPr>
-          <p:nvPr>
-            <p:ph type="ftr" sz="quarter" idx="17"/>
-          </p:nvPr>
-        </p:nvSpPr>
-        <p:spPr/>
-        <p:txBody>
-          <a:bodyPr/>
-          <a:lstStyle/>
-          <a:p>
-            <a:endParaRPr lang="en-US">
-              <a:solidFill>
-                <a:srgbClr val="9A8B7D"/>
-              </a:solidFill>
-            </a:endParaRPr>
-          </a:p>
-        </p:txBody>
-      </p:sp>
-      <p:sp>
-        <p:nvSpPr>
-          <p:cNvPr id="9" name="Slide Number Placeholder 8"/>
-          <p:cNvSpPr>
-            <a:spLocks noGrp="1"/>
-          </p:cNvSpPr>
-          <p:nvPr>
-            <p:ph type="sldNum" sz="quarter" idx="18"/>
-          </p:nvPr>
-        </p:nvSpPr>
-        <p:spPr/>
-        <p:txBody>
-          <a:bodyPr/>
-          <a:lstStyle/>
-          <a:p>
-            <a:fld id="{0A838F34-1B32-4019-A24D-EF473E6901BC}" type="slidenum">
-              <a:rPr lang="en-US" smtClean="0">
-                <a:solidFill>
-                  <a:srgbClr val="9A8B7D"/>
-                </a:solidFill>
-              </a:rPr>
-              <a:pPr/>
-              <a:t>‹#›</a:t>
-            </a:fld>
-            <a:endParaRPr lang="en-US">
-              <a:solidFill>
-                <a:srgbClr val="9A8B7D"/>
-              </a:solidFill>
-            </a:endParaRPr>
-          </a:p>
-        </p:txBody>
-      </p:sp>
-      <p:sp>
-        <p:nvSpPr>
-          <p:cNvPr id="11" name="Text Placeholder 2"/>
-          <p:cNvSpPr>
-            <a:spLocks noGrp="1"/>
-          </p:cNvSpPr>
-          <p:nvPr>
-            <p:ph type="body" sz="quarter" idx="14" hasCustomPrompt="1"/>
-          </p:nvPr>
-        </p:nvSpPr>
-        <p:spPr>
-          <a:xfrm>
-            <a:off x="365124" y="692554"/>
-            <a:ext cx="7597776" cy="234950"/>
-          </a:xfrm>
-        </p:spPr>
-        <p:txBody>
-          <a:bodyPr anchor="t" anchorCtr="0"/>
-          <a:lstStyle>
-            <a:lvl1pPr marL="0" indent="0">
-              <a:spcAft>
-                <a:spcPts val="0"/>
-              </a:spcAft>
-              <a:buNone/>
-              <a:defRPr sz="1800"/>
-            </a:lvl1pPr>
-            <a:lvl2pPr marL="271463" indent="0">
-              <a:buNone/>
-              <a:defRPr/>
-            </a:lvl2pPr>
-            <a:lvl3pPr marL="533400" indent="0">
-              <a:buNone/>
-              <a:defRPr/>
-            </a:lvl3pPr>
-            <a:lvl4pPr marL="815975" indent="0">
-              <a:buNone/>
-              <a:defRPr/>
-            </a:lvl4pPr>
-            <a:lvl5pPr marL="1104900" indent="0">
-              <a:buNone/>
-              <a:defRPr/>
-            </a:lvl5pPr>
-          </a:lstStyle>
-          <a:p>
-            <a:pPr lvl="0"/>
-            <a:r>
-              <a:rPr lang="en-US" dirty="0"/>
-              <a:t>Subtitle here if required</a:t>
-            </a:r>
-          </a:p>
-        </p:txBody>
-      </p:sp>
-    </p:spTree>
-    <p:extLst>
-      <p:ext uri="{BB962C8B-B14F-4D97-AF65-F5344CB8AC3E}">
-        <p14:creationId xmlns:p14="http://schemas.microsoft.com/office/powerpoint/2010/main" val="2599322777"/>
-      </p:ext>
-    </p:extLst>
-  </p:cSld>
-  <p:clrMapOvr>
-    <a:masterClrMapping/>
-  </p:clrMapOvr>
-</p:sldLayout>
-</file>
-
-<file path=ppt/slideLayouts/slideLayout41.xml><?xml version="1.0" encoding="utf-8"?>
 <p:sldLayout xmlns:a="http://schemas.openxmlformats.org/drawingml/2006/main" xmlns:r="http://schemas.openxmlformats.org/officeDocument/2006/relationships" xmlns:p="http://schemas.openxmlformats.org/presentationml/2006/main" preserve="1">
   <p:cSld name="Image and Text">
     <p:spTree>
@@ -11547,7 +11370,7 @@
 </p:sldLayout>
 </file>
 
-<file path=ppt/slideLayouts/slideLayout42.xml><?xml version="1.0" encoding="utf-8"?>
+<file path=ppt/slideLayouts/slideLayout41.xml><?xml version="1.0" encoding="utf-8"?>
 <p:sldLayout xmlns:a="http://schemas.openxmlformats.org/drawingml/2006/main" xmlns:r="http://schemas.openxmlformats.org/officeDocument/2006/relationships" xmlns:p="http://schemas.openxmlformats.org/presentationml/2006/main" preserve="1">
   <p:cSld name="Two Image and Text">
     <p:spTree>
@@ -12002,7 +11825,7 @@
 </p:sldLayout>
 </file>
 
-<file path=ppt/slideLayouts/slideLayout43.xml><?xml version="1.0" encoding="utf-8"?>
+<file path=ppt/slideLayouts/slideLayout42.xml><?xml version="1.0" encoding="utf-8"?>
 <p:sldLayout xmlns:a="http://schemas.openxmlformats.org/drawingml/2006/main" xmlns:r="http://schemas.openxmlformats.org/officeDocument/2006/relationships" xmlns:p="http://schemas.openxmlformats.org/presentationml/2006/main" preserve="1">
   <p:cSld name="Title Only">
     <p:spTree>
@@ -12190,7 +12013,7 @@
 </p:sldLayout>
 </file>
 
-<file path=ppt/slideLayouts/slideLayout44.xml><?xml version="1.0" encoding="utf-8"?>
+<file path=ppt/slideLayouts/slideLayout43.xml><?xml version="1.0" encoding="utf-8"?>
 <p:sldLayout xmlns:a="http://schemas.openxmlformats.org/drawingml/2006/main" xmlns:r="http://schemas.openxmlformats.org/officeDocument/2006/relationships" xmlns:p="http://schemas.openxmlformats.org/presentationml/2006/main" showMasterSp="0" type="blank" preserve="1">
   <p:cSld name="Blank">
     <p:spTree>
@@ -12333,7 +12156,7 @@
 </p:sldLayout>
 </file>
 
-<file path=ppt/slideLayouts/slideLayout45.xml><?xml version="1.0" encoding="utf-8"?>
+<file path=ppt/slideLayouts/slideLayout44.xml><?xml version="1.0" encoding="utf-8"?>
 <p:sldLayout xmlns:a="http://schemas.openxmlformats.org/drawingml/2006/main" xmlns:r="http://schemas.openxmlformats.org/officeDocument/2006/relationships" xmlns:p="http://schemas.openxmlformats.org/presentationml/2006/main" type="objAndTwoObj">
   <p:cSld name="Title, Content, and 2 Content">
     <p:spTree>
@@ -12554,7 +12377,7 @@
 </p:sldLayout>
 </file>
 
-<file path=ppt/slideLayouts/slideLayout46.xml><?xml version="1.0" encoding="utf-8"?>
+<file path=ppt/slideLayouts/slideLayout45.xml><?xml version="1.0" encoding="utf-8"?>
 <p:sldLayout xmlns:a="http://schemas.openxmlformats.org/drawingml/2006/main" xmlns:r="http://schemas.openxmlformats.org/officeDocument/2006/relationships" xmlns:p="http://schemas.openxmlformats.org/presentationml/2006/main" type="twoObj">
   <p:cSld name="1_Two Content">
     <p:spTree>
@@ -12769,7 +12592,7 @@
 </p:sldLayout>
 </file>
 
-<file path=ppt/slideLayouts/slideLayout47.xml><?xml version="1.0" encoding="utf-8"?>
+<file path=ppt/slideLayouts/slideLayout46.xml><?xml version="1.0" encoding="utf-8"?>
 <p:sldLayout xmlns:a="http://schemas.openxmlformats.org/drawingml/2006/main" xmlns:r="http://schemas.openxmlformats.org/officeDocument/2006/relationships" xmlns:p="http://schemas.openxmlformats.org/presentationml/2006/main" type="titleOnly">
   <p:cSld name="1_Title Only">
     <p:spTree>
@@ -12894,7 +12717,7 @@
 </p:sldLayout>
 </file>
 
-<file path=ppt/slideLayouts/slideLayout48.xml><?xml version="1.0" encoding="utf-8"?>
+<file path=ppt/slideLayouts/slideLayout47.xml><?xml version="1.0" encoding="utf-8"?>
 <p:sldLayout xmlns:a="http://schemas.openxmlformats.org/drawingml/2006/main" xmlns:r="http://schemas.openxmlformats.org/officeDocument/2006/relationships" xmlns:p="http://schemas.openxmlformats.org/presentationml/2006/main" type="obj">
   <p:cSld name="1_Title and Content">
     <p:spTree>
@@ -13073,7 +12896,7 @@
 </p:sldLayout>
 </file>
 
-<file path=ppt/slideLayouts/slideLayout49.xml><?xml version="1.0" encoding="utf-8"?>
+<file path=ppt/slideLayouts/slideLayout48.xml><?xml version="1.0" encoding="utf-8"?>
 <p:sldLayout xmlns:a="http://schemas.openxmlformats.org/drawingml/2006/main" xmlns:r="http://schemas.openxmlformats.org/officeDocument/2006/relationships" xmlns:p="http://schemas.openxmlformats.org/presentationml/2006/main" showMasterSp="0" preserve="1">
   <p:cSld name="Title Slide">
     <p:spTree>
@@ -13405,6 +13228,338 @@
 </p:sldLayout>
 </file>
 
+<file path=ppt/slideLayouts/slideLayout49.xml><?xml version="1.0" encoding="utf-8"?>
+<p:sldLayout xmlns:a="http://schemas.openxmlformats.org/drawingml/2006/main" xmlns:r="http://schemas.openxmlformats.org/officeDocument/2006/relationships" xmlns:p="http://schemas.openxmlformats.org/presentationml/2006/main" preserve="1">
+  <p:cSld name="Title and Content">
+    <p:spTree>
+      <p:nvGrpSpPr>
+        <p:cNvPr id="1" name=""/>
+        <p:cNvGrpSpPr/>
+        <p:nvPr/>
+      </p:nvGrpSpPr>
+      <p:grpSpPr>
+        <a:xfrm>
+          <a:off x="0" y="0"/>
+          <a:ext cx="0" cy="0"/>
+          <a:chOff x="0" y="0"/>
+          <a:chExt cx="0" cy="0"/>
+        </a:xfrm>
+      </p:grpSpPr>
+      <p:sp>
+        <p:nvSpPr>
+          <p:cNvPr id="5" name="Title 4"/>
+          <p:cNvSpPr>
+            <a:spLocks noGrp="1"/>
+          </p:cNvSpPr>
+          <p:nvPr>
+            <p:ph type="title"/>
+          </p:nvPr>
+        </p:nvSpPr>
+        <p:spPr>
+          <a:xfrm>
+            <a:off x="365124" y="294810"/>
+            <a:ext cx="7577139" cy="338554"/>
+          </a:xfrm>
+        </p:spPr>
+        <p:txBody>
+          <a:bodyPr/>
+          <a:lstStyle/>
+          <a:p>
+            <a:r>
+              <a:rPr lang="en-US"/>
+              <a:t>Click to edit Master title style</a:t>
+            </a:r>
+            <a:endParaRPr lang="en-GB" dirty="0"/>
+          </a:p>
+        </p:txBody>
+      </p:sp>
+      <p:sp>
+        <p:nvSpPr>
+          <p:cNvPr id="16" name="Content Placeholder 15"/>
+          <p:cNvSpPr>
+            <a:spLocks noGrp="1"/>
+          </p:cNvSpPr>
+          <p:nvPr>
+            <p:ph sz="quarter" idx="12"/>
+          </p:nvPr>
+        </p:nvSpPr>
+        <p:spPr>
+          <a:xfrm>
+            <a:off x="365124" y="1196151"/>
+            <a:ext cx="8423275" cy="4658549"/>
+          </a:xfrm>
+        </p:spPr>
+        <p:txBody>
+          <a:bodyPr/>
+          <a:lstStyle>
+            <a:lvl1pPr>
+              <a:defRPr>
+                <a:solidFill>
+                  <a:schemeClr val="tx1"/>
+                </a:solidFill>
+              </a:defRPr>
+            </a:lvl1pPr>
+            <a:lvl2pPr>
+              <a:defRPr>
+                <a:solidFill>
+                  <a:schemeClr val="tx1"/>
+                </a:solidFill>
+              </a:defRPr>
+            </a:lvl2pPr>
+            <a:lvl3pPr>
+              <a:defRPr>
+                <a:solidFill>
+                  <a:schemeClr val="tx1"/>
+                </a:solidFill>
+              </a:defRPr>
+            </a:lvl3pPr>
+            <a:lvl4pPr>
+              <a:defRPr>
+                <a:solidFill>
+                  <a:schemeClr val="tx1"/>
+                </a:solidFill>
+              </a:defRPr>
+            </a:lvl4pPr>
+            <a:lvl5pPr>
+              <a:defRPr>
+                <a:solidFill>
+                  <a:schemeClr val="tx1"/>
+                </a:solidFill>
+              </a:defRPr>
+            </a:lvl5pPr>
+          </a:lstStyle>
+          <a:p>
+            <a:pPr lvl="0"/>
+            <a:r>
+              <a:rPr lang="en-US"/>
+              <a:t>Click to edit Master text styles</a:t>
+            </a:r>
+          </a:p>
+          <a:p>
+            <a:pPr lvl="1"/>
+            <a:r>
+              <a:rPr lang="en-US"/>
+              <a:t>Second level</a:t>
+            </a:r>
+          </a:p>
+          <a:p>
+            <a:pPr lvl="2"/>
+            <a:r>
+              <a:rPr lang="en-US"/>
+              <a:t>Third level</a:t>
+            </a:r>
+          </a:p>
+          <a:p>
+            <a:pPr lvl="3"/>
+            <a:r>
+              <a:rPr lang="en-US"/>
+              <a:t>Fourth level</a:t>
+            </a:r>
+          </a:p>
+          <a:p>
+            <a:pPr lvl="4"/>
+            <a:r>
+              <a:rPr lang="en-US"/>
+              <a:t>Fifth level</a:t>
+            </a:r>
+            <a:endParaRPr lang="en-GB" dirty="0"/>
+          </a:p>
+        </p:txBody>
+      </p:sp>
+      <p:sp>
+        <p:nvSpPr>
+          <p:cNvPr id="8" name="Text Placeholder 2"/>
+          <p:cNvSpPr>
+            <a:spLocks noGrp="1"/>
+          </p:cNvSpPr>
+          <p:nvPr>
+            <p:ph type="body" sz="quarter" idx="14" hasCustomPrompt="1"/>
+          </p:nvPr>
+        </p:nvSpPr>
+        <p:spPr>
+          <a:xfrm>
+            <a:off x="365124" y="692554"/>
+            <a:ext cx="7597776" cy="234950"/>
+          </a:xfrm>
+        </p:spPr>
+        <p:txBody>
+          <a:bodyPr anchor="t" anchorCtr="0"/>
+          <a:lstStyle>
+            <a:lvl1pPr marL="0" indent="0">
+              <a:spcAft>
+                <a:spcPts val="0"/>
+              </a:spcAft>
+              <a:buNone/>
+              <a:defRPr sz="1800"/>
+            </a:lvl1pPr>
+            <a:lvl2pPr marL="271463" indent="0">
+              <a:buNone/>
+              <a:defRPr/>
+            </a:lvl2pPr>
+            <a:lvl3pPr marL="533400" indent="0">
+              <a:buNone/>
+              <a:defRPr/>
+            </a:lvl3pPr>
+            <a:lvl4pPr marL="815975" indent="0">
+              <a:buNone/>
+              <a:defRPr/>
+            </a:lvl4pPr>
+            <a:lvl5pPr marL="1104900" indent="0">
+              <a:buNone/>
+              <a:defRPr/>
+            </a:lvl5pPr>
+          </a:lstStyle>
+          <a:p>
+            <a:pPr lvl="0"/>
+            <a:r>
+              <a:rPr lang="en-US" dirty="0"/>
+              <a:t>Subtitle here if required</a:t>
+            </a:r>
+          </a:p>
+        </p:txBody>
+      </p:sp>
+      <p:sp>
+        <p:nvSpPr>
+          <p:cNvPr id="2" name="Date Placeholder 1"/>
+          <p:cNvSpPr>
+            <a:spLocks noGrp="1"/>
+          </p:cNvSpPr>
+          <p:nvPr>
+            <p:ph type="dt" sz="half" idx="15"/>
+          </p:nvPr>
+        </p:nvSpPr>
+        <p:spPr/>
+        <p:txBody>
+          <a:bodyPr/>
+          <a:lstStyle/>
+          <a:p>
+            <a:endParaRPr lang="en-US">
+              <a:solidFill>
+                <a:srgbClr val="9A8B7D"/>
+              </a:solidFill>
+            </a:endParaRPr>
+          </a:p>
+        </p:txBody>
+      </p:sp>
+      <p:sp>
+        <p:nvSpPr>
+          <p:cNvPr id="3" name="Footer Placeholder 2"/>
+          <p:cNvSpPr>
+            <a:spLocks noGrp="1"/>
+          </p:cNvSpPr>
+          <p:nvPr>
+            <p:ph type="ftr" sz="quarter" idx="16"/>
+          </p:nvPr>
+        </p:nvSpPr>
+        <p:spPr/>
+        <p:txBody>
+          <a:bodyPr/>
+          <a:lstStyle/>
+          <a:p>
+            <a:endParaRPr lang="en-US">
+              <a:solidFill>
+                <a:srgbClr val="9A8B7D"/>
+              </a:solidFill>
+            </a:endParaRPr>
+          </a:p>
+        </p:txBody>
+      </p:sp>
+      <p:sp>
+        <p:nvSpPr>
+          <p:cNvPr id="9" name="Slide Number Placeholder 8"/>
+          <p:cNvSpPr>
+            <a:spLocks noGrp="1"/>
+          </p:cNvSpPr>
+          <p:nvPr>
+            <p:ph type="sldNum" sz="quarter" idx="17"/>
+          </p:nvPr>
+        </p:nvSpPr>
+        <p:spPr/>
+        <p:txBody>
+          <a:bodyPr/>
+          <a:lstStyle/>
+          <a:p>
+            <a:fld id="{0A838F34-1B32-4019-A24D-EF473E6901BC}" type="slidenum">
+              <a:rPr lang="en-US" smtClean="0">
+                <a:solidFill>
+                  <a:srgbClr val="9A8B7D"/>
+                </a:solidFill>
+              </a:rPr>
+              <a:pPr/>
+              <a:t>‹#›</a:t>
+            </a:fld>
+            <a:endParaRPr lang="en-US">
+              <a:solidFill>
+                <a:srgbClr val="9A8B7D"/>
+              </a:solidFill>
+            </a:endParaRPr>
+          </a:p>
+        </p:txBody>
+      </p:sp>
+      <p:sp>
+        <p:nvSpPr>
+          <p:cNvPr id="6" name="Text Placeholder 5"/>
+          <p:cNvSpPr>
+            <a:spLocks noGrp="1"/>
+          </p:cNvSpPr>
+          <p:nvPr>
+            <p:ph type="body" sz="quarter" idx="18" hasCustomPrompt="1"/>
+          </p:nvPr>
+        </p:nvSpPr>
+        <p:spPr>
+          <a:xfrm>
+            <a:off x="369568" y="6058086"/>
+            <a:ext cx="8445820" cy="123111"/>
+          </a:xfrm>
+        </p:spPr>
+        <p:txBody>
+          <a:bodyPr wrap="square" anchor="b" anchorCtr="0">
+            <a:spAutoFit/>
+          </a:bodyPr>
+          <a:lstStyle>
+            <a:lvl1pPr marL="0" indent="0">
+              <a:buNone/>
+              <a:defRPr sz="800" baseline="0"/>
+            </a:lvl1pPr>
+            <a:lvl2pPr marL="268163" indent="0">
+              <a:buNone/>
+              <a:defRPr sz="800"/>
+            </a:lvl2pPr>
+            <a:lvl3pPr marL="540000" indent="0">
+              <a:buNone/>
+              <a:defRPr sz="800"/>
+            </a:lvl3pPr>
+            <a:lvl4pPr marL="811088" indent="0">
+              <a:buNone/>
+              <a:defRPr sz="800"/>
+            </a:lvl4pPr>
+            <a:lvl5pPr marL="1080000" indent="0">
+              <a:buNone/>
+              <a:defRPr sz="800"/>
+            </a:lvl5pPr>
+          </a:lstStyle>
+          <a:p>
+            <a:pPr lvl="0"/>
+            <a:r>
+              <a:rPr lang="en-US" dirty="0"/>
+              <a:t>Insert Source text here</a:t>
+            </a:r>
+          </a:p>
+        </p:txBody>
+      </p:sp>
+    </p:spTree>
+    <p:extLst>
+      <p:ext uri="{BB962C8B-B14F-4D97-AF65-F5344CB8AC3E}">
+        <p14:creationId xmlns:p14="http://schemas.microsoft.com/office/powerpoint/2010/main" val="3314054882"/>
+      </p:ext>
+    </p:extLst>
+  </p:cSld>
+  <p:clrMapOvr>
+    <a:masterClrMapping/>
+  </p:clrMapOvr>
+</p:sldLayout>
+</file>
+
 <file path=ppt/slideLayouts/slideLayout5.xml><?xml version="1.0" encoding="utf-8"?>
 <p:sldLayout xmlns:a="http://schemas.openxmlformats.org/drawingml/2006/main" xmlns:r="http://schemas.openxmlformats.org/officeDocument/2006/relationships" xmlns:p="http://schemas.openxmlformats.org/presentationml/2006/main" preserve="1">
   <p:cSld name="Comparison">
@@ -13927,7 +14082,7 @@
             <a:fld id="{4B3D3EAA-4720-4AEB-A041-FA3C86592F29}" type="datetimeFigureOut">
               <a:rPr lang="en-US" smtClean="0"/>
               <a:pPr/>
-              <a:t>6/17/2019</a:t>
+              <a:t>6/23/2019</a:t>
             </a:fld>
             <a:endParaRPr lang="en-US"/>
           </a:p>
@@ -13990,338 +14145,6 @@
 </file>
 
 <file path=ppt/slideLayouts/slideLayout50.xml><?xml version="1.0" encoding="utf-8"?>
-<p:sldLayout xmlns:a="http://schemas.openxmlformats.org/drawingml/2006/main" xmlns:r="http://schemas.openxmlformats.org/officeDocument/2006/relationships" xmlns:p="http://schemas.openxmlformats.org/presentationml/2006/main" preserve="1">
-  <p:cSld name="Title and Content">
-    <p:spTree>
-      <p:nvGrpSpPr>
-        <p:cNvPr id="1" name=""/>
-        <p:cNvGrpSpPr/>
-        <p:nvPr/>
-      </p:nvGrpSpPr>
-      <p:grpSpPr>
-        <a:xfrm>
-          <a:off x="0" y="0"/>
-          <a:ext cx="0" cy="0"/>
-          <a:chOff x="0" y="0"/>
-          <a:chExt cx="0" cy="0"/>
-        </a:xfrm>
-      </p:grpSpPr>
-      <p:sp>
-        <p:nvSpPr>
-          <p:cNvPr id="5" name="Title 4"/>
-          <p:cNvSpPr>
-            <a:spLocks noGrp="1"/>
-          </p:cNvSpPr>
-          <p:nvPr>
-            <p:ph type="title"/>
-          </p:nvPr>
-        </p:nvSpPr>
-        <p:spPr>
-          <a:xfrm>
-            <a:off x="365124" y="294810"/>
-            <a:ext cx="7577139" cy="338554"/>
-          </a:xfrm>
-        </p:spPr>
-        <p:txBody>
-          <a:bodyPr/>
-          <a:lstStyle/>
-          <a:p>
-            <a:r>
-              <a:rPr lang="en-US"/>
-              <a:t>Click to edit Master title style</a:t>
-            </a:r>
-            <a:endParaRPr lang="en-GB" dirty="0"/>
-          </a:p>
-        </p:txBody>
-      </p:sp>
-      <p:sp>
-        <p:nvSpPr>
-          <p:cNvPr id="16" name="Content Placeholder 15"/>
-          <p:cNvSpPr>
-            <a:spLocks noGrp="1"/>
-          </p:cNvSpPr>
-          <p:nvPr>
-            <p:ph sz="quarter" idx="12"/>
-          </p:nvPr>
-        </p:nvSpPr>
-        <p:spPr>
-          <a:xfrm>
-            <a:off x="365124" y="1196151"/>
-            <a:ext cx="8423275" cy="4658549"/>
-          </a:xfrm>
-        </p:spPr>
-        <p:txBody>
-          <a:bodyPr/>
-          <a:lstStyle>
-            <a:lvl1pPr>
-              <a:defRPr>
-                <a:solidFill>
-                  <a:schemeClr val="tx1"/>
-                </a:solidFill>
-              </a:defRPr>
-            </a:lvl1pPr>
-            <a:lvl2pPr>
-              <a:defRPr>
-                <a:solidFill>
-                  <a:schemeClr val="tx1"/>
-                </a:solidFill>
-              </a:defRPr>
-            </a:lvl2pPr>
-            <a:lvl3pPr>
-              <a:defRPr>
-                <a:solidFill>
-                  <a:schemeClr val="tx1"/>
-                </a:solidFill>
-              </a:defRPr>
-            </a:lvl3pPr>
-            <a:lvl4pPr>
-              <a:defRPr>
-                <a:solidFill>
-                  <a:schemeClr val="tx1"/>
-                </a:solidFill>
-              </a:defRPr>
-            </a:lvl4pPr>
-            <a:lvl5pPr>
-              <a:defRPr>
-                <a:solidFill>
-                  <a:schemeClr val="tx1"/>
-                </a:solidFill>
-              </a:defRPr>
-            </a:lvl5pPr>
-          </a:lstStyle>
-          <a:p>
-            <a:pPr lvl="0"/>
-            <a:r>
-              <a:rPr lang="en-US"/>
-              <a:t>Click to edit Master text styles</a:t>
-            </a:r>
-          </a:p>
-          <a:p>
-            <a:pPr lvl="1"/>
-            <a:r>
-              <a:rPr lang="en-US"/>
-              <a:t>Second level</a:t>
-            </a:r>
-          </a:p>
-          <a:p>
-            <a:pPr lvl="2"/>
-            <a:r>
-              <a:rPr lang="en-US"/>
-              <a:t>Third level</a:t>
-            </a:r>
-          </a:p>
-          <a:p>
-            <a:pPr lvl="3"/>
-            <a:r>
-              <a:rPr lang="en-US"/>
-              <a:t>Fourth level</a:t>
-            </a:r>
-          </a:p>
-          <a:p>
-            <a:pPr lvl="4"/>
-            <a:r>
-              <a:rPr lang="en-US"/>
-              <a:t>Fifth level</a:t>
-            </a:r>
-            <a:endParaRPr lang="en-GB" dirty="0"/>
-          </a:p>
-        </p:txBody>
-      </p:sp>
-      <p:sp>
-        <p:nvSpPr>
-          <p:cNvPr id="8" name="Text Placeholder 2"/>
-          <p:cNvSpPr>
-            <a:spLocks noGrp="1"/>
-          </p:cNvSpPr>
-          <p:nvPr>
-            <p:ph type="body" sz="quarter" idx="14" hasCustomPrompt="1"/>
-          </p:nvPr>
-        </p:nvSpPr>
-        <p:spPr>
-          <a:xfrm>
-            <a:off x="365124" y="692554"/>
-            <a:ext cx="7597776" cy="234950"/>
-          </a:xfrm>
-        </p:spPr>
-        <p:txBody>
-          <a:bodyPr anchor="t" anchorCtr="0"/>
-          <a:lstStyle>
-            <a:lvl1pPr marL="0" indent="0">
-              <a:spcAft>
-                <a:spcPts val="0"/>
-              </a:spcAft>
-              <a:buNone/>
-              <a:defRPr sz="1800"/>
-            </a:lvl1pPr>
-            <a:lvl2pPr marL="271463" indent="0">
-              <a:buNone/>
-              <a:defRPr/>
-            </a:lvl2pPr>
-            <a:lvl3pPr marL="533400" indent="0">
-              <a:buNone/>
-              <a:defRPr/>
-            </a:lvl3pPr>
-            <a:lvl4pPr marL="815975" indent="0">
-              <a:buNone/>
-              <a:defRPr/>
-            </a:lvl4pPr>
-            <a:lvl5pPr marL="1104900" indent="0">
-              <a:buNone/>
-              <a:defRPr/>
-            </a:lvl5pPr>
-          </a:lstStyle>
-          <a:p>
-            <a:pPr lvl="0"/>
-            <a:r>
-              <a:rPr lang="en-US" dirty="0"/>
-              <a:t>Subtitle here if required</a:t>
-            </a:r>
-          </a:p>
-        </p:txBody>
-      </p:sp>
-      <p:sp>
-        <p:nvSpPr>
-          <p:cNvPr id="2" name="Date Placeholder 1"/>
-          <p:cNvSpPr>
-            <a:spLocks noGrp="1"/>
-          </p:cNvSpPr>
-          <p:nvPr>
-            <p:ph type="dt" sz="half" idx="15"/>
-          </p:nvPr>
-        </p:nvSpPr>
-        <p:spPr/>
-        <p:txBody>
-          <a:bodyPr/>
-          <a:lstStyle/>
-          <a:p>
-            <a:endParaRPr lang="en-US">
-              <a:solidFill>
-                <a:srgbClr val="9A8B7D"/>
-              </a:solidFill>
-            </a:endParaRPr>
-          </a:p>
-        </p:txBody>
-      </p:sp>
-      <p:sp>
-        <p:nvSpPr>
-          <p:cNvPr id="3" name="Footer Placeholder 2"/>
-          <p:cNvSpPr>
-            <a:spLocks noGrp="1"/>
-          </p:cNvSpPr>
-          <p:nvPr>
-            <p:ph type="ftr" sz="quarter" idx="16"/>
-          </p:nvPr>
-        </p:nvSpPr>
-        <p:spPr/>
-        <p:txBody>
-          <a:bodyPr/>
-          <a:lstStyle/>
-          <a:p>
-            <a:endParaRPr lang="en-US">
-              <a:solidFill>
-                <a:srgbClr val="9A8B7D"/>
-              </a:solidFill>
-            </a:endParaRPr>
-          </a:p>
-        </p:txBody>
-      </p:sp>
-      <p:sp>
-        <p:nvSpPr>
-          <p:cNvPr id="9" name="Slide Number Placeholder 8"/>
-          <p:cNvSpPr>
-            <a:spLocks noGrp="1"/>
-          </p:cNvSpPr>
-          <p:nvPr>
-            <p:ph type="sldNum" sz="quarter" idx="17"/>
-          </p:nvPr>
-        </p:nvSpPr>
-        <p:spPr/>
-        <p:txBody>
-          <a:bodyPr/>
-          <a:lstStyle/>
-          <a:p>
-            <a:fld id="{0A838F34-1B32-4019-A24D-EF473E6901BC}" type="slidenum">
-              <a:rPr lang="en-US" smtClean="0">
-                <a:solidFill>
-                  <a:srgbClr val="9A8B7D"/>
-                </a:solidFill>
-              </a:rPr>
-              <a:pPr/>
-              <a:t>‹#›</a:t>
-            </a:fld>
-            <a:endParaRPr lang="en-US">
-              <a:solidFill>
-                <a:srgbClr val="9A8B7D"/>
-              </a:solidFill>
-            </a:endParaRPr>
-          </a:p>
-        </p:txBody>
-      </p:sp>
-      <p:sp>
-        <p:nvSpPr>
-          <p:cNvPr id="6" name="Text Placeholder 5"/>
-          <p:cNvSpPr>
-            <a:spLocks noGrp="1"/>
-          </p:cNvSpPr>
-          <p:nvPr>
-            <p:ph type="body" sz="quarter" idx="18" hasCustomPrompt="1"/>
-          </p:nvPr>
-        </p:nvSpPr>
-        <p:spPr>
-          <a:xfrm>
-            <a:off x="369568" y="6058086"/>
-            <a:ext cx="8445820" cy="123111"/>
-          </a:xfrm>
-        </p:spPr>
-        <p:txBody>
-          <a:bodyPr wrap="square" anchor="b" anchorCtr="0">
-            <a:spAutoFit/>
-          </a:bodyPr>
-          <a:lstStyle>
-            <a:lvl1pPr marL="0" indent="0">
-              <a:buNone/>
-              <a:defRPr sz="800" baseline="0"/>
-            </a:lvl1pPr>
-            <a:lvl2pPr marL="268163" indent="0">
-              <a:buNone/>
-              <a:defRPr sz="800"/>
-            </a:lvl2pPr>
-            <a:lvl3pPr marL="540000" indent="0">
-              <a:buNone/>
-              <a:defRPr sz="800"/>
-            </a:lvl3pPr>
-            <a:lvl4pPr marL="811088" indent="0">
-              <a:buNone/>
-              <a:defRPr sz="800"/>
-            </a:lvl4pPr>
-            <a:lvl5pPr marL="1080000" indent="0">
-              <a:buNone/>
-              <a:defRPr sz="800"/>
-            </a:lvl5pPr>
-          </a:lstStyle>
-          <a:p>
-            <a:pPr lvl="0"/>
-            <a:r>
-              <a:rPr lang="en-US" dirty="0"/>
-              <a:t>Insert Source text here</a:t>
-            </a:r>
-          </a:p>
-        </p:txBody>
-      </p:sp>
-    </p:spTree>
-    <p:extLst>
-      <p:ext uri="{BB962C8B-B14F-4D97-AF65-F5344CB8AC3E}">
-        <p14:creationId xmlns:p14="http://schemas.microsoft.com/office/powerpoint/2010/main" val="3314054882"/>
-      </p:ext>
-    </p:extLst>
-  </p:cSld>
-  <p:clrMapOvr>
-    <a:masterClrMapping/>
-  </p:clrMapOvr>
-</p:sldLayout>
-</file>
-
-<file path=ppt/slideLayouts/slideLayout51.xml><?xml version="1.0" encoding="utf-8"?>
 <p:sldLayout xmlns:a="http://schemas.openxmlformats.org/drawingml/2006/main" xmlns:r="http://schemas.openxmlformats.org/officeDocument/2006/relationships" xmlns:p="http://schemas.openxmlformats.org/presentationml/2006/main" preserve="1">
   <p:cSld name="Title and Content with Subheading">
     <p:spTree>
@@ -14675,7 +14498,7 @@
 </p:sldLayout>
 </file>
 
-<file path=ppt/slideLayouts/slideLayout52.xml><?xml version="1.0" encoding="utf-8"?>
+<file path=ppt/slideLayouts/slideLayout51.xml><?xml version="1.0" encoding="utf-8"?>
 <p:sldLayout xmlns:a="http://schemas.openxmlformats.org/drawingml/2006/main" xmlns:r="http://schemas.openxmlformats.org/officeDocument/2006/relationships" xmlns:p="http://schemas.openxmlformats.org/presentationml/2006/main" preserve="1">
   <p:cSld name="Large Bullet">
     <p:spTree>
@@ -14987,7 +14810,7 @@
 </p:sldLayout>
 </file>
 
-<file path=ppt/slideLayouts/slideLayout53.xml><?xml version="1.0" encoding="utf-8"?>
+<file path=ppt/slideLayouts/slideLayout52.xml><?xml version="1.0" encoding="utf-8"?>
 <p:sldLayout xmlns:a="http://schemas.openxmlformats.org/drawingml/2006/main" xmlns:r="http://schemas.openxmlformats.org/officeDocument/2006/relationships" xmlns:p="http://schemas.openxmlformats.org/presentationml/2006/main" showMasterSp="0" preserve="1">
   <p:cSld name="Section Header or Statement">
     <p:spTree>
@@ -15313,7 +15136,7 @@
 </p:sldLayout>
 </file>
 
-<file path=ppt/slideLayouts/slideLayout54.xml><?xml version="1.0" encoding="utf-8"?>
+<file path=ppt/slideLayouts/slideLayout53.xml><?xml version="1.0" encoding="utf-8"?>
 <p:sldLayout xmlns:a="http://schemas.openxmlformats.org/drawingml/2006/main" xmlns:r="http://schemas.openxmlformats.org/officeDocument/2006/relationships" xmlns:p="http://schemas.openxmlformats.org/presentationml/2006/main" preserve="1">
   <p:cSld name="Two Content">
     <p:spTree>
@@ -15717,7 +15540,7 @@
 </p:sldLayout>
 </file>
 
-<file path=ppt/slideLayouts/slideLayout55.xml><?xml version="1.0" encoding="utf-8"?>
+<file path=ppt/slideLayouts/slideLayout54.xml><?xml version="1.0" encoding="utf-8"?>
 <p:sldLayout xmlns:a="http://schemas.openxmlformats.org/drawingml/2006/main" xmlns:r="http://schemas.openxmlformats.org/officeDocument/2006/relationships" xmlns:p="http://schemas.openxmlformats.org/presentationml/2006/main" preserve="1">
   <p:cSld name="Comparison">
     <p:spTree>
@@ -16323,7 +16146,7 @@
 </p:sldLayout>
 </file>
 
-<file path=ppt/slideLayouts/slideLayout56.xml><?xml version="1.0" encoding="utf-8"?>
+<file path=ppt/slideLayouts/slideLayout55.xml><?xml version="1.0" encoding="utf-8"?>
 <p:sldLayout xmlns:a="http://schemas.openxmlformats.org/drawingml/2006/main" xmlns:r="http://schemas.openxmlformats.org/officeDocument/2006/relationships" xmlns:p="http://schemas.openxmlformats.org/presentationml/2006/main" preserve="1">
   <p:cSld name="Video Standard (4x3)">
     <p:spTree>
@@ -16555,7 +16378,7 @@
 </p:sldLayout>
 </file>
 
-<file path=ppt/slideLayouts/slideLayout57.xml><?xml version="1.0" encoding="utf-8"?>
+<file path=ppt/slideLayouts/slideLayout56.xml><?xml version="1.0" encoding="utf-8"?>
 <p:sldLayout xmlns:a="http://schemas.openxmlformats.org/drawingml/2006/main" xmlns:r="http://schemas.openxmlformats.org/officeDocument/2006/relationships" xmlns:p="http://schemas.openxmlformats.org/presentationml/2006/main" preserve="1">
   <p:cSld name="Video Widescreen (16 x 9)">
     <p:spTree>
@@ -16787,7 +16610,7 @@
 </p:sldLayout>
 </file>
 
-<file path=ppt/slideLayouts/slideLayout58.xml><?xml version="1.0" encoding="utf-8"?>
+<file path=ppt/slideLayouts/slideLayout57.xml><?xml version="1.0" encoding="utf-8"?>
 <p:sldLayout xmlns:a="http://schemas.openxmlformats.org/drawingml/2006/main" xmlns:r="http://schemas.openxmlformats.org/officeDocument/2006/relationships" xmlns:p="http://schemas.openxmlformats.org/presentationml/2006/main" preserve="1">
   <p:cSld name="Image and Text">
     <p:spTree>
@@ -17133,7 +16956,7 @@
 </p:sldLayout>
 </file>
 
-<file path=ppt/slideLayouts/slideLayout59.xml><?xml version="1.0" encoding="utf-8"?>
+<file path=ppt/slideLayouts/slideLayout58.xml><?xml version="1.0" encoding="utf-8"?>
 <p:sldLayout xmlns:a="http://schemas.openxmlformats.org/drawingml/2006/main" xmlns:r="http://schemas.openxmlformats.org/officeDocument/2006/relationships" xmlns:p="http://schemas.openxmlformats.org/presentationml/2006/main" preserve="1">
   <p:cSld name="Two Image and Text">
     <p:spTree>
@@ -17579,6 +17402,194 @@
     <p:extLst>
       <p:ext uri="{BB962C8B-B14F-4D97-AF65-F5344CB8AC3E}">
         <p14:creationId xmlns:p14="http://schemas.microsoft.com/office/powerpoint/2010/main" val="1127212296"/>
+      </p:ext>
+    </p:extLst>
+  </p:cSld>
+  <p:clrMapOvr>
+    <a:masterClrMapping/>
+  </p:clrMapOvr>
+</p:sldLayout>
+</file>
+
+<file path=ppt/slideLayouts/slideLayout59.xml><?xml version="1.0" encoding="utf-8"?>
+<p:sldLayout xmlns:a="http://schemas.openxmlformats.org/drawingml/2006/main" xmlns:r="http://schemas.openxmlformats.org/officeDocument/2006/relationships" xmlns:p="http://schemas.openxmlformats.org/presentationml/2006/main" preserve="1">
+  <p:cSld name="Title Only">
+    <p:spTree>
+      <p:nvGrpSpPr>
+        <p:cNvPr id="1" name=""/>
+        <p:cNvGrpSpPr/>
+        <p:nvPr/>
+      </p:nvGrpSpPr>
+      <p:grpSpPr>
+        <a:xfrm>
+          <a:off x="0" y="0"/>
+          <a:ext cx="0" cy="0"/>
+          <a:chOff x="0" y="0"/>
+          <a:chExt cx="0" cy="0"/>
+        </a:xfrm>
+      </p:grpSpPr>
+      <p:sp>
+        <p:nvSpPr>
+          <p:cNvPr id="5" name="Title 4"/>
+          <p:cNvSpPr>
+            <a:spLocks noGrp="1"/>
+          </p:cNvSpPr>
+          <p:nvPr>
+            <p:ph type="title"/>
+          </p:nvPr>
+        </p:nvSpPr>
+        <p:spPr>
+          <a:xfrm>
+            <a:off x="365124" y="294810"/>
+            <a:ext cx="7577139" cy="338554"/>
+          </a:xfrm>
+        </p:spPr>
+        <p:txBody>
+          <a:bodyPr/>
+          <a:lstStyle/>
+          <a:p>
+            <a:r>
+              <a:rPr lang="en-US"/>
+              <a:t>Click to edit Master title style</a:t>
+            </a:r>
+            <a:endParaRPr lang="en-GB"/>
+          </a:p>
+        </p:txBody>
+      </p:sp>
+      <p:sp>
+        <p:nvSpPr>
+          <p:cNvPr id="6" name="Date Placeholder 5"/>
+          <p:cNvSpPr>
+            <a:spLocks noGrp="1"/>
+          </p:cNvSpPr>
+          <p:nvPr>
+            <p:ph type="dt" sz="half" idx="15"/>
+          </p:nvPr>
+        </p:nvSpPr>
+        <p:spPr/>
+        <p:txBody>
+          <a:bodyPr/>
+          <a:lstStyle/>
+          <a:p>
+            <a:endParaRPr lang="en-US">
+              <a:solidFill>
+                <a:srgbClr val="9A8B7D"/>
+              </a:solidFill>
+            </a:endParaRPr>
+          </a:p>
+        </p:txBody>
+      </p:sp>
+      <p:sp>
+        <p:nvSpPr>
+          <p:cNvPr id="8" name="Footer Placeholder 7"/>
+          <p:cNvSpPr>
+            <a:spLocks noGrp="1"/>
+          </p:cNvSpPr>
+          <p:nvPr>
+            <p:ph type="ftr" sz="quarter" idx="16"/>
+          </p:nvPr>
+        </p:nvSpPr>
+        <p:spPr/>
+        <p:txBody>
+          <a:bodyPr/>
+          <a:lstStyle/>
+          <a:p>
+            <a:endParaRPr lang="en-US">
+              <a:solidFill>
+                <a:srgbClr val="9A8B7D"/>
+              </a:solidFill>
+            </a:endParaRPr>
+          </a:p>
+        </p:txBody>
+      </p:sp>
+      <p:sp>
+        <p:nvSpPr>
+          <p:cNvPr id="9" name="Slide Number Placeholder 8"/>
+          <p:cNvSpPr>
+            <a:spLocks noGrp="1"/>
+          </p:cNvSpPr>
+          <p:nvPr>
+            <p:ph type="sldNum" sz="quarter" idx="17"/>
+          </p:nvPr>
+        </p:nvSpPr>
+        <p:spPr/>
+        <p:txBody>
+          <a:bodyPr/>
+          <a:lstStyle/>
+          <a:p>
+            <a:fld id="{0A838F34-1B32-4019-A24D-EF473E6901BC}" type="slidenum">
+              <a:rPr lang="en-US" smtClean="0">
+                <a:solidFill>
+                  <a:srgbClr val="9A8B7D"/>
+                </a:solidFill>
+              </a:rPr>
+              <a:pPr/>
+              <a:t>‹#›</a:t>
+            </a:fld>
+            <a:endParaRPr lang="en-US">
+              <a:solidFill>
+                <a:srgbClr val="9A8B7D"/>
+              </a:solidFill>
+            </a:endParaRPr>
+          </a:p>
+        </p:txBody>
+      </p:sp>
+      <p:sp>
+        <p:nvSpPr>
+          <p:cNvPr id="10" name="Text Placeholder 2"/>
+          <p:cNvSpPr>
+            <a:spLocks noGrp="1"/>
+          </p:cNvSpPr>
+          <p:nvPr>
+            <p:ph type="body" sz="quarter" idx="14" hasCustomPrompt="1"/>
+          </p:nvPr>
+        </p:nvSpPr>
+        <p:spPr>
+          <a:xfrm>
+            <a:off x="365124" y="692554"/>
+            <a:ext cx="7597776" cy="234950"/>
+          </a:xfrm>
+        </p:spPr>
+        <p:txBody>
+          <a:bodyPr anchor="t" anchorCtr="0"/>
+          <a:lstStyle>
+            <a:lvl1pPr marL="0" indent="0">
+              <a:spcAft>
+                <a:spcPts val="0"/>
+              </a:spcAft>
+              <a:buNone/>
+              <a:defRPr sz="1800"/>
+            </a:lvl1pPr>
+            <a:lvl2pPr marL="271463" indent="0">
+              <a:buNone/>
+              <a:defRPr/>
+            </a:lvl2pPr>
+            <a:lvl3pPr marL="533400" indent="0">
+              <a:buNone/>
+              <a:defRPr/>
+            </a:lvl3pPr>
+            <a:lvl4pPr marL="815975" indent="0">
+              <a:buNone/>
+              <a:defRPr/>
+            </a:lvl4pPr>
+            <a:lvl5pPr marL="1104900" indent="0">
+              <a:buNone/>
+              <a:defRPr/>
+            </a:lvl5pPr>
+          </a:lstStyle>
+          <a:p>
+            <a:pPr lvl="0"/>
+            <a:r>
+              <a:rPr lang="en-US" dirty="0"/>
+              <a:t>Subtitle here if required</a:t>
+            </a:r>
+          </a:p>
+        </p:txBody>
+      </p:sp>
+    </p:spTree>
+    <p:extLst>
+      <p:ext uri="{BB962C8B-B14F-4D97-AF65-F5344CB8AC3E}">
+        <p14:creationId xmlns:p14="http://schemas.microsoft.com/office/powerpoint/2010/main" val="1769190964"/>
       </p:ext>
     </p:extLst>
   </p:cSld>
@@ -17700,7 +17711,7 @@
             <a:fld id="{4B3D3EAA-4720-4AEB-A041-FA3C86592F29}" type="datetimeFigureOut">
               <a:rPr lang="en-US" smtClean="0"/>
               <a:pPr/>
-              <a:t>6/17/2019</a:t>
+              <a:t>6/23/2019</a:t>
             </a:fld>
             <a:endParaRPr lang="en-US"/>
           </a:p>
@@ -17786,194 +17797,6 @@
 </file>
 
 <file path=ppt/slideLayouts/slideLayout60.xml><?xml version="1.0" encoding="utf-8"?>
-<p:sldLayout xmlns:a="http://schemas.openxmlformats.org/drawingml/2006/main" xmlns:r="http://schemas.openxmlformats.org/officeDocument/2006/relationships" xmlns:p="http://schemas.openxmlformats.org/presentationml/2006/main" preserve="1">
-  <p:cSld name="Title Only">
-    <p:spTree>
-      <p:nvGrpSpPr>
-        <p:cNvPr id="1" name=""/>
-        <p:cNvGrpSpPr/>
-        <p:nvPr/>
-      </p:nvGrpSpPr>
-      <p:grpSpPr>
-        <a:xfrm>
-          <a:off x="0" y="0"/>
-          <a:ext cx="0" cy="0"/>
-          <a:chOff x="0" y="0"/>
-          <a:chExt cx="0" cy="0"/>
-        </a:xfrm>
-      </p:grpSpPr>
-      <p:sp>
-        <p:nvSpPr>
-          <p:cNvPr id="5" name="Title 4"/>
-          <p:cNvSpPr>
-            <a:spLocks noGrp="1"/>
-          </p:cNvSpPr>
-          <p:nvPr>
-            <p:ph type="title"/>
-          </p:nvPr>
-        </p:nvSpPr>
-        <p:spPr>
-          <a:xfrm>
-            <a:off x="365124" y="294810"/>
-            <a:ext cx="7577139" cy="338554"/>
-          </a:xfrm>
-        </p:spPr>
-        <p:txBody>
-          <a:bodyPr/>
-          <a:lstStyle/>
-          <a:p>
-            <a:r>
-              <a:rPr lang="en-US"/>
-              <a:t>Click to edit Master title style</a:t>
-            </a:r>
-            <a:endParaRPr lang="en-GB"/>
-          </a:p>
-        </p:txBody>
-      </p:sp>
-      <p:sp>
-        <p:nvSpPr>
-          <p:cNvPr id="6" name="Date Placeholder 5"/>
-          <p:cNvSpPr>
-            <a:spLocks noGrp="1"/>
-          </p:cNvSpPr>
-          <p:nvPr>
-            <p:ph type="dt" sz="half" idx="15"/>
-          </p:nvPr>
-        </p:nvSpPr>
-        <p:spPr/>
-        <p:txBody>
-          <a:bodyPr/>
-          <a:lstStyle/>
-          <a:p>
-            <a:endParaRPr lang="en-US">
-              <a:solidFill>
-                <a:srgbClr val="9A8B7D"/>
-              </a:solidFill>
-            </a:endParaRPr>
-          </a:p>
-        </p:txBody>
-      </p:sp>
-      <p:sp>
-        <p:nvSpPr>
-          <p:cNvPr id="8" name="Footer Placeholder 7"/>
-          <p:cNvSpPr>
-            <a:spLocks noGrp="1"/>
-          </p:cNvSpPr>
-          <p:nvPr>
-            <p:ph type="ftr" sz="quarter" idx="16"/>
-          </p:nvPr>
-        </p:nvSpPr>
-        <p:spPr/>
-        <p:txBody>
-          <a:bodyPr/>
-          <a:lstStyle/>
-          <a:p>
-            <a:endParaRPr lang="en-US">
-              <a:solidFill>
-                <a:srgbClr val="9A8B7D"/>
-              </a:solidFill>
-            </a:endParaRPr>
-          </a:p>
-        </p:txBody>
-      </p:sp>
-      <p:sp>
-        <p:nvSpPr>
-          <p:cNvPr id="9" name="Slide Number Placeholder 8"/>
-          <p:cNvSpPr>
-            <a:spLocks noGrp="1"/>
-          </p:cNvSpPr>
-          <p:nvPr>
-            <p:ph type="sldNum" sz="quarter" idx="17"/>
-          </p:nvPr>
-        </p:nvSpPr>
-        <p:spPr/>
-        <p:txBody>
-          <a:bodyPr/>
-          <a:lstStyle/>
-          <a:p>
-            <a:fld id="{0A838F34-1B32-4019-A24D-EF473E6901BC}" type="slidenum">
-              <a:rPr lang="en-US" smtClean="0">
-                <a:solidFill>
-                  <a:srgbClr val="9A8B7D"/>
-                </a:solidFill>
-              </a:rPr>
-              <a:pPr/>
-              <a:t>‹#›</a:t>
-            </a:fld>
-            <a:endParaRPr lang="en-US">
-              <a:solidFill>
-                <a:srgbClr val="9A8B7D"/>
-              </a:solidFill>
-            </a:endParaRPr>
-          </a:p>
-        </p:txBody>
-      </p:sp>
-      <p:sp>
-        <p:nvSpPr>
-          <p:cNvPr id="10" name="Text Placeholder 2"/>
-          <p:cNvSpPr>
-            <a:spLocks noGrp="1"/>
-          </p:cNvSpPr>
-          <p:nvPr>
-            <p:ph type="body" sz="quarter" idx="14" hasCustomPrompt="1"/>
-          </p:nvPr>
-        </p:nvSpPr>
-        <p:spPr>
-          <a:xfrm>
-            <a:off x="365124" y="692554"/>
-            <a:ext cx="7597776" cy="234950"/>
-          </a:xfrm>
-        </p:spPr>
-        <p:txBody>
-          <a:bodyPr anchor="t" anchorCtr="0"/>
-          <a:lstStyle>
-            <a:lvl1pPr marL="0" indent="0">
-              <a:spcAft>
-                <a:spcPts val="0"/>
-              </a:spcAft>
-              <a:buNone/>
-              <a:defRPr sz="1800"/>
-            </a:lvl1pPr>
-            <a:lvl2pPr marL="271463" indent="0">
-              <a:buNone/>
-              <a:defRPr/>
-            </a:lvl2pPr>
-            <a:lvl3pPr marL="533400" indent="0">
-              <a:buNone/>
-              <a:defRPr/>
-            </a:lvl3pPr>
-            <a:lvl4pPr marL="815975" indent="0">
-              <a:buNone/>
-              <a:defRPr/>
-            </a:lvl4pPr>
-            <a:lvl5pPr marL="1104900" indent="0">
-              <a:buNone/>
-              <a:defRPr/>
-            </a:lvl5pPr>
-          </a:lstStyle>
-          <a:p>
-            <a:pPr lvl="0"/>
-            <a:r>
-              <a:rPr lang="en-US" dirty="0"/>
-              <a:t>Subtitle here if required</a:t>
-            </a:r>
-          </a:p>
-        </p:txBody>
-      </p:sp>
-    </p:spTree>
-    <p:extLst>
-      <p:ext uri="{BB962C8B-B14F-4D97-AF65-F5344CB8AC3E}">
-        <p14:creationId xmlns:p14="http://schemas.microsoft.com/office/powerpoint/2010/main" val="1769190964"/>
-      </p:ext>
-    </p:extLst>
-  </p:cSld>
-  <p:clrMapOvr>
-    <a:masterClrMapping/>
-  </p:clrMapOvr>
-</p:sldLayout>
-</file>
-
-<file path=ppt/slideLayouts/slideLayout61.xml><?xml version="1.0" encoding="utf-8"?>
 <p:sldLayout xmlns:a="http://schemas.openxmlformats.org/drawingml/2006/main" xmlns:r="http://schemas.openxmlformats.org/officeDocument/2006/relationships" xmlns:p="http://schemas.openxmlformats.org/presentationml/2006/main" showMasterSp="0" type="blank" preserve="1">
   <p:cSld name="Blank">
     <p:spTree>
@@ -18116,7 +17939,7 @@
 </p:sldLayout>
 </file>
 
-<file path=ppt/slideLayouts/slideLayout62.xml><?xml version="1.0" encoding="utf-8"?>
+<file path=ppt/slideLayouts/slideLayout61.xml><?xml version="1.0" encoding="utf-8"?>
 <p:sldLayout xmlns:a="http://schemas.openxmlformats.org/drawingml/2006/main" xmlns:r="http://schemas.openxmlformats.org/officeDocument/2006/relationships" xmlns:p="http://schemas.openxmlformats.org/presentationml/2006/main" type="objAndTwoObj">
   <p:cSld name="Title, Content, and 2 Content">
     <p:spTree>
@@ -18337,7 +18160,7 @@
 </p:sldLayout>
 </file>
 
-<file path=ppt/slideLayouts/slideLayout63.xml><?xml version="1.0" encoding="utf-8"?>
+<file path=ppt/slideLayouts/slideLayout62.xml><?xml version="1.0" encoding="utf-8"?>
 <p:sldLayout xmlns:a="http://schemas.openxmlformats.org/drawingml/2006/main" xmlns:r="http://schemas.openxmlformats.org/officeDocument/2006/relationships" xmlns:p="http://schemas.openxmlformats.org/presentationml/2006/main" type="twoObj">
   <p:cSld name="1_Two Content">
     <p:spTree>
@@ -18552,7 +18375,7 @@
 </p:sldLayout>
 </file>
 
-<file path=ppt/slideLayouts/slideLayout64.xml><?xml version="1.0" encoding="utf-8"?>
+<file path=ppt/slideLayouts/slideLayout63.xml><?xml version="1.0" encoding="utf-8"?>
 <p:sldLayout xmlns:a="http://schemas.openxmlformats.org/drawingml/2006/main" xmlns:r="http://schemas.openxmlformats.org/officeDocument/2006/relationships" xmlns:p="http://schemas.openxmlformats.org/presentationml/2006/main">
   <p:cSld name="2_Title and Content">
     <p:spTree>
@@ -18956,7 +18779,7 @@
             <a:fld id="{4B3D3EAA-4720-4AEB-A041-FA3C86592F29}" type="datetimeFigureOut">
               <a:rPr lang="en-US" smtClean="0"/>
               <a:pPr/>
-              <a:t>6/17/2019</a:t>
+              <a:t>6/23/2019</a:t>
             </a:fld>
             <a:endParaRPr lang="en-US"/>
           </a:p>
@@ -19303,7 +19126,7 @@
             <a:fld id="{4B3D3EAA-4720-4AEB-A041-FA3C86592F29}" type="datetimeFigureOut">
               <a:rPr lang="en-US" smtClean="0"/>
               <a:pPr/>
-              <a:t>6/17/2019</a:t>
+              <a:t>6/23/2019</a:t>
             </a:fld>
             <a:endParaRPr lang="en-US"/>
           </a:p>
@@ -19736,7 +19559,7 @@
             <a:fld id="{4B3D3EAA-4720-4AEB-A041-FA3C86592F29}" type="datetimeFigureOut">
               <a:rPr lang="en-US" smtClean="0"/>
               <a:pPr/>
-              <a:t>6/17/2019</a:t>
+              <a:t>6/23/2019</a:t>
             </a:fld>
             <a:endParaRPr lang="en-US"/>
           </a:p>
@@ -20057,7 +19880,7 @@
             <a:fld id="{4B3D3EAA-4720-4AEB-A041-FA3C86592F29}" type="datetimeFigureOut">
               <a:rPr lang="en-US" smtClean="0"/>
               <a:pPr/>
-              <a:t>6/17/2019</a:t>
+              <a:t>6/23/2019</a:t>
             </a:fld>
             <a:endParaRPr lang="en-US"/>
           </a:p>
@@ -20657,7 +20480,7 @@
           <p:nvPr/>
         </p:nvPicPr>
         <p:blipFill>
-          <a:blip r:embed="rId18" cstate="screen">
+          <a:blip r:embed="rId17" cstate="screen">
             <a:extLst>
               <a:ext uri="{28A0092B-C50C-407E-A947-70E740481C1C}">
                 <a14:useLocalDpi xmlns:a14="http://schemas.microsoft.com/office/drawing/2010/main" val="0"/>
@@ -20805,9 +20628,8 @@
     <p:sldLayoutId id="2147483686" r:id="rId11"/>
     <p:sldLayoutId id="2147483687" r:id="rId12"/>
     <p:sldLayoutId id="2147483688" r:id="rId13"/>
-    <p:sldLayoutId id="2147483689" r:id="rId14"/>
-    <p:sldLayoutId id="2147483690" r:id="rId15"/>
-    <p:sldLayoutId id="2147483691" r:id="rId16"/>
+    <p:sldLayoutId id="2147483690" r:id="rId14"/>
+    <p:sldLayoutId id="2147483691" r:id="rId15"/>
   </p:sldLayoutIdLst>
   <p:hf hdr="0" ftr="0" dt="0"/>
   <p:txStyles>
@@ -23046,265 +22868,6 @@
 </p:sld>
 </file>
 
-<file path=ppt/slides/slide10.xml><?xml version="1.0" encoding="utf-8"?>
-<p:sld xmlns:a="http://schemas.openxmlformats.org/drawingml/2006/main" xmlns:r="http://schemas.openxmlformats.org/officeDocument/2006/relationships" xmlns:p="http://schemas.openxmlformats.org/presentationml/2006/main">
-  <p:cSld>
-    <p:spTree>
-      <p:nvGrpSpPr>
-        <p:cNvPr id="1" name=""/>
-        <p:cNvGrpSpPr/>
-        <p:nvPr/>
-      </p:nvGrpSpPr>
-      <p:grpSpPr>
-        <a:xfrm>
-          <a:off x="0" y="0"/>
-          <a:ext cx="0" cy="0"/>
-          <a:chOff x="0" y="0"/>
-          <a:chExt cx="0" cy="0"/>
-        </a:xfrm>
-      </p:grpSpPr>
-      <p:sp>
-        <p:nvSpPr>
-          <p:cNvPr id="2" name="Title 1">
-            <a:extLst>
-              <a:ext uri="{FF2B5EF4-FFF2-40B4-BE49-F238E27FC236}">
-                <a16:creationId xmlns:a16="http://schemas.microsoft.com/office/drawing/2014/main" id="{A82C809E-055D-4E26-A5A7-2A1E00CE0C8E}"/>
-              </a:ext>
-            </a:extLst>
-          </p:cNvPr>
-          <p:cNvSpPr>
-            <a:spLocks noGrp="1"/>
-          </p:cNvSpPr>
-          <p:nvPr>
-            <p:ph type="title"/>
-          </p:nvPr>
-        </p:nvSpPr>
-        <p:spPr/>
-        <p:txBody>
-          <a:bodyPr/>
-          <a:lstStyle/>
-          <a:p>
-            <a:r>
-              <a:rPr lang="en-US" dirty="0"/>
-              <a:t>Stats bar charts</a:t>
-            </a:r>
-          </a:p>
-        </p:txBody>
-      </p:sp>
-      <p:sp>
-        <p:nvSpPr>
-          <p:cNvPr id="4" name="Text Placeholder 3">
-            <a:extLst>
-              <a:ext uri="{FF2B5EF4-FFF2-40B4-BE49-F238E27FC236}">
-                <a16:creationId xmlns:a16="http://schemas.microsoft.com/office/drawing/2014/main" id="{4E852665-AB70-4696-993E-2D749D674B4D}"/>
-              </a:ext>
-            </a:extLst>
-          </p:cNvPr>
-          <p:cNvSpPr>
-            <a:spLocks noGrp="1"/>
-          </p:cNvSpPr>
-          <p:nvPr>
-            <p:ph type="body" sz="quarter" idx="14"/>
-          </p:nvPr>
-        </p:nvSpPr>
-        <p:spPr/>
-        <p:txBody>
-          <a:bodyPr/>
-          <a:lstStyle/>
-          <a:p>
-            <a:endParaRPr lang="en-US"/>
-          </a:p>
-        </p:txBody>
-      </p:sp>
-      <p:sp>
-        <p:nvSpPr>
-          <p:cNvPr id="5" name="Slide Number Placeholder 4">
-            <a:extLst>
-              <a:ext uri="{FF2B5EF4-FFF2-40B4-BE49-F238E27FC236}">
-                <a16:creationId xmlns:a16="http://schemas.microsoft.com/office/drawing/2014/main" id="{439173BD-33EA-42B3-B778-ADD631ABB78A}"/>
-              </a:ext>
-            </a:extLst>
-          </p:cNvPr>
-          <p:cNvSpPr>
-            <a:spLocks noGrp="1"/>
-          </p:cNvSpPr>
-          <p:nvPr>
-            <p:ph type="sldNum" sz="quarter" idx="17"/>
-          </p:nvPr>
-        </p:nvSpPr>
-        <p:spPr/>
-        <p:txBody>
-          <a:bodyPr/>
-          <a:lstStyle/>
-          <a:p>
-            <a:fld id="{0A838F34-1B32-4019-A24D-EF473E6901BC}" type="slidenum">
-              <a:rPr lang="en-US" smtClean="0">
-                <a:solidFill>
-                  <a:srgbClr val="9A8B7D"/>
-                </a:solidFill>
-              </a:rPr>
-              <a:pPr/>
-              <a:t>10</a:t>
-            </a:fld>
-            <a:endParaRPr lang="en-US">
-              <a:solidFill>
-                <a:srgbClr val="9A8B7D"/>
-              </a:solidFill>
-            </a:endParaRPr>
-          </a:p>
-        </p:txBody>
-      </p:sp>
-      <p:pic>
-        <p:nvPicPr>
-          <p:cNvPr id="7" name="Picture 6">
-            <a:extLst>
-              <a:ext uri="{FF2B5EF4-FFF2-40B4-BE49-F238E27FC236}">
-                <a16:creationId xmlns:a16="http://schemas.microsoft.com/office/drawing/2014/main" id="{5D071394-E259-4091-BEB8-D965BBEF15C2}"/>
-              </a:ext>
-            </a:extLst>
-          </p:cNvPr>
-          <p:cNvPicPr>
-            <a:picLocks noChangeAspect="1"/>
-          </p:cNvPicPr>
-          <p:nvPr/>
-        </p:nvPicPr>
-        <p:blipFill rotWithShape="1">
-          <a:blip r:embed="rId2"/>
-          <a:srcRect l="9581" r="24510"/>
-          <a:stretch/>
-        </p:blipFill>
-        <p:spPr>
-          <a:xfrm>
-            <a:off x="2206156" y="1100738"/>
-            <a:ext cx="5649734" cy="2561336"/>
-          </a:xfrm>
-          <a:prstGeom prst="rect">
-            <a:avLst/>
-          </a:prstGeom>
-        </p:spPr>
-      </p:pic>
-      <p:sp>
-        <p:nvSpPr>
-          <p:cNvPr id="9" name="TextBox 8">
-            <a:extLst>
-              <a:ext uri="{FF2B5EF4-FFF2-40B4-BE49-F238E27FC236}">
-                <a16:creationId xmlns:a16="http://schemas.microsoft.com/office/drawing/2014/main" id="{C065B58C-CD0D-4B7A-9D42-D31593D6933C}"/>
-              </a:ext>
-            </a:extLst>
-          </p:cNvPr>
-          <p:cNvSpPr txBox="1"/>
-          <p:nvPr/>
-        </p:nvSpPr>
-        <p:spPr>
-          <a:xfrm rot="16200000">
-            <a:off x="904018" y="1684148"/>
-            <a:ext cx="2154804" cy="400110"/>
-          </a:xfrm>
-          <a:prstGeom prst="rect">
-            <a:avLst/>
-          </a:prstGeom>
-          <a:noFill/>
-        </p:spPr>
-        <p:txBody>
-          <a:bodyPr wrap="square" rtlCol="0">
-            <a:spAutoFit/>
-          </a:bodyPr>
-          <a:lstStyle/>
-          <a:p>
-            <a:pPr>
-              <a:buClr>
-                <a:schemeClr val="tx1"/>
-              </a:buClr>
-            </a:pPr>
-            <a:r>
-              <a:rPr lang="en-US" sz="2000" dirty="0"/>
-              <a:t># molecules</a:t>
-            </a:r>
-          </a:p>
-        </p:txBody>
-      </p:sp>
-      <p:sp>
-        <p:nvSpPr>
-          <p:cNvPr id="10" name="TextBox 9">
-            <a:extLst>
-              <a:ext uri="{FF2B5EF4-FFF2-40B4-BE49-F238E27FC236}">
-                <a16:creationId xmlns:a16="http://schemas.microsoft.com/office/drawing/2014/main" id="{7E9563D7-FD9C-447C-93BB-F90D4739C30A}"/>
-              </a:ext>
-            </a:extLst>
-          </p:cNvPr>
-          <p:cNvSpPr txBox="1"/>
-          <p:nvPr/>
-        </p:nvSpPr>
-        <p:spPr>
-          <a:xfrm rot="16200000">
-            <a:off x="904018" y="4204712"/>
-            <a:ext cx="2154804" cy="400110"/>
-          </a:xfrm>
-          <a:prstGeom prst="rect">
-            <a:avLst/>
-          </a:prstGeom>
-          <a:noFill/>
-        </p:spPr>
-        <p:txBody>
-          <a:bodyPr wrap="square" rtlCol="0">
-            <a:spAutoFit/>
-          </a:bodyPr>
-          <a:lstStyle/>
-          <a:p>
-            <a:pPr>
-              <a:buClr>
-                <a:schemeClr val="tx1"/>
-              </a:buClr>
-            </a:pPr>
-            <a:r>
-              <a:rPr lang="en-US" sz="2000" dirty="0"/>
-              <a:t># molecules</a:t>
-            </a:r>
-          </a:p>
-        </p:txBody>
-      </p:sp>
-      <p:pic>
-        <p:nvPicPr>
-          <p:cNvPr id="12" name="Picture 11">
-            <a:extLst>
-              <a:ext uri="{FF2B5EF4-FFF2-40B4-BE49-F238E27FC236}">
-                <a16:creationId xmlns:a16="http://schemas.microsoft.com/office/drawing/2014/main" id="{54DBEF6F-BEBF-4888-BE5E-712455B600BE}"/>
-              </a:ext>
-            </a:extLst>
-          </p:cNvPr>
-          <p:cNvPicPr>
-            <a:picLocks noChangeAspect="1"/>
-          </p:cNvPicPr>
-          <p:nvPr/>
-        </p:nvPicPr>
-        <p:blipFill rotWithShape="1">
-          <a:blip r:embed="rId3"/>
-          <a:srcRect l="10006" r="25193"/>
-          <a:stretch/>
-        </p:blipFill>
-        <p:spPr>
-          <a:xfrm>
-            <a:off x="2183845" y="3646173"/>
-            <a:ext cx="5462547" cy="2600325"/>
-          </a:xfrm>
-          <a:prstGeom prst="rect">
-            <a:avLst/>
-          </a:prstGeom>
-        </p:spPr>
-      </p:pic>
-    </p:spTree>
-    <p:extLst>
-      <p:ext uri="{BB962C8B-B14F-4D97-AF65-F5344CB8AC3E}">
-        <p14:creationId xmlns:p14="http://schemas.microsoft.com/office/powerpoint/2010/main" val="892661274"/>
-      </p:ext>
-    </p:extLst>
-  </p:cSld>
-  <p:clrMapOvr>
-    <a:masterClrMapping/>
-  </p:clrMapOvr>
-</p:sld>
-</file>
-
 <file path=ppt/slides/slide2.xml><?xml version="1.0" encoding="utf-8"?>
 <p:sld xmlns:a="http://schemas.openxmlformats.org/drawingml/2006/main" xmlns:r="http://schemas.openxmlformats.org/officeDocument/2006/relationships" xmlns:p="http://schemas.openxmlformats.org/presentationml/2006/main">
   <p:cSld>
@@ -24975,628 +24538,6 @@
           <a:chExt cx="0" cy="0"/>
         </a:xfrm>
       </p:grpSpPr>
-      <p:sp>
-        <p:nvSpPr>
-          <p:cNvPr id="2" name="Title 1">
-            <a:extLst>
-              <a:ext uri="{FF2B5EF4-FFF2-40B4-BE49-F238E27FC236}">
-                <a16:creationId xmlns:a16="http://schemas.microsoft.com/office/drawing/2014/main" id="{099BDF01-E9E5-4B18-BDE1-781F83E135D8}"/>
-              </a:ext>
-            </a:extLst>
-          </p:cNvPr>
-          <p:cNvSpPr>
-            <a:spLocks noGrp="1"/>
-          </p:cNvSpPr>
-          <p:nvPr>
-            <p:ph type="title"/>
-          </p:nvPr>
-        </p:nvSpPr>
-        <p:spPr/>
-        <p:txBody>
-          <a:bodyPr/>
-          <a:lstStyle/>
-          <a:p>
-            <a:r>
-              <a:rPr lang="en-US" dirty="0"/>
-              <a:t>Figure 2 – SNG removed from approved version</a:t>
-            </a:r>
-          </a:p>
-        </p:txBody>
-      </p:sp>
-      <p:sp>
-        <p:nvSpPr>
-          <p:cNvPr id="3" name="Content Placeholder 2">
-            <a:extLst>
-              <a:ext uri="{FF2B5EF4-FFF2-40B4-BE49-F238E27FC236}">
-                <a16:creationId xmlns:a16="http://schemas.microsoft.com/office/drawing/2014/main" id="{18FE8DAA-69CD-4630-BC2E-1625B7C1303D}"/>
-              </a:ext>
-            </a:extLst>
-          </p:cNvPr>
-          <p:cNvSpPr>
-            <a:spLocks noGrp="1"/>
-          </p:cNvSpPr>
-          <p:nvPr>
-            <p:ph idx="1"/>
-          </p:nvPr>
-        </p:nvSpPr>
-        <p:spPr/>
-        <p:txBody>
-          <a:bodyPr/>
-          <a:lstStyle/>
-          <a:p>
-            <a:endParaRPr lang="en-US" dirty="0"/>
-          </a:p>
-        </p:txBody>
-      </p:sp>
-      <p:sp>
-        <p:nvSpPr>
-          <p:cNvPr id="4" name="Slide Number Placeholder 3">
-            <a:extLst>
-              <a:ext uri="{FF2B5EF4-FFF2-40B4-BE49-F238E27FC236}">
-                <a16:creationId xmlns:a16="http://schemas.microsoft.com/office/drawing/2014/main" id="{781F2F88-7DCC-492F-8ECA-D0AE94A2CC4E}"/>
-              </a:ext>
-            </a:extLst>
-          </p:cNvPr>
-          <p:cNvSpPr>
-            <a:spLocks noGrp="1"/>
-          </p:cNvSpPr>
-          <p:nvPr>
-            <p:ph type="sldNum" sz="quarter" idx="11"/>
-          </p:nvPr>
-        </p:nvSpPr>
-        <p:spPr/>
-        <p:txBody>
-          <a:bodyPr/>
-          <a:lstStyle/>
-          <a:p>
-            <a:r>
-              <a:rPr lang="en-US">
-                <a:solidFill>
-                  <a:srgbClr val="9A8B7D"/>
-                </a:solidFill>
-              </a:rPr>
-              <a:t>&lt;#&gt;</a:t>
-            </a:r>
-            <a:endParaRPr lang="en-US" dirty="0">
-              <a:solidFill>
-                <a:srgbClr val="9A8B7D"/>
-              </a:solidFill>
-            </a:endParaRPr>
-          </a:p>
-        </p:txBody>
-      </p:sp>
-      <p:pic>
-        <p:nvPicPr>
-          <p:cNvPr id="5" name="Picture 4">
-            <a:extLst>
-              <a:ext uri="{FF2B5EF4-FFF2-40B4-BE49-F238E27FC236}">
-                <a16:creationId xmlns:a16="http://schemas.microsoft.com/office/drawing/2014/main" id="{6713CB69-0141-4A9B-B7A1-E4636D9C688F}"/>
-              </a:ext>
-            </a:extLst>
-          </p:cNvPr>
-          <p:cNvPicPr>
-            <a:picLocks noChangeAspect="1"/>
-          </p:cNvPicPr>
-          <p:nvPr/>
-        </p:nvPicPr>
-        <p:blipFill>
-          <a:blip r:embed="rId2"/>
-          <a:stretch>
-            <a:fillRect/>
-          </a:stretch>
-        </p:blipFill>
-        <p:spPr>
-          <a:xfrm>
-            <a:off x="250415" y="1112858"/>
-            <a:ext cx="4238433" cy="2906078"/>
-          </a:xfrm>
-          <a:prstGeom prst="rect">
-            <a:avLst/>
-          </a:prstGeom>
-        </p:spPr>
-      </p:pic>
-      <p:pic>
-        <p:nvPicPr>
-          <p:cNvPr id="6" name="Picture 5">
-            <a:extLst>
-              <a:ext uri="{FF2B5EF4-FFF2-40B4-BE49-F238E27FC236}">
-                <a16:creationId xmlns:a16="http://schemas.microsoft.com/office/drawing/2014/main" id="{FBA8A0CD-E003-48D6-A06B-A53403A9FFF5}"/>
-              </a:ext>
-            </a:extLst>
-          </p:cNvPr>
-          <p:cNvPicPr>
-            <a:picLocks noChangeAspect="1"/>
-          </p:cNvPicPr>
-          <p:nvPr/>
-        </p:nvPicPr>
-        <p:blipFill>
-          <a:blip r:embed="rId3"/>
-          <a:stretch>
-            <a:fillRect/>
-          </a:stretch>
-        </p:blipFill>
-        <p:spPr>
-          <a:xfrm>
-            <a:off x="4210665" y="3047815"/>
-            <a:ext cx="4793226" cy="2806885"/>
-          </a:xfrm>
-          <a:prstGeom prst="rect">
-            <a:avLst/>
-          </a:prstGeom>
-        </p:spPr>
-      </p:pic>
-    </p:spTree>
-    <p:extLst>
-      <p:ext uri="{BB962C8B-B14F-4D97-AF65-F5344CB8AC3E}">
-        <p14:creationId xmlns:p14="http://schemas.microsoft.com/office/powerpoint/2010/main" val="1952249491"/>
-      </p:ext>
-    </p:extLst>
-  </p:cSld>
-  <p:clrMapOvr>
-    <a:masterClrMapping/>
-  </p:clrMapOvr>
-  <p:transition>
-    <p:random/>
-  </p:transition>
-</p:sld>
-</file>
-
-<file path=ppt/slides/slide5.xml><?xml version="1.0" encoding="utf-8"?>
-<p:sld xmlns:a="http://schemas.openxmlformats.org/drawingml/2006/main" xmlns:r="http://schemas.openxmlformats.org/officeDocument/2006/relationships" xmlns:p="http://schemas.openxmlformats.org/presentationml/2006/main">
-  <p:cSld>
-    <p:spTree>
-      <p:nvGrpSpPr>
-        <p:cNvPr id="1" name=""/>
-        <p:cNvGrpSpPr/>
-        <p:nvPr/>
-      </p:nvGrpSpPr>
-      <p:grpSpPr>
-        <a:xfrm>
-          <a:off x="0" y="0"/>
-          <a:ext cx="0" cy="0"/>
-          <a:chOff x="0" y="0"/>
-          <a:chExt cx="0" cy="0"/>
-        </a:xfrm>
-      </p:grpSpPr>
-      <p:sp>
-        <p:nvSpPr>
-          <p:cNvPr id="2" name="Title 1">
-            <a:extLst>
-              <a:ext uri="{FF2B5EF4-FFF2-40B4-BE49-F238E27FC236}">
-                <a16:creationId xmlns:a16="http://schemas.microsoft.com/office/drawing/2014/main" id="{B25CF516-4F28-4EE9-A976-CB97E038F075}"/>
-              </a:ext>
-            </a:extLst>
-          </p:cNvPr>
-          <p:cNvSpPr>
-            <a:spLocks noGrp="1"/>
-          </p:cNvSpPr>
-          <p:nvPr>
-            <p:ph type="title"/>
-          </p:nvPr>
-        </p:nvSpPr>
-        <p:spPr/>
-        <p:txBody>
-          <a:bodyPr/>
-          <a:lstStyle/>
-          <a:p>
-            <a:r>
-              <a:rPr lang="en-US" dirty="0"/>
-              <a:t>Figure 3 : Removed SNG</a:t>
-            </a:r>
-          </a:p>
-        </p:txBody>
-      </p:sp>
-      <p:sp>
-        <p:nvSpPr>
-          <p:cNvPr id="4" name="Slide Number Placeholder 3">
-            <a:extLst>
-              <a:ext uri="{FF2B5EF4-FFF2-40B4-BE49-F238E27FC236}">
-                <a16:creationId xmlns:a16="http://schemas.microsoft.com/office/drawing/2014/main" id="{D4BA2241-FBB1-454B-9CA0-3303B4067AC2}"/>
-              </a:ext>
-            </a:extLst>
-          </p:cNvPr>
-          <p:cNvSpPr>
-            <a:spLocks noGrp="1"/>
-          </p:cNvSpPr>
-          <p:nvPr>
-            <p:ph type="sldNum" sz="quarter" idx="11"/>
-          </p:nvPr>
-        </p:nvSpPr>
-        <p:spPr/>
-        <p:txBody>
-          <a:bodyPr/>
-          <a:lstStyle/>
-          <a:p>
-            <a:r>
-              <a:rPr lang="en-US">
-                <a:solidFill>
-                  <a:srgbClr val="9A8B7D"/>
-                </a:solidFill>
-              </a:rPr>
-              <a:t>&lt;#&gt;</a:t>
-            </a:r>
-            <a:endParaRPr lang="en-US" dirty="0">
-              <a:solidFill>
-                <a:srgbClr val="9A8B7D"/>
-              </a:solidFill>
-            </a:endParaRPr>
-          </a:p>
-        </p:txBody>
-      </p:sp>
-      <p:pic>
-        <p:nvPicPr>
-          <p:cNvPr id="5" name="Picture 4">
-            <a:extLst>
-              <a:ext uri="{FF2B5EF4-FFF2-40B4-BE49-F238E27FC236}">
-                <a16:creationId xmlns:a16="http://schemas.microsoft.com/office/drawing/2014/main" id="{658B9630-BDA8-4960-8745-7AB8F73EE4F6}"/>
-              </a:ext>
-            </a:extLst>
-          </p:cNvPr>
-          <p:cNvPicPr>
-            <a:picLocks noChangeAspect="1"/>
-          </p:cNvPicPr>
-          <p:nvPr/>
-        </p:nvPicPr>
-        <p:blipFill>
-          <a:blip r:embed="rId2"/>
-          <a:stretch>
-            <a:fillRect/>
-          </a:stretch>
-        </p:blipFill>
-        <p:spPr>
-          <a:xfrm>
-            <a:off x="599494" y="1188927"/>
-            <a:ext cx="6827808" cy="5198806"/>
-          </a:xfrm>
-          <a:prstGeom prst="rect">
-            <a:avLst/>
-          </a:prstGeom>
-        </p:spPr>
-      </p:pic>
-    </p:spTree>
-    <p:extLst>
-      <p:ext uri="{BB962C8B-B14F-4D97-AF65-F5344CB8AC3E}">
-        <p14:creationId xmlns:p14="http://schemas.microsoft.com/office/powerpoint/2010/main" val="2772977335"/>
-      </p:ext>
-    </p:extLst>
-  </p:cSld>
-  <p:clrMapOvr>
-    <a:masterClrMapping/>
-  </p:clrMapOvr>
-  <p:transition>
-    <p:random/>
-  </p:transition>
-</p:sld>
-</file>
-
-<file path=ppt/slides/slide6.xml><?xml version="1.0" encoding="utf-8"?>
-<p:sld xmlns:a="http://schemas.openxmlformats.org/drawingml/2006/main" xmlns:r="http://schemas.openxmlformats.org/officeDocument/2006/relationships" xmlns:p="http://schemas.openxmlformats.org/presentationml/2006/main">
-  <p:cSld>
-    <p:spTree>
-      <p:nvGrpSpPr>
-        <p:cNvPr id="1" name=""/>
-        <p:cNvGrpSpPr/>
-        <p:nvPr/>
-      </p:nvGrpSpPr>
-      <p:grpSpPr>
-        <a:xfrm>
-          <a:off x="0" y="0"/>
-          <a:ext cx="0" cy="0"/>
-          <a:chOff x="0" y="0"/>
-          <a:chExt cx="0" cy="0"/>
-        </a:xfrm>
-      </p:grpSpPr>
-      <p:sp>
-        <p:nvSpPr>
-          <p:cNvPr id="2" name="Title 1">
-            <a:extLst>
-              <a:ext uri="{FF2B5EF4-FFF2-40B4-BE49-F238E27FC236}">
-                <a16:creationId xmlns:a16="http://schemas.microsoft.com/office/drawing/2014/main" id="{19190722-C8C0-476E-BA3D-5413CD8FFB94}"/>
-              </a:ext>
-            </a:extLst>
-          </p:cNvPr>
-          <p:cNvSpPr>
-            <a:spLocks noGrp="1"/>
-          </p:cNvSpPr>
-          <p:nvPr>
-            <p:ph type="title"/>
-          </p:nvPr>
-        </p:nvSpPr>
-        <p:spPr/>
-        <p:txBody>
-          <a:bodyPr/>
-          <a:lstStyle/>
-          <a:p>
-            <a:r>
-              <a:rPr lang="en-US" dirty="0"/>
-              <a:t>Figure 5: Added (a) molecule depiction</a:t>
-            </a:r>
-          </a:p>
-        </p:txBody>
-      </p:sp>
-      <p:sp>
-        <p:nvSpPr>
-          <p:cNvPr id="4" name="Slide Number Placeholder 3">
-            <a:extLst>
-              <a:ext uri="{FF2B5EF4-FFF2-40B4-BE49-F238E27FC236}">
-                <a16:creationId xmlns:a16="http://schemas.microsoft.com/office/drawing/2014/main" id="{64083F5E-5CCD-49C7-93A7-816FF3AA87F0}"/>
-              </a:ext>
-            </a:extLst>
-          </p:cNvPr>
-          <p:cNvSpPr>
-            <a:spLocks noGrp="1"/>
-          </p:cNvSpPr>
-          <p:nvPr>
-            <p:ph type="sldNum" sz="quarter" idx="11"/>
-          </p:nvPr>
-        </p:nvSpPr>
-        <p:spPr/>
-        <p:txBody>
-          <a:bodyPr/>
-          <a:lstStyle/>
-          <a:p>
-            <a:r>
-              <a:rPr lang="en-US">
-                <a:solidFill>
-                  <a:srgbClr val="9A8B7D"/>
-                </a:solidFill>
-              </a:rPr>
-              <a:t>&lt;#&gt;</a:t>
-            </a:r>
-            <a:endParaRPr lang="en-US" dirty="0">
-              <a:solidFill>
-                <a:srgbClr val="9A8B7D"/>
-              </a:solidFill>
-            </a:endParaRPr>
-          </a:p>
-        </p:txBody>
-      </p:sp>
-      <p:pic>
-        <p:nvPicPr>
-          <p:cNvPr id="7" name="Picture 6">
-            <a:extLst>
-              <a:ext uri="{FF2B5EF4-FFF2-40B4-BE49-F238E27FC236}">
-                <a16:creationId xmlns:a16="http://schemas.microsoft.com/office/drawing/2014/main" id="{6B8DB143-8C80-49B4-A0D0-1651A66A9B78}"/>
-              </a:ext>
-            </a:extLst>
-          </p:cNvPr>
-          <p:cNvPicPr>
-            <a:picLocks noChangeAspect="1"/>
-          </p:cNvPicPr>
-          <p:nvPr/>
-        </p:nvPicPr>
-        <p:blipFill>
-          <a:blip r:embed="rId2"/>
-          <a:stretch>
-            <a:fillRect/>
-          </a:stretch>
-        </p:blipFill>
-        <p:spPr>
-          <a:xfrm>
-            <a:off x="998925" y="995514"/>
-            <a:ext cx="4133850" cy="3967163"/>
-          </a:xfrm>
-          <a:prstGeom prst="rect">
-            <a:avLst/>
-          </a:prstGeom>
-        </p:spPr>
-      </p:pic>
-      <p:pic>
-        <p:nvPicPr>
-          <p:cNvPr id="8" name="Picture 7">
-            <a:extLst>
-              <a:ext uri="{FF2B5EF4-FFF2-40B4-BE49-F238E27FC236}">
-                <a16:creationId xmlns:a16="http://schemas.microsoft.com/office/drawing/2014/main" id="{A7E7C113-017F-4D7E-84D6-7C41295CD3C6}"/>
-              </a:ext>
-            </a:extLst>
-          </p:cNvPr>
-          <p:cNvPicPr>
-            <a:picLocks noChangeAspect="1"/>
-          </p:cNvPicPr>
-          <p:nvPr/>
-        </p:nvPicPr>
-        <p:blipFill>
-          <a:blip r:embed="rId3"/>
-          <a:stretch>
-            <a:fillRect/>
-          </a:stretch>
-        </p:blipFill>
-        <p:spPr>
-          <a:xfrm>
-            <a:off x="567812" y="4968483"/>
-            <a:ext cx="5181600" cy="1462088"/>
-          </a:xfrm>
-          <a:prstGeom prst="rect">
-            <a:avLst/>
-          </a:prstGeom>
-        </p:spPr>
-      </p:pic>
-    </p:spTree>
-    <p:extLst>
-      <p:ext uri="{BB962C8B-B14F-4D97-AF65-F5344CB8AC3E}">
-        <p14:creationId xmlns:p14="http://schemas.microsoft.com/office/powerpoint/2010/main" val="1958881048"/>
-      </p:ext>
-    </p:extLst>
-  </p:cSld>
-  <p:clrMapOvr>
-    <a:masterClrMapping/>
-  </p:clrMapOvr>
-  <p:transition>
-    <p:random/>
-  </p:transition>
-</p:sld>
-</file>
-
-<file path=ppt/slides/slide7.xml><?xml version="1.0" encoding="utf-8"?>
-<p:sld xmlns:a="http://schemas.openxmlformats.org/drawingml/2006/main" xmlns:r="http://schemas.openxmlformats.org/officeDocument/2006/relationships" xmlns:p="http://schemas.openxmlformats.org/presentationml/2006/main">
-  <p:cSld>
-    <p:spTree>
-      <p:nvGrpSpPr>
-        <p:cNvPr id="1" name=""/>
-        <p:cNvGrpSpPr/>
-        <p:nvPr/>
-      </p:nvGrpSpPr>
-      <p:grpSpPr>
-        <a:xfrm>
-          <a:off x="0" y="0"/>
-          <a:ext cx="0" cy="0"/>
-          <a:chOff x="0" y="0"/>
-          <a:chExt cx="0" cy="0"/>
-        </a:xfrm>
-      </p:grpSpPr>
-      <p:sp>
-        <p:nvSpPr>
-          <p:cNvPr id="2" name="Title 1">
-            <a:extLst>
-              <a:ext uri="{FF2B5EF4-FFF2-40B4-BE49-F238E27FC236}">
-                <a16:creationId xmlns:a16="http://schemas.microsoft.com/office/drawing/2014/main" id="{101AE10D-2E5A-4DCC-8E5D-3CA6FCEFE44F}"/>
-              </a:ext>
-            </a:extLst>
-          </p:cNvPr>
-          <p:cNvSpPr>
-            <a:spLocks noGrp="1"/>
-          </p:cNvSpPr>
-          <p:nvPr>
-            <p:ph type="title"/>
-          </p:nvPr>
-        </p:nvSpPr>
-        <p:spPr/>
-        <p:txBody>
-          <a:bodyPr/>
-          <a:lstStyle/>
-          <a:p>
-            <a:r>
-              <a:rPr lang="en-US" dirty="0"/>
-              <a:t>Fig 13 new version without color circles, with legend</a:t>
-            </a:r>
-          </a:p>
-        </p:txBody>
-      </p:sp>
-      <p:sp>
-        <p:nvSpPr>
-          <p:cNvPr id="3" name="Content Placeholder 2">
-            <a:extLst>
-              <a:ext uri="{FF2B5EF4-FFF2-40B4-BE49-F238E27FC236}">
-                <a16:creationId xmlns:a16="http://schemas.microsoft.com/office/drawing/2014/main" id="{BDA7D6D5-0803-4E8D-ADD7-BEED1BEB5CA3}"/>
-              </a:ext>
-            </a:extLst>
-          </p:cNvPr>
-          <p:cNvSpPr>
-            <a:spLocks noGrp="1"/>
-          </p:cNvSpPr>
-          <p:nvPr>
-            <p:ph idx="1"/>
-          </p:nvPr>
-        </p:nvSpPr>
-        <p:spPr/>
-        <p:txBody>
-          <a:bodyPr/>
-          <a:lstStyle/>
-          <a:p>
-            <a:endParaRPr lang="en-US"/>
-          </a:p>
-        </p:txBody>
-      </p:sp>
-      <p:sp>
-        <p:nvSpPr>
-          <p:cNvPr id="4" name="Slide Number Placeholder 3">
-            <a:extLst>
-              <a:ext uri="{FF2B5EF4-FFF2-40B4-BE49-F238E27FC236}">
-                <a16:creationId xmlns:a16="http://schemas.microsoft.com/office/drawing/2014/main" id="{4B1DF8B8-29CF-40E2-A19C-A12C2C4F0E75}"/>
-              </a:ext>
-            </a:extLst>
-          </p:cNvPr>
-          <p:cNvSpPr>
-            <a:spLocks noGrp="1"/>
-          </p:cNvSpPr>
-          <p:nvPr>
-            <p:ph type="sldNum" sz="quarter" idx="11"/>
-          </p:nvPr>
-        </p:nvSpPr>
-        <p:spPr/>
-        <p:txBody>
-          <a:bodyPr/>
-          <a:lstStyle/>
-          <a:p>
-            <a:r>
-              <a:rPr lang="en-US">
-                <a:solidFill>
-                  <a:srgbClr val="9A8B7D"/>
-                </a:solidFill>
-              </a:rPr>
-              <a:t>&lt;#&gt;</a:t>
-            </a:r>
-            <a:endParaRPr lang="en-US" dirty="0">
-              <a:solidFill>
-                <a:srgbClr val="9A8B7D"/>
-              </a:solidFill>
-            </a:endParaRPr>
-          </a:p>
-        </p:txBody>
-      </p:sp>
-      <p:pic>
-        <p:nvPicPr>
-          <p:cNvPr id="5" name="Picture 4">
-            <a:extLst>
-              <a:ext uri="{FF2B5EF4-FFF2-40B4-BE49-F238E27FC236}">
-                <a16:creationId xmlns:a16="http://schemas.microsoft.com/office/drawing/2014/main" id="{7628CD14-8392-4146-A001-A7A5F810D440}"/>
-              </a:ext>
-            </a:extLst>
-          </p:cNvPr>
-          <p:cNvPicPr>
-            <a:picLocks noChangeAspect="1"/>
-          </p:cNvPicPr>
-          <p:nvPr/>
-        </p:nvPicPr>
-        <p:blipFill>
-          <a:blip r:embed="rId2"/>
-          <a:stretch>
-            <a:fillRect/>
-          </a:stretch>
-        </p:blipFill>
-        <p:spPr>
-          <a:xfrm>
-            <a:off x="81117" y="1086767"/>
-            <a:ext cx="8778876" cy="4870091"/>
-          </a:xfrm>
-          <a:prstGeom prst="rect">
-            <a:avLst/>
-          </a:prstGeom>
-        </p:spPr>
-      </p:pic>
-    </p:spTree>
-    <p:extLst>
-      <p:ext uri="{BB962C8B-B14F-4D97-AF65-F5344CB8AC3E}">
-        <p14:creationId xmlns:p14="http://schemas.microsoft.com/office/powerpoint/2010/main" val="3985893669"/>
-      </p:ext>
-    </p:extLst>
-  </p:cSld>
-  <p:clrMapOvr>
-    <a:masterClrMapping/>
-  </p:clrMapOvr>
-  <p:transition>
-    <p:random/>
-  </p:transition>
-</p:sld>
-</file>
-
-<file path=ppt/slides/slide8.xml><?xml version="1.0" encoding="utf-8"?>
-<p:sld xmlns:a="http://schemas.openxmlformats.org/drawingml/2006/main" xmlns:r="http://schemas.openxmlformats.org/officeDocument/2006/relationships" xmlns:p="http://schemas.openxmlformats.org/presentationml/2006/main">
-  <p:cSld>
-    <p:spTree>
-      <p:nvGrpSpPr>
-        <p:cNvPr id="1" name=""/>
-        <p:cNvGrpSpPr/>
-        <p:nvPr/>
-      </p:nvGrpSpPr>
-      <p:grpSpPr>
-        <a:xfrm>
-          <a:off x="0" y="0"/>
-          <a:ext cx="0" cy="0"/>
-          <a:chOff x="0" y="0"/>
-          <a:chExt cx="0" cy="0"/>
-        </a:xfrm>
-      </p:grpSpPr>
       <p:pic>
         <p:nvPicPr>
           <p:cNvPr id="10" name="Picture 9">
@@ -25675,7 +24616,7 @@
                 </a:solidFill>
               </a:rPr>
               <a:pPr/>
-              <a:t>8</a:t>
+              <a:t>4</a:t>
             </a:fld>
             <a:endParaRPr lang="en-US">
               <a:solidFill>
@@ -26006,7 +24947,7 @@
 </p:sld>
 </file>
 
-<file path=ppt/slides/slide9.xml><?xml version="1.0" encoding="utf-8"?>
+<file path=ppt/slides/slide5.xml><?xml version="1.0" encoding="utf-8"?>
 <p:sld xmlns:a="http://schemas.openxmlformats.org/drawingml/2006/main" xmlns:r="http://schemas.openxmlformats.org/officeDocument/2006/relationships" xmlns:p="http://schemas.openxmlformats.org/presentationml/2006/main">
   <p:cSld>
     <p:spTree>
@@ -26072,7 +25013,7 @@
                 </a:solidFill>
               </a:rPr>
               <a:pPr/>
-              <a:t>9</a:t>
+              <a:t>5</a:t>
             </a:fld>
             <a:endParaRPr lang="en-US">
               <a:solidFill>
@@ -26479,6 +25420,265 @@
     <a:masterClrMapping/>
   </p:clrMapOvr>
   <p:transition/>
+</p:sld>
+</file>
+
+<file path=ppt/slides/slide6.xml><?xml version="1.0" encoding="utf-8"?>
+<p:sld xmlns:a="http://schemas.openxmlformats.org/drawingml/2006/main" xmlns:r="http://schemas.openxmlformats.org/officeDocument/2006/relationships" xmlns:p="http://schemas.openxmlformats.org/presentationml/2006/main">
+  <p:cSld>
+    <p:spTree>
+      <p:nvGrpSpPr>
+        <p:cNvPr id="1" name=""/>
+        <p:cNvGrpSpPr/>
+        <p:nvPr/>
+      </p:nvGrpSpPr>
+      <p:grpSpPr>
+        <a:xfrm>
+          <a:off x="0" y="0"/>
+          <a:ext cx="0" cy="0"/>
+          <a:chOff x="0" y="0"/>
+          <a:chExt cx="0" cy="0"/>
+        </a:xfrm>
+      </p:grpSpPr>
+      <p:sp>
+        <p:nvSpPr>
+          <p:cNvPr id="2" name="Title 1">
+            <a:extLst>
+              <a:ext uri="{FF2B5EF4-FFF2-40B4-BE49-F238E27FC236}">
+                <a16:creationId xmlns:a16="http://schemas.microsoft.com/office/drawing/2014/main" id="{A82C809E-055D-4E26-A5A7-2A1E00CE0C8E}"/>
+              </a:ext>
+            </a:extLst>
+          </p:cNvPr>
+          <p:cNvSpPr>
+            <a:spLocks noGrp="1"/>
+          </p:cNvSpPr>
+          <p:nvPr>
+            <p:ph type="title"/>
+          </p:nvPr>
+        </p:nvSpPr>
+        <p:spPr/>
+        <p:txBody>
+          <a:bodyPr/>
+          <a:lstStyle/>
+          <a:p>
+            <a:r>
+              <a:rPr lang="en-US" dirty="0"/>
+              <a:t>Stats bar charts</a:t>
+            </a:r>
+          </a:p>
+        </p:txBody>
+      </p:sp>
+      <p:sp>
+        <p:nvSpPr>
+          <p:cNvPr id="4" name="Text Placeholder 3">
+            <a:extLst>
+              <a:ext uri="{FF2B5EF4-FFF2-40B4-BE49-F238E27FC236}">
+                <a16:creationId xmlns:a16="http://schemas.microsoft.com/office/drawing/2014/main" id="{4E852665-AB70-4696-993E-2D749D674B4D}"/>
+              </a:ext>
+            </a:extLst>
+          </p:cNvPr>
+          <p:cNvSpPr>
+            <a:spLocks noGrp="1"/>
+          </p:cNvSpPr>
+          <p:nvPr>
+            <p:ph type="body" sz="quarter" idx="14"/>
+          </p:nvPr>
+        </p:nvSpPr>
+        <p:spPr/>
+        <p:txBody>
+          <a:bodyPr/>
+          <a:lstStyle/>
+          <a:p>
+            <a:endParaRPr lang="en-US"/>
+          </a:p>
+        </p:txBody>
+      </p:sp>
+      <p:sp>
+        <p:nvSpPr>
+          <p:cNvPr id="5" name="Slide Number Placeholder 4">
+            <a:extLst>
+              <a:ext uri="{FF2B5EF4-FFF2-40B4-BE49-F238E27FC236}">
+                <a16:creationId xmlns:a16="http://schemas.microsoft.com/office/drawing/2014/main" id="{439173BD-33EA-42B3-B778-ADD631ABB78A}"/>
+              </a:ext>
+            </a:extLst>
+          </p:cNvPr>
+          <p:cNvSpPr>
+            <a:spLocks noGrp="1"/>
+          </p:cNvSpPr>
+          <p:nvPr>
+            <p:ph type="sldNum" sz="quarter" idx="17"/>
+          </p:nvPr>
+        </p:nvSpPr>
+        <p:spPr/>
+        <p:txBody>
+          <a:bodyPr/>
+          <a:lstStyle/>
+          <a:p>
+            <a:fld id="{0A838F34-1B32-4019-A24D-EF473E6901BC}" type="slidenum">
+              <a:rPr lang="en-US" smtClean="0">
+                <a:solidFill>
+                  <a:srgbClr val="9A8B7D"/>
+                </a:solidFill>
+              </a:rPr>
+              <a:pPr/>
+              <a:t>6</a:t>
+            </a:fld>
+            <a:endParaRPr lang="en-US">
+              <a:solidFill>
+                <a:srgbClr val="9A8B7D"/>
+              </a:solidFill>
+            </a:endParaRPr>
+          </a:p>
+        </p:txBody>
+      </p:sp>
+      <p:pic>
+        <p:nvPicPr>
+          <p:cNvPr id="7" name="Picture 6">
+            <a:extLst>
+              <a:ext uri="{FF2B5EF4-FFF2-40B4-BE49-F238E27FC236}">
+                <a16:creationId xmlns:a16="http://schemas.microsoft.com/office/drawing/2014/main" id="{5D071394-E259-4091-BEB8-D965BBEF15C2}"/>
+              </a:ext>
+            </a:extLst>
+          </p:cNvPr>
+          <p:cNvPicPr>
+            <a:picLocks noChangeAspect="1"/>
+          </p:cNvPicPr>
+          <p:nvPr/>
+        </p:nvPicPr>
+        <p:blipFill rotWithShape="1">
+          <a:blip r:embed="rId2"/>
+          <a:srcRect l="9581" r="24510"/>
+          <a:stretch/>
+        </p:blipFill>
+        <p:spPr>
+          <a:xfrm>
+            <a:off x="2206156" y="1100738"/>
+            <a:ext cx="5649734" cy="2561336"/>
+          </a:xfrm>
+          <a:prstGeom prst="rect">
+            <a:avLst/>
+          </a:prstGeom>
+        </p:spPr>
+      </p:pic>
+      <p:sp>
+        <p:nvSpPr>
+          <p:cNvPr id="9" name="TextBox 8">
+            <a:extLst>
+              <a:ext uri="{FF2B5EF4-FFF2-40B4-BE49-F238E27FC236}">
+                <a16:creationId xmlns:a16="http://schemas.microsoft.com/office/drawing/2014/main" id="{C065B58C-CD0D-4B7A-9D42-D31593D6933C}"/>
+              </a:ext>
+            </a:extLst>
+          </p:cNvPr>
+          <p:cNvSpPr txBox="1"/>
+          <p:nvPr/>
+        </p:nvSpPr>
+        <p:spPr>
+          <a:xfrm rot="16200000">
+            <a:off x="904018" y="1684148"/>
+            <a:ext cx="2154804" cy="400110"/>
+          </a:xfrm>
+          <a:prstGeom prst="rect">
+            <a:avLst/>
+          </a:prstGeom>
+          <a:noFill/>
+        </p:spPr>
+        <p:txBody>
+          <a:bodyPr wrap="square" rtlCol="0">
+            <a:spAutoFit/>
+          </a:bodyPr>
+          <a:lstStyle/>
+          <a:p>
+            <a:pPr>
+              <a:buClr>
+                <a:schemeClr val="tx1"/>
+              </a:buClr>
+            </a:pPr>
+            <a:r>
+              <a:rPr lang="en-US" sz="2000" dirty="0"/>
+              <a:t># molecules</a:t>
+            </a:r>
+          </a:p>
+        </p:txBody>
+      </p:sp>
+      <p:sp>
+        <p:nvSpPr>
+          <p:cNvPr id="10" name="TextBox 9">
+            <a:extLst>
+              <a:ext uri="{FF2B5EF4-FFF2-40B4-BE49-F238E27FC236}">
+                <a16:creationId xmlns:a16="http://schemas.microsoft.com/office/drawing/2014/main" id="{7E9563D7-FD9C-447C-93BB-F90D4739C30A}"/>
+              </a:ext>
+            </a:extLst>
+          </p:cNvPr>
+          <p:cNvSpPr txBox="1"/>
+          <p:nvPr/>
+        </p:nvSpPr>
+        <p:spPr>
+          <a:xfrm rot="16200000">
+            <a:off x="904018" y="4204712"/>
+            <a:ext cx="2154804" cy="400110"/>
+          </a:xfrm>
+          <a:prstGeom prst="rect">
+            <a:avLst/>
+          </a:prstGeom>
+          <a:noFill/>
+        </p:spPr>
+        <p:txBody>
+          <a:bodyPr wrap="square" rtlCol="0">
+            <a:spAutoFit/>
+          </a:bodyPr>
+          <a:lstStyle/>
+          <a:p>
+            <a:pPr>
+              <a:buClr>
+                <a:schemeClr val="tx1"/>
+              </a:buClr>
+            </a:pPr>
+            <a:r>
+              <a:rPr lang="en-US" sz="2000" dirty="0"/>
+              <a:t># molecules</a:t>
+            </a:r>
+          </a:p>
+        </p:txBody>
+      </p:sp>
+      <p:pic>
+        <p:nvPicPr>
+          <p:cNvPr id="12" name="Picture 11">
+            <a:extLst>
+              <a:ext uri="{FF2B5EF4-FFF2-40B4-BE49-F238E27FC236}">
+                <a16:creationId xmlns:a16="http://schemas.microsoft.com/office/drawing/2014/main" id="{54DBEF6F-BEBF-4888-BE5E-712455B600BE}"/>
+              </a:ext>
+            </a:extLst>
+          </p:cNvPr>
+          <p:cNvPicPr>
+            <a:picLocks noChangeAspect="1"/>
+          </p:cNvPicPr>
+          <p:nvPr/>
+        </p:nvPicPr>
+        <p:blipFill rotWithShape="1">
+          <a:blip r:embed="rId3"/>
+          <a:srcRect l="10006" r="25193"/>
+          <a:stretch/>
+        </p:blipFill>
+        <p:spPr>
+          <a:xfrm>
+            <a:off x="2183845" y="3646173"/>
+            <a:ext cx="5462547" cy="2600325"/>
+          </a:xfrm>
+          <a:prstGeom prst="rect">
+            <a:avLst/>
+          </a:prstGeom>
+        </p:spPr>
+      </p:pic>
+    </p:spTree>
+    <p:extLst>
+      <p:ext uri="{BB962C8B-B14F-4D97-AF65-F5344CB8AC3E}">
+        <p14:creationId xmlns:p14="http://schemas.microsoft.com/office/powerpoint/2010/main" val="892661274"/>
+      </p:ext>
+    </p:extLst>
+  </p:cSld>
+  <p:clrMapOvr>
+    <a:masterClrMapping/>
+  </p:clrMapOvr>
 </p:sld>
 </file>
 

</xml_diff>